<commit_message>
fixed issue regarding encoding rabbit message as well as dumping jsons through rabbit. also used *args feature better in the get_config function.
</commit_message>
<xml_diff>
--- a/etc/arch.pptx
+++ b/etc/arch.pptx
@@ -6,6 +6,8 @@
   </p:sldMasterIdLst>
   <p:sldIdLst>
     <p:sldId id="256" r:id="rId2"/>
+    <p:sldId id="257" r:id="rId3"/>
+    <p:sldId id="258" r:id="rId4"/>
   </p:sldIdLst>
   <p:sldSz cx="12192000" cy="6858000"/>
   <p:notesSz cx="6858000" cy="9144000"/>
@@ -104,6 +106,11 @@
       </a:defRPr>
     </a:lvl9pPr>
   </p:defaultTextStyle>
+  <p:extLst>
+    <p:ext uri="{EFAFB233-063F-42B5-8137-9DF3F51BA10A}">
+      <p15:sldGuideLst xmlns:p15="http://schemas.microsoft.com/office/powerpoint/2012/main"/>
+    </p:ext>
+  </p:extLst>
 </p:presentation>
 </file>
 
@@ -238,7 +245,7 @@
           <a:p>
             <a:fld id="{07C508A1-B328-4D3D-87DB-9A4595BE8C39}" type="datetimeFigureOut">
               <a:rPr lang="en-IL" smtClean="0"/>
-              <a:t>06/03/2021</a:t>
+              <a:t>10/03/2021</a:t>
             </a:fld>
             <a:endParaRPr lang="en-IL"/>
           </a:p>
@@ -408,7 +415,7 @@
           <a:p>
             <a:fld id="{07C508A1-B328-4D3D-87DB-9A4595BE8C39}" type="datetimeFigureOut">
               <a:rPr lang="en-IL" smtClean="0"/>
-              <a:t>06/03/2021</a:t>
+              <a:t>10/03/2021</a:t>
             </a:fld>
             <a:endParaRPr lang="en-IL"/>
           </a:p>
@@ -588,7 +595,7 @@
           <a:p>
             <a:fld id="{07C508A1-B328-4D3D-87DB-9A4595BE8C39}" type="datetimeFigureOut">
               <a:rPr lang="en-IL" smtClean="0"/>
-              <a:t>06/03/2021</a:t>
+              <a:t>10/03/2021</a:t>
             </a:fld>
             <a:endParaRPr lang="en-IL"/>
           </a:p>
@@ -758,7 +765,7 @@
           <a:p>
             <a:fld id="{07C508A1-B328-4D3D-87DB-9A4595BE8C39}" type="datetimeFigureOut">
               <a:rPr lang="en-IL" smtClean="0"/>
-              <a:t>06/03/2021</a:t>
+              <a:t>10/03/2021</a:t>
             </a:fld>
             <a:endParaRPr lang="en-IL"/>
           </a:p>
@@ -1004,7 +1011,7 @@
           <a:p>
             <a:fld id="{07C508A1-B328-4D3D-87DB-9A4595BE8C39}" type="datetimeFigureOut">
               <a:rPr lang="en-IL" smtClean="0"/>
-              <a:t>06/03/2021</a:t>
+              <a:t>10/03/2021</a:t>
             </a:fld>
             <a:endParaRPr lang="en-IL"/>
           </a:p>
@@ -1236,7 +1243,7 @@
           <a:p>
             <a:fld id="{07C508A1-B328-4D3D-87DB-9A4595BE8C39}" type="datetimeFigureOut">
               <a:rPr lang="en-IL" smtClean="0"/>
-              <a:t>06/03/2021</a:t>
+              <a:t>10/03/2021</a:t>
             </a:fld>
             <a:endParaRPr lang="en-IL"/>
           </a:p>
@@ -1603,7 +1610,7 @@
           <a:p>
             <a:fld id="{07C508A1-B328-4D3D-87DB-9A4595BE8C39}" type="datetimeFigureOut">
               <a:rPr lang="en-IL" smtClean="0"/>
-              <a:t>06/03/2021</a:t>
+              <a:t>10/03/2021</a:t>
             </a:fld>
             <a:endParaRPr lang="en-IL"/>
           </a:p>
@@ -1721,7 +1728,7 @@
           <a:p>
             <a:fld id="{07C508A1-B328-4D3D-87DB-9A4595BE8C39}" type="datetimeFigureOut">
               <a:rPr lang="en-IL" smtClean="0"/>
-              <a:t>06/03/2021</a:t>
+              <a:t>10/03/2021</a:t>
             </a:fld>
             <a:endParaRPr lang="en-IL"/>
           </a:p>
@@ -1816,7 +1823,7 @@
           <a:p>
             <a:fld id="{07C508A1-B328-4D3D-87DB-9A4595BE8C39}" type="datetimeFigureOut">
               <a:rPr lang="en-IL" smtClean="0"/>
-              <a:t>06/03/2021</a:t>
+              <a:t>10/03/2021</a:t>
             </a:fld>
             <a:endParaRPr lang="en-IL"/>
           </a:p>
@@ -2093,7 +2100,7 @@
           <a:p>
             <a:fld id="{07C508A1-B328-4D3D-87DB-9A4595BE8C39}" type="datetimeFigureOut">
               <a:rPr lang="en-IL" smtClean="0"/>
-              <a:t>06/03/2021</a:t>
+              <a:t>10/03/2021</a:t>
             </a:fld>
             <a:endParaRPr lang="en-IL"/>
           </a:p>
@@ -2350,7 +2357,7 @@
           <a:p>
             <a:fld id="{07C508A1-B328-4D3D-87DB-9A4595BE8C39}" type="datetimeFigureOut">
               <a:rPr lang="en-IL" smtClean="0"/>
-              <a:t>06/03/2021</a:t>
+              <a:t>10/03/2021</a:t>
             </a:fld>
             <a:endParaRPr lang="en-IL"/>
           </a:p>
@@ -2563,7 +2570,7 @@
           <a:p>
             <a:fld id="{07C508A1-B328-4D3D-87DB-9A4595BE8C39}" type="datetimeFigureOut">
               <a:rPr lang="en-IL" smtClean="0"/>
-              <a:t>06/03/2021</a:t>
+              <a:t>10/03/2021</a:t>
             </a:fld>
             <a:endParaRPr lang="en-IL"/>
           </a:p>
@@ -3196,6 +3203,82 @@
           </p:txBody>
         </p:sp>
       </p:grpSp>
+      <p:sp>
+        <p:nvSpPr>
+          <p:cNvPr id="32" name="Hexagon 31">
+            <a:extLst>
+              <a:ext uri="{FF2B5EF4-FFF2-40B4-BE49-F238E27FC236}">
+                <a16:creationId xmlns:a16="http://schemas.microsoft.com/office/drawing/2014/main" id="{2B484898-A100-40B4-A40F-F28F87611913}"/>
+              </a:ext>
+            </a:extLst>
+          </p:cNvPr>
+          <p:cNvSpPr/>
+          <p:nvPr/>
+        </p:nvSpPr>
+        <p:spPr>
+          <a:xfrm>
+            <a:off x="4989114" y="3224017"/>
+            <a:ext cx="1789687" cy="1685127"/>
+          </a:xfrm>
+          <a:prstGeom prst="hexagon">
+            <a:avLst/>
+          </a:prstGeom>
+          <a:solidFill>
+            <a:schemeClr val="bg2"/>
+          </a:solidFill>
+          <a:ln w="38100">
+            <a:solidFill>
+              <a:schemeClr val="accent1"/>
+            </a:solidFill>
+          </a:ln>
+        </p:spPr>
+        <p:style>
+          <a:lnRef idx="2">
+            <a:schemeClr val="accent1">
+              <a:shade val="50000"/>
+            </a:schemeClr>
+          </a:lnRef>
+          <a:fillRef idx="1">
+            <a:schemeClr val="accent1"/>
+          </a:fillRef>
+          <a:effectRef idx="0">
+            <a:schemeClr val="accent1"/>
+          </a:effectRef>
+          <a:fontRef idx="minor">
+            <a:schemeClr val="lt1"/>
+          </a:fontRef>
+        </p:style>
+        <p:txBody>
+          <a:bodyPr rtlCol="0" anchor="ctr"/>
+          <a:lstStyle/>
+          <a:p>
+            <a:pPr algn="ctr"/>
+            <a:r>
+              <a:rPr lang="en-US" sz="2800">
+                <a:ln>
+                  <a:solidFill>
+                    <a:sysClr val="windowText" lastClr="000000"/>
+                  </a:solidFill>
+                </a:ln>
+                <a:solidFill>
+                  <a:sysClr val="windowText" lastClr="000000"/>
+                </a:solidFill>
+              </a:rPr>
+              <a:t>RabbitMQ</a:t>
+            </a:r>
+            <a:endParaRPr lang="en-IL" sz="2800" dirty="0">
+              <a:ln>
+                <a:solidFill>
+                  <a:sysClr val="windowText" lastClr="000000"/>
+                </a:solidFill>
+              </a:ln>
+              <a:solidFill>
+                <a:sysClr val="windowText" lastClr="000000"/>
+              </a:solidFill>
+            </a:endParaRPr>
+          </a:p>
+        </p:txBody>
+      </p:sp>
       <p:grpSp>
         <p:nvGrpSpPr>
           <p:cNvPr id="11" name="Group 10">
@@ -3350,7 +3433,7 @@
         </p:nvSpPr>
         <p:spPr>
           <a:xfrm>
-            <a:off x="6735737" y="3212485"/>
+            <a:off x="6852552" y="3212485"/>
             <a:ext cx="1663644" cy="1671700"/>
           </a:xfrm>
           <a:prstGeom prst="diamond">
@@ -3561,7 +3644,7 @@
                   <a:sysClr val="windowText" lastClr="000000"/>
                 </a:solidFill>
               </a:rPr>
-              <a:t>AMZ Provider</a:t>
+              <a:t>AMZN Provider</a:t>
             </a:r>
             <a:endParaRPr lang="en-IL" sz="1400" dirty="0">
               <a:ln>
@@ -4096,82 +4179,6 @@
           </a:fontRef>
         </p:style>
       </p:cxnSp>
-      <p:sp>
-        <p:nvSpPr>
-          <p:cNvPr id="63" name="Diamond 62">
-            <a:extLst>
-              <a:ext uri="{FF2B5EF4-FFF2-40B4-BE49-F238E27FC236}">
-                <a16:creationId xmlns:a16="http://schemas.microsoft.com/office/drawing/2014/main" id="{62FFAB95-5EC6-4BDF-951E-84CC0C933350}"/>
-              </a:ext>
-            </a:extLst>
-          </p:cNvPr>
-          <p:cNvSpPr/>
-          <p:nvPr/>
-        </p:nvSpPr>
-        <p:spPr>
-          <a:xfrm>
-            <a:off x="4996164" y="3212447"/>
-            <a:ext cx="1663644" cy="1671700"/>
-          </a:xfrm>
-          <a:prstGeom prst="diamond">
-            <a:avLst/>
-          </a:prstGeom>
-          <a:solidFill>
-            <a:schemeClr val="bg2"/>
-          </a:solidFill>
-          <a:ln w="28575">
-            <a:solidFill>
-              <a:schemeClr val="accent1"/>
-            </a:solidFill>
-          </a:ln>
-        </p:spPr>
-        <p:style>
-          <a:lnRef idx="2">
-            <a:schemeClr val="accent1">
-              <a:shade val="50000"/>
-            </a:schemeClr>
-          </a:lnRef>
-          <a:fillRef idx="1">
-            <a:schemeClr val="accent1"/>
-          </a:fillRef>
-          <a:effectRef idx="0">
-            <a:schemeClr val="accent1"/>
-          </a:effectRef>
-          <a:fontRef idx="minor">
-            <a:schemeClr val="lt1"/>
-          </a:fontRef>
-        </p:style>
-        <p:txBody>
-          <a:bodyPr rtlCol="0" anchor="ctr"/>
-          <a:lstStyle/>
-          <a:p>
-            <a:pPr algn="ctr"/>
-            <a:r>
-              <a:rPr lang="en-US" dirty="0">
-                <a:ln>
-                  <a:solidFill>
-                    <a:sysClr val="windowText" lastClr="000000"/>
-                  </a:solidFill>
-                </a:ln>
-                <a:solidFill>
-                  <a:sysClr val="windowText" lastClr="000000"/>
-                </a:solidFill>
-              </a:rPr>
-              <a:t>MSG SRV</a:t>
-            </a:r>
-            <a:endParaRPr lang="en-IL" dirty="0">
-              <a:ln>
-                <a:solidFill>
-                  <a:sysClr val="windowText" lastClr="000000"/>
-                </a:solidFill>
-              </a:ln>
-              <a:solidFill>
-                <a:sysClr val="windowText" lastClr="000000"/>
-              </a:solidFill>
-            </a:endParaRPr>
-          </a:p>
-        </p:txBody>
-      </p:sp>
       <p:cxnSp>
         <p:nvCxnSpPr>
           <p:cNvPr id="64" name="Straight Arrow Connector 63">
@@ -4188,7 +4195,7 @@
         </p:nvCxnSpPr>
         <p:spPr>
           <a:xfrm flipH="1" flipV="1">
-            <a:off x="6416827" y="3925530"/>
+            <a:off x="6525588" y="3925530"/>
             <a:ext cx="561891" cy="38"/>
           </a:xfrm>
           <a:prstGeom prst="straightConnector1">
@@ -4232,7 +4239,7 @@
         </p:nvCxnSpPr>
         <p:spPr>
           <a:xfrm flipH="1" flipV="1">
-            <a:off x="6416826" y="4191847"/>
+            <a:off x="6525587" y="4191847"/>
             <a:ext cx="561891" cy="38"/>
           </a:xfrm>
           <a:prstGeom prst="straightConnector1">
@@ -4272,13 +4279,12 @@
           </p:cNvPr>
           <p:cNvCxnSpPr>
             <a:cxnSpLocks/>
-            <a:stCxn id="63" idx="0"/>
           </p:cNvCxnSpPr>
           <p:nvPr/>
         </p:nvCxnSpPr>
         <p:spPr>
           <a:xfrm flipH="1" flipV="1">
-            <a:off x="4992432" y="3151689"/>
+            <a:off x="4994022" y="3151727"/>
             <a:ext cx="835554" cy="60758"/>
           </a:xfrm>
           <a:prstGeom prst="straightConnector1">
@@ -4317,13 +4323,12 @@
           </p:cNvPr>
           <p:cNvCxnSpPr>
             <a:cxnSpLocks/>
-            <a:stCxn id="63" idx="0"/>
           </p:cNvCxnSpPr>
           <p:nvPr/>
         </p:nvCxnSpPr>
         <p:spPr>
           <a:xfrm flipH="1">
-            <a:off x="4135692" y="3212447"/>
+            <a:off x="4137282" y="3212485"/>
             <a:ext cx="1692294" cy="751694"/>
           </a:xfrm>
           <a:prstGeom prst="straightConnector1">
@@ -4362,13 +4367,12 @@
           </p:cNvPr>
           <p:cNvCxnSpPr>
             <a:cxnSpLocks/>
-            <a:stCxn id="63" idx="2"/>
           </p:cNvCxnSpPr>
           <p:nvPr/>
         </p:nvCxnSpPr>
         <p:spPr>
           <a:xfrm flipH="1">
-            <a:off x="5043481" y="4884147"/>
+            <a:off x="5045071" y="4884185"/>
             <a:ext cx="784505" cy="711014"/>
           </a:xfrm>
           <a:prstGeom prst="straightConnector1">
@@ -4407,13 +4411,12 @@
           </p:cNvPr>
           <p:cNvCxnSpPr>
             <a:cxnSpLocks/>
-            <a:endCxn id="63" idx="1"/>
           </p:cNvCxnSpPr>
           <p:nvPr/>
         </p:nvCxnSpPr>
         <p:spPr>
           <a:xfrm>
-            <a:off x="4920236" y="3235021"/>
+            <a:off x="4921826" y="3235059"/>
             <a:ext cx="75928" cy="813276"/>
           </a:xfrm>
           <a:prstGeom prst="straightConnector1">
@@ -4452,13 +4455,12 @@
           </p:cNvPr>
           <p:cNvCxnSpPr>
             <a:cxnSpLocks/>
-            <a:endCxn id="63" idx="1"/>
           </p:cNvCxnSpPr>
           <p:nvPr/>
         </p:nvCxnSpPr>
         <p:spPr>
           <a:xfrm flipV="1">
-            <a:off x="4059763" y="4048297"/>
+            <a:off x="4061353" y="4048335"/>
             <a:ext cx="936401" cy="40320"/>
           </a:xfrm>
           <a:prstGeom prst="straightConnector1">
@@ -4497,13 +4499,12 @@
           </p:cNvPr>
           <p:cNvCxnSpPr>
             <a:cxnSpLocks/>
-            <a:stCxn id="63" idx="1"/>
           </p:cNvCxnSpPr>
           <p:nvPr/>
         </p:nvCxnSpPr>
         <p:spPr>
           <a:xfrm flipH="1">
-            <a:off x="4586025" y="4048297"/>
+            <a:off x="4587615" y="4048335"/>
             <a:ext cx="410139" cy="1051396"/>
           </a:xfrm>
           <a:prstGeom prst="straightConnector1">
@@ -4514,6 +4515,247 @@
               <a:srgbClr val="FF0000"/>
             </a:solidFill>
             <a:tailEnd type="triangle"/>
+          </a:ln>
+        </p:spPr>
+        <p:style>
+          <a:lnRef idx="1">
+            <a:schemeClr val="accent1"/>
+          </a:lnRef>
+          <a:fillRef idx="0">
+            <a:schemeClr val="accent1"/>
+          </a:fillRef>
+          <a:effectRef idx="0">
+            <a:schemeClr val="accent1"/>
+          </a:effectRef>
+          <a:fontRef idx="minor">
+            <a:schemeClr val="tx1"/>
+          </a:fontRef>
+        </p:style>
+      </p:cxnSp>
+      <p:sp>
+        <p:nvSpPr>
+          <p:cNvPr id="2" name="TextBox 1">
+            <a:extLst>
+              <a:ext uri="{FF2B5EF4-FFF2-40B4-BE49-F238E27FC236}">
+                <a16:creationId xmlns:a16="http://schemas.microsoft.com/office/drawing/2014/main" id="{DB5CE5EE-111C-4F0B-8CA1-C9A252F4A3AE}"/>
+              </a:ext>
+            </a:extLst>
+          </p:cNvPr>
+          <p:cNvSpPr txBox="1"/>
+          <p:nvPr/>
+        </p:nvSpPr>
+        <p:spPr>
+          <a:xfrm>
+            <a:off x="273917" y="179510"/>
+            <a:ext cx="4563944" cy="830997"/>
+          </a:xfrm>
+          <a:prstGeom prst="rect">
+            <a:avLst/>
+          </a:prstGeom>
+          <a:noFill/>
+        </p:spPr>
+        <p:txBody>
+          <a:bodyPr wrap="square" rtlCol="0">
+            <a:spAutoFit/>
+          </a:bodyPr>
+          <a:lstStyle/>
+          <a:p>
+            <a:r>
+              <a:rPr lang="en-US" sz="4800" dirty="0">
+                <a:ln>
+                  <a:solidFill>
+                    <a:sysClr val="windowText" lastClr="000000"/>
+                  </a:solidFill>
+                </a:ln>
+                <a:solidFill>
+                  <a:sysClr val="windowText" lastClr="000000"/>
+                </a:solidFill>
+              </a:rPr>
+              <a:t>Architecture</a:t>
+            </a:r>
+            <a:endParaRPr lang="en-IL" sz="4800" dirty="0">
+              <a:ln>
+                <a:solidFill>
+                  <a:sysClr val="windowText" lastClr="000000"/>
+                </a:solidFill>
+              </a:ln>
+              <a:solidFill>
+                <a:sysClr val="windowText" lastClr="000000"/>
+              </a:solidFill>
+            </a:endParaRPr>
+          </a:p>
+        </p:txBody>
+      </p:sp>
+      <p:sp>
+        <p:nvSpPr>
+          <p:cNvPr id="34" name="Diamond 33">
+            <a:extLst>
+              <a:ext uri="{FF2B5EF4-FFF2-40B4-BE49-F238E27FC236}">
+                <a16:creationId xmlns:a16="http://schemas.microsoft.com/office/drawing/2014/main" id="{BFE64443-D005-4E7D-9384-E405782F0865}"/>
+              </a:ext>
+            </a:extLst>
+          </p:cNvPr>
+          <p:cNvSpPr/>
+          <p:nvPr/>
+        </p:nvSpPr>
+        <p:spPr>
+          <a:xfrm>
+            <a:off x="1252588" y="2189504"/>
+            <a:ext cx="1229185" cy="1166679"/>
+          </a:xfrm>
+          <a:prstGeom prst="diamond">
+            <a:avLst/>
+          </a:prstGeom>
+          <a:solidFill>
+            <a:schemeClr val="bg2"/>
+          </a:solidFill>
+          <a:ln w="28575">
+            <a:solidFill>
+              <a:schemeClr val="accent1"/>
+            </a:solidFill>
+          </a:ln>
+        </p:spPr>
+        <p:style>
+          <a:lnRef idx="2">
+            <a:schemeClr val="accent1">
+              <a:shade val="50000"/>
+            </a:schemeClr>
+          </a:lnRef>
+          <a:fillRef idx="1">
+            <a:schemeClr val="accent1"/>
+          </a:fillRef>
+          <a:effectRef idx="0">
+            <a:schemeClr val="accent1"/>
+          </a:effectRef>
+          <a:fontRef idx="minor">
+            <a:schemeClr val="lt1"/>
+          </a:fontRef>
+        </p:style>
+        <p:txBody>
+          <a:bodyPr rtlCol="0" anchor="ctr"/>
+          <a:lstStyle/>
+          <a:p>
+            <a:pPr algn="ctr"/>
+            <a:r>
+              <a:rPr lang="en-US" sz="1050" dirty="0">
+                <a:ln>
+                  <a:solidFill>
+                    <a:sysClr val="windowText" lastClr="000000"/>
+                  </a:solidFill>
+                </a:ln>
+                <a:solidFill>
+                  <a:sysClr val="windowText" lastClr="000000"/>
+                </a:solidFill>
+              </a:rPr>
+              <a:t>WLMRT </a:t>
+            </a:r>
+          </a:p>
+          <a:p>
+            <a:pPr algn="ctr"/>
+            <a:r>
+              <a:rPr lang="en-US" sz="1050" dirty="0">
+                <a:ln>
+                  <a:solidFill>
+                    <a:sysClr val="windowText" lastClr="000000"/>
+                  </a:solidFill>
+                </a:ln>
+                <a:solidFill>
+                  <a:sysClr val="windowText" lastClr="000000"/>
+                </a:solidFill>
+              </a:rPr>
+              <a:t>Header</a:t>
+            </a:r>
+          </a:p>
+          <a:p>
+            <a:pPr algn="ctr"/>
+            <a:r>
+              <a:rPr lang="en-US" sz="1050" dirty="0">
+                <a:ln>
+                  <a:solidFill>
+                    <a:sysClr val="windowText" lastClr="000000"/>
+                  </a:solidFill>
+                </a:ln>
+                <a:solidFill>
+                  <a:sysClr val="windowText" lastClr="000000"/>
+                </a:solidFill>
+              </a:rPr>
+              <a:t>Fetcher</a:t>
+            </a:r>
+          </a:p>
+        </p:txBody>
+      </p:sp>
+      <p:cxnSp>
+        <p:nvCxnSpPr>
+          <p:cNvPr id="35" name="Connector: Elbow 34">
+            <a:extLst>
+              <a:ext uri="{FF2B5EF4-FFF2-40B4-BE49-F238E27FC236}">
+                <a16:creationId xmlns:a16="http://schemas.microsoft.com/office/drawing/2014/main" id="{547F5C9D-5AF5-454F-AC2F-DF2772ECE240}"/>
+              </a:ext>
+            </a:extLst>
+          </p:cNvPr>
+          <p:cNvCxnSpPr>
+            <a:cxnSpLocks/>
+            <a:endCxn id="34" idx="0"/>
+          </p:cNvCxnSpPr>
+          <p:nvPr/>
+        </p:nvCxnSpPr>
+        <p:spPr>
+          <a:xfrm rot="10800000" flipV="1">
+            <a:off x="1867182" y="1323090"/>
+            <a:ext cx="5421409" cy="866414"/>
+          </a:xfrm>
+          <a:prstGeom prst="bentConnector2">
+            <a:avLst/>
+          </a:prstGeom>
+          <a:ln w="19050">
+            <a:solidFill>
+              <a:schemeClr val="tx1"/>
+            </a:solidFill>
+            <a:headEnd type="triangle" w="med" len="med"/>
+            <a:tailEnd type="none" w="med" len="med"/>
+          </a:ln>
+        </p:spPr>
+        <p:style>
+          <a:lnRef idx="1">
+            <a:schemeClr val="accent1"/>
+          </a:lnRef>
+          <a:fillRef idx="0">
+            <a:schemeClr val="accent1"/>
+          </a:fillRef>
+          <a:effectRef idx="0">
+            <a:schemeClr val="accent1"/>
+          </a:effectRef>
+          <a:fontRef idx="minor">
+            <a:schemeClr val="tx1"/>
+          </a:fontRef>
+        </p:style>
+      </p:cxnSp>
+      <p:cxnSp>
+        <p:nvCxnSpPr>
+          <p:cNvPr id="16" name="Straight Connector 15">
+            <a:extLst>
+              <a:ext uri="{FF2B5EF4-FFF2-40B4-BE49-F238E27FC236}">
+                <a16:creationId xmlns:a16="http://schemas.microsoft.com/office/drawing/2014/main" id="{9C4E51CB-8F1E-448B-9C9F-49612F083760}"/>
+              </a:ext>
+            </a:extLst>
+          </p:cNvPr>
+          <p:cNvCxnSpPr>
+            <a:cxnSpLocks/>
+          </p:cNvCxnSpPr>
+          <p:nvPr/>
+        </p:nvCxnSpPr>
+        <p:spPr>
+          <a:xfrm>
+            <a:off x="2252335" y="2832100"/>
+            <a:ext cx="784311" cy="828393"/>
+          </a:xfrm>
+          <a:prstGeom prst="line">
+            <a:avLst/>
+          </a:prstGeom>
+          <a:ln w="28575">
+            <a:solidFill>
+              <a:schemeClr val="tx1"/>
+            </a:solidFill>
           </a:ln>
         </p:spPr>
         <p:style>
@@ -4535,6 +4777,3168 @@
     <p:extLst>
       <p:ext uri="{BB962C8B-B14F-4D97-AF65-F5344CB8AC3E}">
         <p14:creationId xmlns:p14="http://schemas.microsoft.com/office/powerpoint/2010/main" val="1959375053"/>
+      </p:ext>
+    </p:extLst>
+  </p:cSld>
+  <p:clrMapOvr>
+    <a:masterClrMapping/>
+  </p:clrMapOvr>
+</p:sld>
+</file>
+
+<file path=ppt/slides/slide2.xml><?xml version="1.0" encoding="utf-8"?>
+<p:sld xmlns:a="http://schemas.openxmlformats.org/drawingml/2006/main" xmlns:r="http://schemas.openxmlformats.org/officeDocument/2006/relationships" xmlns:p="http://schemas.openxmlformats.org/presentationml/2006/main">
+  <p:cSld>
+    <p:spTree>
+      <p:nvGrpSpPr>
+        <p:cNvPr id="1" name=""/>
+        <p:cNvGrpSpPr/>
+        <p:nvPr/>
+      </p:nvGrpSpPr>
+      <p:grpSpPr>
+        <a:xfrm>
+          <a:off x="0" y="0"/>
+          <a:ext cx="0" cy="0"/>
+          <a:chOff x="0" y="0"/>
+          <a:chExt cx="0" cy="0"/>
+        </a:xfrm>
+      </p:grpSpPr>
+      <p:sp>
+        <p:nvSpPr>
+          <p:cNvPr id="2" name="TextBox 1">
+            <a:extLst>
+              <a:ext uri="{FF2B5EF4-FFF2-40B4-BE49-F238E27FC236}">
+                <a16:creationId xmlns:a16="http://schemas.microsoft.com/office/drawing/2014/main" id="{DB5CE5EE-111C-4F0B-8CA1-C9A252F4A3AE}"/>
+              </a:ext>
+            </a:extLst>
+          </p:cNvPr>
+          <p:cNvSpPr txBox="1"/>
+          <p:nvPr/>
+        </p:nvSpPr>
+        <p:spPr>
+          <a:xfrm>
+            <a:off x="273917" y="151313"/>
+            <a:ext cx="4563944" cy="1569660"/>
+          </a:xfrm>
+          <a:prstGeom prst="rect">
+            <a:avLst/>
+          </a:prstGeom>
+          <a:noFill/>
+        </p:spPr>
+        <p:txBody>
+          <a:bodyPr wrap="square" rtlCol="0">
+            <a:spAutoFit/>
+          </a:bodyPr>
+          <a:lstStyle/>
+          <a:p>
+            <a:r>
+              <a:rPr lang="en-US" sz="4800" dirty="0">
+                <a:ln>
+                  <a:solidFill>
+                    <a:sysClr val="windowText" lastClr="000000"/>
+                  </a:solidFill>
+                </a:ln>
+                <a:solidFill>
+                  <a:sysClr val="windowText" lastClr="000000"/>
+                </a:solidFill>
+              </a:rPr>
+              <a:t>Rabbit Architecture 1</a:t>
+            </a:r>
+            <a:endParaRPr lang="en-IL" sz="4800" dirty="0">
+              <a:ln>
+                <a:solidFill>
+                  <a:sysClr val="windowText" lastClr="000000"/>
+                </a:solidFill>
+              </a:ln>
+              <a:solidFill>
+                <a:sysClr val="windowText" lastClr="000000"/>
+              </a:solidFill>
+            </a:endParaRPr>
+          </a:p>
+        </p:txBody>
+      </p:sp>
+      <p:sp>
+        <p:nvSpPr>
+          <p:cNvPr id="6" name="Flowchart: Terminator 5">
+            <a:extLst>
+              <a:ext uri="{FF2B5EF4-FFF2-40B4-BE49-F238E27FC236}">
+                <a16:creationId xmlns:a16="http://schemas.microsoft.com/office/drawing/2014/main" id="{337579E2-406E-46DB-8BEB-79038E09FFFD}"/>
+              </a:ext>
+            </a:extLst>
+          </p:cNvPr>
+          <p:cNvSpPr/>
+          <p:nvPr/>
+        </p:nvSpPr>
+        <p:spPr>
+          <a:xfrm>
+            <a:off x="5848937" y="648521"/>
+            <a:ext cx="2312184" cy="543807"/>
+          </a:xfrm>
+          <a:prstGeom prst="flowChartTerminator">
+            <a:avLst/>
+          </a:prstGeom>
+          <a:solidFill>
+            <a:schemeClr val="bg2"/>
+          </a:solidFill>
+          <a:ln>
+            <a:solidFill>
+              <a:schemeClr val="tx1"/>
+            </a:solidFill>
+          </a:ln>
+        </p:spPr>
+        <p:style>
+          <a:lnRef idx="2">
+            <a:schemeClr val="accent1">
+              <a:shade val="50000"/>
+            </a:schemeClr>
+          </a:lnRef>
+          <a:fillRef idx="1">
+            <a:schemeClr val="accent1"/>
+          </a:fillRef>
+          <a:effectRef idx="0">
+            <a:schemeClr val="accent1"/>
+          </a:effectRef>
+          <a:fontRef idx="minor">
+            <a:schemeClr val="lt1"/>
+          </a:fontRef>
+        </p:style>
+        <p:txBody>
+          <a:bodyPr rtlCol="0" anchor="ctr"/>
+          <a:lstStyle/>
+          <a:p>
+            <a:pPr algn="ctr"/>
+            <a:r>
+              <a:rPr lang="en-US" dirty="0" err="1">
+                <a:ln>
+                  <a:solidFill>
+                    <a:sysClr val="windowText" lastClr="000000"/>
+                  </a:solidFill>
+                </a:ln>
+                <a:solidFill>
+                  <a:sysClr val="windowText" lastClr="000000"/>
+                </a:solidFill>
+              </a:rPr>
+              <a:t>db_read</a:t>
+            </a:r>
+            <a:endParaRPr lang="en-IL" dirty="0">
+              <a:ln>
+                <a:solidFill>
+                  <a:sysClr val="windowText" lastClr="000000"/>
+                </a:solidFill>
+              </a:ln>
+              <a:solidFill>
+                <a:sysClr val="windowText" lastClr="000000"/>
+              </a:solidFill>
+            </a:endParaRPr>
+          </a:p>
+        </p:txBody>
+      </p:sp>
+      <p:sp>
+        <p:nvSpPr>
+          <p:cNvPr id="34" name="Flowchart: Terminator 33">
+            <a:extLst>
+              <a:ext uri="{FF2B5EF4-FFF2-40B4-BE49-F238E27FC236}">
+                <a16:creationId xmlns:a16="http://schemas.microsoft.com/office/drawing/2014/main" id="{ADEFD05F-1F3A-4006-B5DA-4CAD4746432D}"/>
+              </a:ext>
+            </a:extLst>
+          </p:cNvPr>
+          <p:cNvSpPr/>
+          <p:nvPr/>
+        </p:nvSpPr>
+        <p:spPr>
+          <a:xfrm>
+            <a:off x="5848937" y="2021464"/>
+            <a:ext cx="2312184" cy="543807"/>
+          </a:xfrm>
+          <a:prstGeom prst="flowChartTerminator">
+            <a:avLst/>
+          </a:prstGeom>
+          <a:solidFill>
+            <a:schemeClr val="bg2"/>
+          </a:solidFill>
+          <a:ln>
+            <a:solidFill>
+              <a:schemeClr val="tx1"/>
+            </a:solidFill>
+          </a:ln>
+        </p:spPr>
+        <p:style>
+          <a:lnRef idx="2">
+            <a:schemeClr val="accent1">
+              <a:shade val="50000"/>
+            </a:schemeClr>
+          </a:lnRef>
+          <a:fillRef idx="1">
+            <a:schemeClr val="accent1"/>
+          </a:fillRef>
+          <a:effectRef idx="0">
+            <a:schemeClr val="accent1"/>
+          </a:effectRef>
+          <a:fontRef idx="minor">
+            <a:schemeClr val="lt1"/>
+          </a:fontRef>
+        </p:style>
+        <p:txBody>
+          <a:bodyPr rtlCol="0" anchor="ctr"/>
+          <a:lstStyle/>
+          <a:p>
+            <a:pPr algn="ctr"/>
+            <a:r>
+              <a:rPr lang="en-US" dirty="0">
+                <a:ln>
+                  <a:solidFill>
+                    <a:sysClr val="windowText" lastClr="000000"/>
+                  </a:solidFill>
+                </a:ln>
+                <a:solidFill>
+                  <a:sysClr val="windowText" lastClr="000000"/>
+                </a:solidFill>
+              </a:rPr>
+              <a:t>amazon</a:t>
+            </a:r>
+            <a:endParaRPr lang="en-IL" dirty="0">
+              <a:ln>
+                <a:solidFill>
+                  <a:sysClr val="windowText" lastClr="000000"/>
+                </a:solidFill>
+              </a:ln>
+              <a:solidFill>
+                <a:sysClr val="windowText" lastClr="000000"/>
+              </a:solidFill>
+            </a:endParaRPr>
+          </a:p>
+        </p:txBody>
+      </p:sp>
+      <p:sp>
+        <p:nvSpPr>
+          <p:cNvPr id="35" name="Flowchart: Terminator 34">
+            <a:extLst>
+              <a:ext uri="{FF2B5EF4-FFF2-40B4-BE49-F238E27FC236}">
+                <a16:creationId xmlns:a16="http://schemas.microsoft.com/office/drawing/2014/main" id="{E77BE89C-D2B5-47D5-B768-A220F80FC6D4}"/>
+              </a:ext>
+            </a:extLst>
+          </p:cNvPr>
+          <p:cNvSpPr/>
+          <p:nvPr/>
+        </p:nvSpPr>
+        <p:spPr>
+          <a:xfrm>
+            <a:off x="5848937" y="3423333"/>
+            <a:ext cx="2312184" cy="543807"/>
+          </a:xfrm>
+          <a:prstGeom prst="flowChartTerminator">
+            <a:avLst/>
+          </a:prstGeom>
+          <a:solidFill>
+            <a:schemeClr val="bg2"/>
+          </a:solidFill>
+          <a:ln>
+            <a:solidFill>
+              <a:schemeClr val="tx1"/>
+            </a:solidFill>
+          </a:ln>
+        </p:spPr>
+        <p:style>
+          <a:lnRef idx="2">
+            <a:schemeClr val="accent1">
+              <a:shade val="50000"/>
+            </a:schemeClr>
+          </a:lnRef>
+          <a:fillRef idx="1">
+            <a:schemeClr val="accent1"/>
+          </a:fillRef>
+          <a:effectRef idx="0">
+            <a:schemeClr val="accent1"/>
+          </a:effectRef>
+          <a:fontRef idx="minor">
+            <a:schemeClr val="lt1"/>
+          </a:fontRef>
+        </p:style>
+        <p:txBody>
+          <a:bodyPr rtlCol="0" anchor="ctr"/>
+          <a:lstStyle/>
+          <a:p>
+            <a:pPr algn="ctr"/>
+            <a:r>
+              <a:rPr lang="en-US" dirty="0" err="1">
+                <a:ln>
+                  <a:solidFill>
+                    <a:sysClr val="windowText" lastClr="000000"/>
+                  </a:solidFill>
+                </a:ln>
+                <a:solidFill>
+                  <a:sysClr val="windowText" lastClr="000000"/>
+                </a:solidFill>
+              </a:rPr>
+              <a:t>walmart</a:t>
+            </a:r>
+            <a:endParaRPr lang="en-IL" dirty="0">
+              <a:ln>
+                <a:solidFill>
+                  <a:sysClr val="windowText" lastClr="000000"/>
+                </a:solidFill>
+              </a:ln>
+              <a:solidFill>
+                <a:sysClr val="windowText" lastClr="000000"/>
+              </a:solidFill>
+            </a:endParaRPr>
+          </a:p>
+        </p:txBody>
+      </p:sp>
+      <p:sp>
+        <p:nvSpPr>
+          <p:cNvPr id="36" name="Flowchart: Terminator 35">
+            <a:extLst>
+              <a:ext uri="{FF2B5EF4-FFF2-40B4-BE49-F238E27FC236}">
+                <a16:creationId xmlns:a16="http://schemas.microsoft.com/office/drawing/2014/main" id="{B969C337-1019-4AC8-B379-EA75C5202D06}"/>
+              </a:ext>
+            </a:extLst>
+          </p:cNvPr>
+          <p:cNvSpPr/>
+          <p:nvPr/>
+        </p:nvSpPr>
+        <p:spPr>
+          <a:xfrm>
+            <a:off x="5848937" y="4890224"/>
+            <a:ext cx="2312184" cy="543807"/>
+          </a:xfrm>
+          <a:prstGeom prst="flowChartTerminator">
+            <a:avLst/>
+          </a:prstGeom>
+          <a:solidFill>
+            <a:schemeClr val="bg2"/>
+          </a:solidFill>
+          <a:ln>
+            <a:solidFill>
+              <a:schemeClr val="tx1"/>
+            </a:solidFill>
+          </a:ln>
+        </p:spPr>
+        <p:style>
+          <a:lnRef idx="2">
+            <a:schemeClr val="accent1">
+              <a:shade val="50000"/>
+            </a:schemeClr>
+          </a:lnRef>
+          <a:fillRef idx="1">
+            <a:schemeClr val="accent1"/>
+          </a:fillRef>
+          <a:effectRef idx="0">
+            <a:schemeClr val="accent1"/>
+          </a:effectRef>
+          <a:fontRef idx="minor">
+            <a:schemeClr val="lt1"/>
+          </a:fontRef>
+        </p:style>
+        <p:txBody>
+          <a:bodyPr rtlCol="0" anchor="ctr"/>
+          <a:lstStyle/>
+          <a:p>
+            <a:pPr algn="ctr"/>
+            <a:r>
+              <a:rPr lang="en-US" dirty="0" err="1">
+                <a:ln>
+                  <a:solidFill>
+                    <a:sysClr val="windowText" lastClr="000000"/>
+                  </a:solidFill>
+                </a:ln>
+                <a:solidFill>
+                  <a:sysClr val="windowText" lastClr="000000"/>
+                </a:solidFill>
+              </a:rPr>
+              <a:t>db_write</a:t>
+            </a:r>
+            <a:endParaRPr lang="en-IL" dirty="0">
+              <a:ln>
+                <a:solidFill>
+                  <a:sysClr val="windowText" lastClr="000000"/>
+                </a:solidFill>
+              </a:ln>
+              <a:solidFill>
+                <a:sysClr val="windowText" lastClr="000000"/>
+              </a:solidFill>
+            </a:endParaRPr>
+          </a:p>
+        </p:txBody>
+      </p:sp>
+      <p:sp>
+        <p:nvSpPr>
+          <p:cNvPr id="38" name="Hexagon 37">
+            <a:extLst>
+              <a:ext uri="{FF2B5EF4-FFF2-40B4-BE49-F238E27FC236}">
+                <a16:creationId xmlns:a16="http://schemas.microsoft.com/office/drawing/2014/main" id="{F97F0229-2421-42AE-A3D1-57F08C159D94}"/>
+              </a:ext>
+            </a:extLst>
+          </p:cNvPr>
+          <p:cNvSpPr/>
+          <p:nvPr/>
+        </p:nvSpPr>
+        <p:spPr>
+          <a:xfrm>
+            <a:off x="2190564" y="2637615"/>
+            <a:ext cx="1789687" cy="1685127"/>
+          </a:xfrm>
+          <a:prstGeom prst="hexagon">
+            <a:avLst/>
+          </a:prstGeom>
+          <a:solidFill>
+            <a:schemeClr val="bg2"/>
+          </a:solidFill>
+          <a:ln w="38100">
+            <a:solidFill>
+              <a:schemeClr val="accent1"/>
+            </a:solidFill>
+          </a:ln>
+        </p:spPr>
+        <p:style>
+          <a:lnRef idx="2">
+            <a:schemeClr val="accent1">
+              <a:shade val="50000"/>
+            </a:schemeClr>
+          </a:lnRef>
+          <a:fillRef idx="1">
+            <a:schemeClr val="accent1"/>
+          </a:fillRef>
+          <a:effectRef idx="0">
+            <a:schemeClr val="accent1"/>
+          </a:effectRef>
+          <a:fontRef idx="minor">
+            <a:schemeClr val="lt1"/>
+          </a:fontRef>
+        </p:style>
+        <p:txBody>
+          <a:bodyPr rtlCol="0" anchor="ctr"/>
+          <a:lstStyle/>
+          <a:p>
+            <a:pPr algn="ctr"/>
+            <a:r>
+              <a:rPr lang="en-US" sz="2800" dirty="0">
+                <a:ln>
+                  <a:solidFill>
+                    <a:sysClr val="windowText" lastClr="000000"/>
+                  </a:solidFill>
+                </a:ln>
+                <a:solidFill>
+                  <a:sysClr val="windowText" lastClr="000000"/>
+                </a:solidFill>
+              </a:rPr>
+              <a:t>RabbitMQ</a:t>
+            </a:r>
+            <a:endParaRPr lang="en-IL" sz="2800" dirty="0">
+              <a:ln>
+                <a:solidFill>
+                  <a:sysClr val="windowText" lastClr="000000"/>
+                </a:solidFill>
+              </a:ln>
+              <a:solidFill>
+                <a:sysClr val="windowText" lastClr="000000"/>
+              </a:solidFill>
+            </a:endParaRPr>
+          </a:p>
+        </p:txBody>
+      </p:sp>
+      <p:sp>
+        <p:nvSpPr>
+          <p:cNvPr id="39" name="Diamond 38">
+            <a:extLst>
+              <a:ext uri="{FF2B5EF4-FFF2-40B4-BE49-F238E27FC236}">
+                <a16:creationId xmlns:a16="http://schemas.microsoft.com/office/drawing/2014/main" id="{B5BD084D-AD2D-42A4-948E-F41801EFAF41}"/>
+              </a:ext>
+            </a:extLst>
+          </p:cNvPr>
+          <p:cNvSpPr/>
+          <p:nvPr/>
+        </p:nvSpPr>
+        <p:spPr>
+          <a:xfrm>
+            <a:off x="69620" y="2626494"/>
+            <a:ext cx="1663644" cy="1671700"/>
+          </a:xfrm>
+          <a:prstGeom prst="diamond">
+            <a:avLst/>
+          </a:prstGeom>
+          <a:solidFill>
+            <a:schemeClr val="bg2"/>
+          </a:solidFill>
+          <a:ln w="28575">
+            <a:solidFill>
+              <a:schemeClr val="accent1"/>
+            </a:solidFill>
+          </a:ln>
+        </p:spPr>
+        <p:style>
+          <a:lnRef idx="2">
+            <a:schemeClr val="accent1">
+              <a:shade val="50000"/>
+            </a:schemeClr>
+          </a:lnRef>
+          <a:fillRef idx="1">
+            <a:schemeClr val="accent1"/>
+          </a:fillRef>
+          <a:effectRef idx="0">
+            <a:schemeClr val="accent1"/>
+          </a:effectRef>
+          <a:fontRef idx="minor">
+            <a:schemeClr val="lt1"/>
+          </a:fontRef>
+        </p:style>
+        <p:txBody>
+          <a:bodyPr rtlCol="0" anchor="ctr"/>
+          <a:lstStyle/>
+          <a:p>
+            <a:pPr algn="ctr"/>
+            <a:r>
+              <a:rPr lang="en-US" sz="2800" dirty="0">
+                <a:ln>
+                  <a:solidFill>
+                    <a:sysClr val="windowText" lastClr="000000"/>
+                  </a:solidFill>
+                </a:ln>
+                <a:solidFill>
+                  <a:sysClr val="windowText" lastClr="000000"/>
+                </a:solidFill>
+              </a:rPr>
+              <a:t>API</a:t>
+            </a:r>
+            <a:endParaRPr lang="en-IL" sz="2800" dirty="0">
+              <a:ln>
+                <a:solidFill>
+                  <a:sysClr val="windowText" lastClr="000000"/>
+                </a:solidFill>
+              </a:ln>
+              <a:solidFill>
+                <a:sysClr val="windowText" lastClr="000000"/>
+              </a:solidFill>
+            </a:endParaRPr>
+          </a:p>
+        </p:txBody>
+      </p:sp>
+      <p:sp>
+        <p:nvSpPr>
+          <p:cNvPr id="40" name="Diamond 39">
+            <a:extLst>
+              <a:ext uri="{FF2B5EF4-FFF2-40B4-BE49-F238E27FC236}">
+                <a16:creationId xmlns:a16="http://schemas.microsoft.com/office/drawing/2014/main" id="{50E7BEFB-FB41-4831-A19B-88E5805EFF16}"/>
+              </a:ext>
+            </a:extLst>
+          </p:cNvPr>
+          <p:cNvSpPr/>
+          <p:nvPr/>
+        </p:nvSpPr>
+        <p:spPr>
+          <a:xfrm>
+            <a:off x="9914575" y="4674716"/>
+            <a:ext cx="1006255" cy="974824"/>
+          </a:xfrm>
+          <a:prstGeom prst="diamond">
+            <a:avLst/>
+          </a:prstGeom>
+          <a:solidFill>
+            <a:schemeClr val="bg2"/>
+          </a:solidFill>
+          <a:ln w="28575">
+            <a:solidFill>
+              <a:schemeClr val="accent1"/>
+            </a:solidFill>
+          </a:ln>
+        </p:spPr>
+        <p:style>
+          <a:lnRef idx="2">
+            <a:schemeClr val="accent1">
+              <a:shade val="50000"/>
+            </a:schemeClr>
+          </a:lnRef>
+          <a:fillRef idx="1">
+            <a:schemeClr val="accent1"/>
+          </a:fillRef>
+          <a:effectRef idx="0">
+            <a:schemeClr val="accent1"/>
+          </a:effectRef>
+          <a:fontRef idx="minor">
+            <a:schemeClr val="lt1"/>
+          </a:fontRef>
+        </p:style>
+        <p:txBody>
+          <a:bodyPr rtlCol="0" anchor="ctr"/>
+          <a:lstStyle/>
+          <a:p>
+            <a:pPr algn="ctr"/>
+            <a:r>
+              <a:rPr lang="en-US" sz="1050" dirty="0">
+                <a:ln>
+                  <a:solidFill>
+                    <a:sysClr val="windowText" lastClr="000000"/>
+                  </a:solidFill>
+                </a:ln>
+                <a:solidFill>
+                  <a:sysClr val="windowText" lastClr="000000"/>
+                </a:solidFill>
+              </a:rPr>
+              <a:t>DB </a:t>
+            </a:r>
+          </a:p>
+          <a:p>
+            <a:pPr algn="ctr"/>
+            <a:r>
+              <a:rPr lang="en-US" sz="1050" dirty="0">
+                <a:ln>
+                  <a:solidFill>
+                    <a:srgbClr val="FF0000"/>
+                  </a:solidFill>
+                </a:ln>
+                <a:solidFill>
+                  <a:srgbClr val="FF0000"/>
+                </a:solidFill>
+              </a:rPr>
+              <a:t>Write</a:t>
+            </a:r>
+            <a:endParaRPr lang="en-IL" sz="1050" dirty="0">
+              <a:ln>
+                <a:solidFill>
+                  <a:srgbClr val="FF0000"/>
+                </a:solidFill>
+              </a:ln>
+              <a:solidFill>
+                <a:srgbClr val="FF0000"/>
+              </a:solidFill>
+            </a:endParaRPr>
+          </a:p>
+        </p:txBody>
+      </p:sp>
+      <p:sp>
+        <p:nvSpPr>
+          <p:cNvPr id="41" name="Diamond 40">
+            <a:extLst>
+              <a:ext uri="{FF2B5EF4-FFF2-40B4-BE49-F238E27FC236}">
+                <a16:creationId xmlns:a16="http://schemas.microsoft.com/office/drawing/2014/main" id="{2B9B207C-3EC0-46B2-9691-A337E1AA1395}"/>
+              </a:ext>
+            </a:extLst>
+          </p:cNvPr>
+          <p:cNvSpPr>
+            <a:spLocks noChangeAspect="1"/>
+          </p:cNvSpPr>
+          <p:nvPr/>
+        </p:nvSpPr>
+        <p:spPr>
+          <a:xfrm>
+            <a:off x="9760909" y="3050185"/>
+            <a:ext cx="1313588" cy="1272557"/>
+          </a:xfrm>
+          <a:prstGeom prst="diamond">
+            <a:avLst/>
+          </a:prstGeom>
+          <a:solidFill>
+            <a:schemeClr val="bg2"/>
+          </a:solidFill>
+          <a:ln w="28575">
+            <a:solidFill>
+              <a:schemeClr val="accent1"/>
+            </a:solidFill>
+          </a:ln>
+        </p:spPr>
+        <p:style>
+          <a:lnRef idx="2">
+            <a:schemeClr val="accent1">
+              <a:shade val="50000"/>
+            </a:schemeClr>
+          </a:lnRef>
+          <a:fillRef idx="1">
+            <a:schemeClr val="accent1"/>
+          </a:fillRef>
+          <a:effectRef idx="0">
+            <a:schemeClr val="accent1"/>
+          </a:effectRef>
+          <a:fontRef idx="minor">
+            <a:schemeClr val="lt1"/>
+          </a:fontRef>
+        </p:style>
+        <p:txBody>
+          <a:bodyPr rtlCol="0" anchor="ctr"/>
+          <a:lstStyle/>
+          <a:p>
+            <a:pPr algn="ctr"/>
+            <a:r>
+              <a:rPr lang="en-US" sz="1050" dirty="0">
+                <a:ln>
+                  <a:solidFill>
+                    <a:sysClr val="windowText" lastClr="000000"/>
+                  </a:solidFill>
+                </a:ln>
+                <a:solidFill>
+                  <a:sysClr val="windowText" lastClr="000000"/>
+                </a:solidFill>
+              </a:rPr>
+              <a:t>Walmart fetcher</a:t>
+            </a:r>
+          </a:p>
+        </p:txBody>
+      </p:sp>
+      <p:sp>
+        <p:nvSpPr>
+          <p:cNvPr id="42" name="Diamond 41">
+            <a:extLst>
+              <a:ext uri="{FF2B5EF4-FFF2-40B4-BE49-F238E27FC236}">
+                <a16:creationId xmlns:a16="http://schemas.microsoft.com/office/drawing/2014/main" id="{C4B0506C-1675-41B4-B4FB-3C24AAFE4AAA}"/>
+              </a:ext>
+            </a:extLst>
+          </p:cNvPr>
+          <p:cNvSpPr>
+            <a:spLocks noChangeAspect="1"/>
+          </p:cNvSpPr>
+          <p:nvPr/>
+        </p:nvSpPr>
+        <p:spPr>
+          <a:xfrm>
+            <a:off x="9760909" y="1660818"/>
+            <a:ext cx="1313588" cy="1272557"/>
+          </a:xfrm>
+          <a:prstGeom prst="diamond">
+            <a:avLst/>
+          </a:prstGeom>
+          <a:solidFill>
+            <a:schemeClr val="bg2"/>
+          </a:solidFill>
+          <a:ln w="28575">
+            <a:solidFill>
+              <a:schemeClr val="accent1"/>
+            </a:solidFill>
+          </a:ln>
+        </p:spPr>
+        <p:style>
+          <a:lnRef idx="2">
+            <a:schemeClr val="accent1">
+              <a:shade val="50000"/>
+            </a:schemeClr>
+          </a:lnRef>
+          <a:fillRef idx="1">
+            <a:schemeClr val="accent1"/>
+          </a:fillRef>
+          <a:effectRef idx="0">
+            <a:schemeClr val="accent1"/>
+          </a:effectRef>
+          <a:fontRef idx="minor">
+            <a:schemeClr val="lt1"/>
+          </a:fontRef>
+        </p:style>
+        <p:txBody>
+          <a:bodyPr rtlCol="0" anchor="ctr"/>
+          <a:lstStyle/>
+          <a:p>
+            <a:pPr algn="ctr"/>
+            <a:r>
+              <a:rPr lang="en-US" sz="1050" dirty="0">
+                <a:ln>
+                  <a:solidFill>
+                    <a:sysClr val="windowText" lastClr="000000"/>
+                  </a:solidFill>
+                </a:ln>
+                <a:solidFill>
+                  <a:sysClr val="windowText" lastClr="000000"/>
+                </a:solidFill>
+              </a:rPr>
+              <a:t>Amazon fetcher</a:t>
+            </a:r>
+          </a:p>
+        </p:txBody>
+      </p:sp>
+      <p:sp>
+        <p:nvSpPr>
+          <p:cNvPr id="44" name="Diamond 43">
+            <a:extLst>
+              <a:ext uri="{FF2B5EF4-FFF2-40B4-BE49-F238E27FC236}">
+                <a16:creationId xmlns:a16="http://schemas.microsoft.com/office/drawing/2014/main" id="{94412E46-0C38-4CA1-9411-876AA9AD535F}"/>
+              </a:ext>
+            </a:extLst>
+          </p:cNvPr>
+          <p:cNvSpPr>
+            <a:spLocks noChangeAspect="1"/>
+          </p:cNvSpPr>
+          <p:nvPr/>
+        </p:nvSpPr>
+        <p:spPr>
+          <a:xfrm>
+            <a:off x="9760909" y="284147"/>
+            <a:ext cx="1313588" cy="1272557"/>
+          </a:xfrm>
+          <a:prstGeom prst="diamond">
+            <a:avLst/>
+          </a:prstGeom>
+          <a:solidFill>
+            <a:schemeClr val="bg2"/>
+          </a:solidFill>
+          <a:ln w="28575">
+            <a:solidFill>
+              <a:schemeClr val="accent1"/>
+            </a:solidFill>
+          </a:ln>
+        </p:spPr>
+        <p:style>
+          <a:lnRef idx="2">
+            <a:schemeClr val="accent1">
+              <a:shade val="50000"/>
+            </a:schemeClr>
+          </a:lnRef>
+          <a:fillRef idx="1">
+            <a:schemeClr val="accent1"/>
+          </a:fillRef>
+          <a:effectRef idx="0">
+            <a:schemeClr val="accent1"/>
+          </a:effectRef>
+          <a:fontRef idx="minor">
+            <a:schemeClr val="lt1"/>
+          </a:fontRef>
+        </p:style>
+        <p:txBody>
+          <a:bodyPr rtlCol="0" anchor="ctr"/>
+          <a:lstStyle/>
+          <a:p>
+            <a:pPr algn="ctr"/>
+            <a:r>
+              <a:rPr lang="en-US" sz="1050" dirty="0">
+                <a:ln>
+                  <a:solidFill>
+                    <a:sysClr val="windowText" lastClr="000000"/>
+                  </a:solidFill>
+                </a:ln>
+                <a:solidFill>
+                  <a:sysClr val="windowText" lastClr="000000"/>
+                </a:solidFill>
+              </a:rPr>
+              <a:t>DB</a:t>
+            </a:r>
+          </a:p>
+          <a:p>
+            <a:pPr algn="ctr"/>
+            <a:r>
+              <a:rPr lang="en-US" sz="1050" dirty="0">
+                <a:ln>
+                  <a:solidFill>
+                    <a:srgbClr val="00B0F0"/>
+                  </a:solidFill>
+                </a:ln>
+                <a:solidFill>
+                  <a:srgbClr val="00B0F0"/>
+                </a:solidFill>
+              </a:rPr>
+              <a:t>Read</a:t>
+            </a:r>
+          </a:p>
+        </p:txBody>
+      </p:sp>
+      <p:cxnSp>
+        <p:nvCxnSpPr>
+          <p:cNvPr id="17" name="Straight Arrow Connector 16">
+            <a:extLst>
+              <a:ext uri="{FF2B5EF4-FFF2-40B4-BE49-F238E27FC236}">
+                <a16:creationId xmlns:a16="http://schemas.microsoft.com/office/drawing/2014/main" id="{C40220D8-A1B3-479E-91BE-7DE36F6394AB}"/>
+              </a:ext>
+            </a:extLst>
+          </p:cNvPr>
+          <p:cNvCxnSpPr/>
+          <p:nvPr/>
+        </p:nvCxnSpPr>
+        <p:spPr>
+          <a:xfrm>
+            <a:off x="1417021" y="3164810"/>
+            <a:ext cx="1012042" cy="0"/>
+          </a:xfrm>
+          <a:prstGeom prst="straightConnector1">
+            <a:avLst/>
+          </a:prstGeom>
+          <a:ln w="57150">
+            <a:solidFill>
+              <a:srgbClr val="00B0F0"/>
+            </a:solidFill>
+            <a:tailEnd type="triangle"/>
+          </a:ln>
+        </p:spPr>
+        <p:style>
+          <a:lnRef idx="1">
+            <a:schemeClr val="accent1"/>
+          </a:lnRef>
+          <a:fillRef idx="0">
+            <a:schemeClr val="accent1"/>
+          </a:fillRef>
+          <a:effectRef idx="0">
+            <a:schemeClr val="accent1"/>
+          </a:effectRef>
+          <a:fontRef idx="minor">
+            <a:schemeClr val="tx1"/>
+          </a:fontRef>
+        </p:style>
+      </p:cxnSp>
+      <p:cxnSp>
+        <p:nvCxnSpPr>
+          <p:cNvPr id="54" name="Straight Arrow Connector 53">
+            <a:extLst>
+              <a:ext uri="{FF2B5EF4-FFF2-40B4-BE49-F238E27FC236}">
+                <a16:creationId xmlns:a16="http://schemas.microsoft.com/office/drawing/2014/main" id="{3BB83265-0575-4DAF-A277-BE5A9C6A8144}"/>
+              </a:ext>
+            </a:extLst>
+          </p:cNvPr>
+          <p:cNvCxnSpPr>
+            <a:cxnSpLocks/>
+            <a:stCxn id="38" idx="5"/>
+            <a:endCxn id="6" idx="1"/>
+          </p:cNvCxnSpPr>
+          <p:nvPr/>
+        </p:nvCxnSpPr>
+        <p:spPr>
+          <a:xfrm flipV="1">
+            <a:off x="3558969" y="920425"/>
+            <a:ext cx="2289968" cy="1717190"/>
+          </a:xfrm>
+          <a:prstGeom prst="straightConnector1">
+            <a:avLst/>
+          </a:prstGeom>
+          <a:ln w="57150">
+            <a:solidFill>
+              <a:srgbClr val="00B0F0"/>
+            </a:solidFill>
+            <a:tailEnd type="triangle"/>
+          </a:ln>
+        </p:spPr>
+        <p:style>
+          <a:lnRef idx="1">
+            <a:schemeClr val="accent1"/>
+          </a:lnRef>
+          <a:fillRef idx="0">
+            <a:schemeClr val="accent1"/>
+          </a:fillRef>
+          <a:effectRef idx="0">
+            <a:schemeClr val="accent1"/>
+          </a:effectRef>
+          <a:fontRef idx="minor">
+            <a:schemeClr val="tx1"/>
+          </a:fontRef>
+        </p:style>
+      </p:cxnSp>
+      <p:cxnSp>
+        <p:nvCxnSpPr>
+          <p:cNvPr id="55" name="Straight Arrow Connector 54">
+            <a:extLst>
+              <a:ext uri="{FF2B5EF4-FFF2-40B4-BE49-F238E27FC236}">
+                <a16:creationId xmlns:a16="http://schemas.microsoft.com/office/drawing/2014/main" id="{26362111-ECB1-4622-8E56-547952D85616}"/>
+              </a:ext>
+            </a:extLst>
+          </p:cNvPr>
+          <p:cNvCxnSpPr>
+            <a:cxnSpLocks/>
+            <a:stCxn id="38" idx="5"/>
+            <a:endCxn id="35" idx="1"/>
+          </p:cNvCxnSpPr>
+          <p:nvPr/>
+        </p:nvCxnSpPr>
+        <p:spPr>
+          <a:xfrm>
+            <a:off x="3558969" y="2637615"/>
+            <a:ext cx="2289968" cy="1057622"/>
+          </a:xfrm>
+          <a:prstGeom prst="straightConnector1">
+            <a:avLst/>
+          </a:prstGeom>
+          <a:ln w="57150">
+            <a:solidFill>
+              <a:schemeClr val="accent1">
+                <a:lumMod val="60000"/>
+                <a:lumOff val="40000"/>
+              </a:schemeClr>
+            </a:solidFill>
+            <a:tailEnd type="triangle"/>
+          </a:ln>
+        </p:spPr>
+        <p:style>
+          <a:lnRef idx="1">
+            <a:schemeClr val="accent1"/>
+          </a:lnRef>
+          <a:fillRef idx="0">
+            <a:schemeClr val="accent1"/>
+          </a:fillRef>
+          <a:effectRef idx="0">
+            <a:schemeClr val="accent1"/>
+          </a:effectRef>
+          <a:fontRef idx="minor">
+            <a:schemeClr val="tx1"/>
+          </a:fontRef>
+        </p:style>
+      </p:cxnSp>
+      <p:cxnSp>
+        <p:nvCxnSpPr>
+          <p:cNvPr id="58" name="Straight Arrow Connector 57">
+            <a:extLst>
+              <a:ext uri="{FF2B5EF4-FFF2-40B4-BE49-F238E27FC236}">
+                <a16:creationId xmlns:a16="http://schemas.microsoft.com/office/drawing/2014/main" id="{4B03D009-8178-4BCE-A51D-764DE726AA9C}"/>
+              </a:ext>
+            </a:extLst>
+          </p:cNvPr>
+          <p:cNvCxnSpPr>
+            <a:cxnSpLocks/>
+            <a:stCxn id="38" idx="5"/>
+            <a:endCxn id="34" idx="1"/>
+          </p:cNvCxnSpPr>
+          <p:nvPr/>
+        </p:nvCxnSpPr>
+        <p:spPr>
+          <a:xfrm flipV="1">
+            <a:off x="3558969" y="2293368"/>
+            <a:ext cx="2289968" cy="344247"/>
+          </a:xfrm>
+          <a:prstGeom prst="straightConnector1">
+            <a:avLst/>
+          </a:prstGeom>
+          <a:ln w="57150">
+            <a:solidFill>
+              <a:schemeClr val="accent5">
+                <a:lumMod val="75000"/>
+              </a:schemeClr>
+            </a:solidFill>
+            <a:tailEnd type="triangle"/>
+          </a:ln>
+        </p:spPr>
+        <p:style>
+          <a:lnRef idx="1">
+            <a:schemeClr val="accent1"/>
+          </a:lnRef>
+          <a:fillRef idx="0">
+            <a:schemeClr val="accent1"/>
+          </a:fillRef>
+          <a:effectRef idx="0">
+            <a:schemeClr val="accent1"/>
+          </a:effectRef>
+          <a:fontRef idx="minor">
+            <a:schemeClr val="tx1"/>
+          </a:fontRef>
+        </p:style>
+      </p:cxnSp>
+      <p:sp>
+        <p:nvSpPr>
+          <p:cNvPr id="46" name="TextBox 45">
+            <a:extLst>
+              <a:ext uri="{FF2B5EF4-FFF2-40B4-BE49-F238E27FC236}">
+                <a16:creationId xmlns:a16="http://schemas.microsoft.com/office/drawing/2014/main" id="{80A18AB9-7BD3-49E7-BFA1-5B249546C0EF}"/>
+              </a:ext>
+            </a:extLst>
+          </p:cNvPr>
+          <p:cNvSpPr txBox="1"/>
+          <p:nvPr/>
+        </p:nvSpPr>
+        <p:spPr>
+          <a:xfrm>
+            <a:off x="5848937" y="1703645"/>
+            <a:ext cx="2476500" cy="369332"/>
+          </a:xfrm>
+          <a:prstGeom prst="rect">
+            <a:avLst/>
+          </a:prstGeom>
+          <a:noFill/>
+        </p:spPr>
+        <p:txBody>
+          <a:bodyPr wrap="square" rtlCol="0">
+            <a:spAutoFit/>
+          </a:bodyPr>
+          <a:lstStyle/>
+          <a:p>
+            <a:r>
+              <a:rPr lang="en-US" dirty="0" err="1"/>
+              <a:t>routing_key</a:t>
+            </a:r>
+            <a:r>
+              <a:rPr lang="en-US" dirty="0"/>
+              <a:t>: amazon</a:t>
+            </a:r>
+            <a:endParaRPr lang="en-IL" dirty="0"/>
+          </a:p>
+        </p:txBody>
+      </p:sp>
+      <p:sp>
+        <p:nvSpPr>
+          <p:cNvPr id="65" name="TextBox 64">
+            <a:extLst>
+              <a:ext uri="{FF2B5EF4-FFF2-40B4-BE49-F238E27FC236}">
+                <a16:creationId xmlns:a16="http://schemas.microsoft.com/office/drawing/2014/main" id="{AEA5426B-8875-46C6-AC55-C8CE8E59E7E2}"/>
+              </a:ext>
+            </a:extLst>
+          </p:cNvPr>
+          <p:cNvSpPr txBox="1"/>
+          <p:nvPr/>
+        </p:nvSpPr>
+        <p:spPr>
+          <a:xfrm>
+            <a:off x="5848937" y="3093012"/>
+            <a:ext cx="2476500" cy="369332"/>
+          </a:xfrm>
+          <a:prstGeom prst="rect">
+            <a:avLst/>
+          </a:prstGeom>
+          <a:noFill/>
+        </p:spPr>
+        <p:txBody>
+          <a:bodyPr wrap="square" rtlCol="0">
+            <a:spAutoFit/>
+          </a:bodyPr>
+          <a:lstStyle/>
+          <a:p>
+            <a:r>
+              <a:rPr lang="en-US" dirty="0" err="1"/>
+              <a:t>routing_key</a:t>
+            </a:r>
+            <a:r>
+              <a:rPr lang="en-US" dirty="0"/>
+              <a:t>: </a:t>
+            </a:r>
+            <a:r>
+              <a:rPr lang="en-US" dirty="0" err="1"/>
+              <a:t>walmart</a:t>
+            </a:r>
+            <a:endParaRPr lang="en-IL" dirty="0"/>
+          </a:p>
+        </p:txBody>
+      </p:sp>
+      <p:sp>
+        <p:nvSpPr>
+          <p:cNvPr id="66" name="TextBox 65">
+            <a:extLst>
+              <a:ext uri="{FF2B5EF4-FFF2-40B4-BE49-F238E27FC236}">
+                <a16:creationId xmlns:a16="http://schemas.microsoft.com/office/drawing/2014/main" id="{CA6F6126-A68C-41AE-AED0-31EC5B599374}"/>
+              </a:ext>
+            </a:extLst>
+          </p:cNvPr>
+          <p:cNvSpPr txBox="1"/>
+          <p:nvPr/>
+        </p:nvSpPr>
+        <p:spPr>
+          <a:xfrm>
+            <a:off x="5947971" y="69697"/>
+            <a:ext cx="2476500" cy="646331"/>
+          </a:xfrm>
+          <a:prstGeom prst="rect">
+            <a:avLst/>
+          </a:prstGeom>
+          <a:noFill/>
+        </p:spPr>
+        <p:txBody>
+          <a:bodyPr wrap="square" rtlCol="0">
+            <a:spAutoFit/>
+          </a:bodyPr>
+          <a:lstStyle/>
+          <a:p>
+            <a:r>
+              <a:rPr lang="en-US" sz="1200" dirty="0" err="1"/>
+              <a:t>routing_keys</a:t>
+            </a:r>
+            <a:r>
+              <a:rPr lang="en-US" sz="1200" dirty="0"/>
+              <a:t>: </a:t>
+            </a:r>
+          </a:p>
+          <a:p>
+            <a:r>
+              <a:rPr lang="en-US" sz="1200" dirty="0"/>
+              <a:t>	</a:t>
+            </a:r>
+            <a:r>
+              <a:rPr lang="en-US" sz="1200" dirty="0" err="1"/>
+              <a:t>walmart</a:t>
+            </a:r>
+            <a:br>
+              <a:rPr lang="en-US" sz="1200" dirty="0"/>
+            </a:br>
+            <a:r>
+              <a:rPr lang="en-US" sz="1200" dirty="0"/>
+              <a:t>	amazon</a:t>
+            </a:r>
+          </a:p>
+        </p:txBody>
+      </p:sp>
+      <p:cxnSp>
+        <p:nvCxnSpPr>
+          <p:cNvPr id="49" name="Straight Arrow Connector 48">
+            <a:extLst>
+              <a:ext uri="{FF2B5EF4-FFF2-40B4-BE49-F238E27FC236}">
+                <a16:creationId xmlns:a16="http://schemas.microsoft.com/office/drawing/2014/main" id="{93A68A37-415F-49FB-9957-9FD324DACBCD}"/>
+              </a:ext>
+            </a:extLst>
+          </p:cNvPr>
+          <p:cNvCxnSpPr>
+            <a:stCxn id="6" idx="3"/>
+            <a:endCxn id="44" idx="1"/>
+          </p:cNvCxnSpPr>
+          <p:nvPr/>
+        </p:nvCxnSpPr>
+        <p:spPr>
+          <a:xfrm>
+            <a:off x="8161121" y="920425"/>
+            <a:ext cx="1599788" cy="1"/>
+          </a:xfrm>
+          <a:prstGeom prst="straightConnector1">
+            <a:avLst/>
+          </a:prstGeom>
+          <a:ln w="38100">
+            <a:solidFill>
+              <a:schemeClr val="tx1"/>
+            </a:solidFill>
+            <a:headEnd type="none" w="med" len="med"/>
+            <a:tailEnd type="triangle" w="med" len="med"/>
+          </a:ln>
+        </p:spPr>
+        <p:style>
+          <a:lnRef idx="1">
+            <a:schemeClr val="accent1"/>
+          </a:lnRef>
+          <a:fillRef idx="0">
+            <a:schemeClr val="accent1"/>
+          </a:fillRef>
+          <a:effectRef idx="0">
+            <a:schemeClr val="accent1"/>
+          </a:effectRef>
+          <a:fontRef idx="minor">
+            <a:schemeClr val="tx1"/>
+          </a:fontRef>
+        </p:style>
+      </p:cxnSp>
+      <p:cxnSp>
+        <p:nvCxnSpPr>
+          <p:cNvPr id="69" name="Straight Arrow Connector 68">
+            <a:extLst>
+              <a:ext uri="{FF2B5EF4-FFF2-40B4-BE49-F238E27FC236}">
+                <a16:creationId xmlns:a16="http://schemas.microsoft.com/office/drawing/2014/main" id="{2435F4C7-CF7A-406C-A4E9-B4DF89F47DB2}"/>
+              </a:ext>
+            </a:extLst>
+          </p:cNvPr>
+          <p:cNvCxnSpPr>
+            <a:cxnSpLocks/>
+            <a:stCxn id="34" idx="3"/>
+            <a:endCxn id="42" idx="1"/>
+          </p:cNvCxnSpPr>
+          <p:nvPr/>
+        </p:nvCxnSpPr>
+        <p:spPr>
+          <a:xfrm>
+            <a:off x="8161121" y="2293368"/>
+            <a:ext cx="1599788" cy="3729"/>
+          </a:xfrm>
+          <a:prstGeom prst="straightConnector1">
+            <a:avLst/>
+          </a:prstGeom>
+          <a:ln w="38100">
+            <a:solidFill>
+              <a:schemeClr val="tx1"/>
+            </a:solidFill>
+            <a:headEnd type="none" w="med" len="med"/>
+            <a:tailEnd type="triangle" w="med" len="med"/>
+          </a:ln>
+        </p:spPr>
+        <p:style>
+          <a:lnRef idx="1">
+            <a:schemeClr val="accent1"/>
+          </a:lnRef>
+          <a:fillRef idx="0">
+            <a:schemeClr val="accent1"/>
+          </a:fillRef>
+          <a:effectRef idx="0">
+            <a:schemeClr val="accent1"/>
+          </a:effectRef>
+          <a:fontRef idx="minor">
+            <a:schemeClr val="tx1"/>
+          </a:fontRef>
+        </p:style>
+      </p:cxnSp>
+      <p:cxnSp>
+        <p:nvCxnSpPr>
+          <p:cNvPr id="72" name="Straight Arrow Connector 71">
+            <a:extLst>
+              <a:ext uri="{FF2B5EF4-FFF2-40B4-BE49-F238E27FC236}">
+                <a16:creationId xmlns:a16="http://schemas.microsoft.com/office/drawing/2014/main" id="{7AA12554-1604-4EFD-B638-3C20FDD82402}"/>
+              </a:ext>
+            </a:extLst>
+          </p:cNvPr>
+          <p:cNvCxnSpPr>
+            <a:cxnSpLocks/>
+            <a:stCxn id="35" idx="3"/>
+            <a:endCxn id="41" idx="1"/>
+          </p:cNvCxnSpPr>
+          <p:nvPr/>
+        </p:nvCxnSpPr>
+        <p:spPr>
+          <a:xfrm flipV="1">
+            <a:off x="8161121" y="3686464"/>
+            <a:ext cx="1599788" cy="8773"/>
+          </a:xfrm>
+          <a:prstGeom prst="straightConnector1">
+            <a:avLst/>
+          </a:prstGeom>
+          <a:ln w="38100">
+            <a:solidFill>
+              <a:schemeClr val="tx1"/>
+            </a:solidFill>
+            <a:headEnd type="none" w="med" len="med"/>
+            <a:tailEnd type="triangle" w="med" len="med"/>
+          </a:ln>
+        </p:spPr>
+        <p:style>
+          <a:lnRef idx="1">
+            <a:schemeClr val="accent1"/>
+          </a:lnRef>
+          <a:fillRef idx="0">
+            <a:schemeClr val="accent1"/>
+          </a:fillRef>
+          <a:effectRef idx="0">
+            <a:schemeClr val="accent1"/>
+          </a:effectRef>
+          <a:fontRef idx="minor">
+            <a:schemeClr val="tx1"/>
+          </a:fontRef>
+        </p:style>
+      </p:cxnSp>
+      <p:cxnSp>
+        <p:nvCxnSpPr>
+          <p:cNvPr id="80" name="Straight Arrow Connector 79">
+            <a:extLst>
+              <a:ext uri="{FF2B5EF4-FFF2-40B4-BE49-F238E27FC236}">
+                <a16:creationId xmlns:a16="http://schemas.microsoft.com/office/drawing/2014/main" id="{2A468FB9-2883-4E8F-96AA-376C97EC54BE}"/>
+              </a:ext>
+            </a:extLst>
+          </p:cNvPr>
+          <p:cNvCxnSpPr>
+            <a:cxnSpLocks/>
+            <a:stCxn id="36" idx="1"/>
+            <a:endCxn id="38" idx="1"/>
+          </p:cNvCxnSpPr>
+          <p:nvPr/>
+        </p:nvCxnSpPr>
+        <p:spPr>
+          <a:xfrm flipH="1" flipV="1">
+            <a:off x="3558969" y="4322742"/>
+            <a:ext cx="2289968" cy="839386"/>
+          </a:xfrm>
+          <a:prstGeom prst="straightConnector1">
+            <a:avLst/>
+          </a:prstGeom>
+          <a:ln w="57150">
+            <a:solidFill>
+              <a:srgbClr val="C00000"/>
+            </a:solidFill>
+            <a:headEnd type="triangle" w="med" len="med"/>
+            <a:tailEnd type="none" w="med" len="med"/>
+          </a:ln>
+        </p:spPr>
+        <p:style>
+          <a:lnRef idx="1">
+            <a:schemeClr val="accent1"/>
+          </a:lnRef>
+          <a:fillRef idx="0">
+            <a:schemeClr val="accent1"/>
+          </a:fillRef>
+          <a:effectRef idx="0">
+            <a:schemeClr val="accent1"/>
+          </a:effectRef>
+          <a:fontRef idx="minor">
+            <a:schemeClr val="tx1"/>
+          </a:fontRef>
+        </p:style>
+      </p:cxnSp>
+      <p:cxnSp>
+        <p:nvCxnSpPr>
+          <p:cNvPr id="87" name="Straight Arrow Connector 86">
+            <a:extLst>
+              <a:ext uri="{FF2B5EF4-FFF2-40B4-BE49-F238E27FC236}">
+                <a16:creationId xmlns:a16="http://schemas.microsoft.com/office/drawing/2014/main" id="{BC15D763-604F-4249-BBEC-4C128B509249}"/>
+              </a:ext>
+            </a:extLst>
+          </p:cNvPr>
+          <p:cNvCxnSpPr>
+            <a:cxnSpLocks/>
+            <a:stCxn id="36" idx="3"/>
+            <a:endCxn id="40" idx="1"/>
+          </p:cNvCxnSpPr>
+          <p:nvPr/>
+        </p:nvCxnSpPr>
+        <p:spPr>
+          <a:xfrm>
+            <a:off x="8161121" y="5162128"/>
+            <a:ext cx="1753454" cy="0"/>
+          </a:xfrm>
+          <a:prstGeom prst="straightConnector1">
+            <a:avLst/>
+          </a:prstGeom>
+          <a:ln w="38100">
+            <a:solidFill>
+              <a:schemeClr val="tx1"/>
+            </a:solidFill>
+            <a:headEnd type="none" w="med" len="med"/>
+            <a:tailEnd type="triangle" w="med" len="med"/>
+          </a:ln>
+        </p:spPr>
+        <p:style>
+          <a:lnRef idx="1">
+            <a:schemeClr val="accent1"/>
+          </a:lnRef>
+          <a:fillRef idx="0">
+            <a:schemeClr val="accent1"/>
+          </a:fillRef>
+          <a:effectRef idx="0">
+            <a:schemeClr val="accent1"/>
+          </a:effectRef>
+          <a:fontRef idx="minor">
+            <a:schemeClr val="tx1"/>
+          </a:fontRef>
+        </p:style>
+      </p:cxnSp>
+      <p:sp>
+        <p:nvSpPr>
+          <p:cNvPr id="89" name="Flowchart: Terminator 88">
+            <a:extLst>
+              <a:ext uri="{FF2B5EF4-FFF2-40B4-BE49-F238E27FC236}">
+                <a16:creationId xmlns:a16="http://schemas.microsoft.com/office/drawing/2014/main" id="{5E9464CA-DFA2-4280-B3E0-F22A2B4A04C9}"/>
+              </a:ext>
+            </a:extLst>
+          </p:cNvPr>
+          <p:cNvSpPr/>
+          <p:nvPr/>
+        </p:nvSpPr>
+        <p:spPr>
+          <a:xfrm>
+            <a:off x="1177166" y="4659908"/>
+            <a:ext cx="2312184" cy="543807"/>
+          </a:xfrm>
+          <a:prstGeom prst="flowChartTerminator">
+            <a:avLst/>
+          </a:prstGeom>
+          <a:solidFill>
+            <a:schemeClr val="bg2"/>
+          </a:solidFill>
+          <a:ln>
+            <a:solidFill>
+              <a:schemeClr val="tx1"/>
+            </a:solidFill>
+          </a:ln>
+        </p:spPr>
+        <p:style>
+          <a:lnRef idx="2">
+            <a:schemeClr val="accent1">
+              <a:shade val="50000"/>
+            </a:schemeClr>
+          </a:lnRef>
+          <a:fillRef idx="1">
+            <a:schemeClr val="accent1"/>
+          </a:fillRef>
+          <a:effectRef idx="0">
+            <a:schemeClr val="accent1"/>
+          </a:effectRef>
+          <a:fontRef idx="minor">
+            <a:schemeClr val="lt1"/>
+          </a:fontRef>
+        </p:style>
+        <p:txBody>
+          <a:bodyPr rtlCol="0" anchor="ctr"/>
+          <a:lstStyle/>
+          <a:p>
+            <a:pPr algn="ctr"/>
+            <a:r>
+              <a:rPr lang="en-US" dirty="0">
+                <a:ln>
+                  <a:solidFill>
+                    <a:sysClr val="windowText" lastClr="000000"/>
+                  </a:solidFill>
+                </a:ln>
+                <a:solidFill>
+                  <a:sysClr val="windowText" lastClr="000000"/>
+                </a:solidFill>
+              </a:rPr>
+              <a:t>Generated Queues</a:t>
+            </a:r>
+            <a:endParaRPr lang="en-IL" dirty="0">
+              <a:ln>
+                <a:solidFill>
+                  <a:sysClr val="windowText" lastClr="000000"/>
+                </a:solidFill>
+              </a:ln>
+              <a:solidFill>
+                <a:sysClr val="windowText" lastClr="000000"/>
+              </a:solidFill>
+            </a:endParaRPr>
+          </a:p>
+        </p:txBody>
+      </p:sp>
+      <p:cxnSp>
+        <p:nvCxnSpPr>
+          <p:cNvPr id="90" name="Straight Arrow Connector 89">
+            <a:extLst>
+              <a:ext uri="{FF2B5EF4-FFF2-40B4-BE49-F238E27FC236}">
+                <a16:creationId xmlns:a16="http://schemas.microsoft.com/office/drawing/2014/main" id="{B9B03C4D-47D2-43FA-835B-F940E90CB699}"/>
+              </a:ext>
+            </a:extLst>
+          </p:cNvPr>
+          <p:cNvCxnSpPr>
+            <a:cxnSpLocks/>
+            <a:stCxn id="89" idx="3"/>
+            <a:endCxn id="38" idx="1"/>
+          </p:cNvCxnSpPr>
+          <p:nvPr/>
+        </p:nvCxnSpPr>
+        <p:spPr>
+          <a:xfrm flipV="1">
+            <a:off x="3489350" y="4322742"/>
+            <a:ext cx="69619" cy="609070"/>
+          </a:xfrm>
+          <a:prstGeom prst="straightConnector1">
+            <a:avLst/>
+          </a:prstGeom>
+          <a:ln w="57150">
+            <a:solidFill>
+              <a:srgbClr val="FF0000"/>
+            </a:solidFill>
+            <a:headEnd type="triangle" w="med" len="med"/>
+            <a:tailEnd type="none" w="med" len="med"/>
+          </a:ln>
+        </p:spPr>
+        <p:style>
+          <a:lnRef idx="1">
+            <a:schemeClr val="accent1"/>
+          </a:lnRef>
+          <a:fillRef idx="0">
+            <a:schemeClr val="accent1"/>
+          </a:fillRef>
+          <a:effectRef idx="0">
+            <a:schemeClr val="accent1"/>
+          </a:effectRef>
+          <a:fontRef idx="minor">
+            <a:schemeClr val="tx1"/>
+          </a:fontRef>
+        </p:style>
+      </p:cxnSp>
+      <p:cxnSp>
+        <p:nvCxnSpPr>
+          <p:cNvPr id="93" name="Straight Arrow Connector 92">
+            <a:extLst>
+              <a:ext uri="{FF2B5EF4-FFF2-40B4-BE49-F238E27FC236}">
+                <a16:creationId xmlns:a16="http://schemas.microsoft.com/office/drawing/2014/main" id="{F72F0204-1CF2-4A39-8812-DE321B494257}"/>
+              </a:ext>
+            </a:extLst>
+          </p:cNvPr>
+          <p:cNvCxnSpPr>
+            <a:cxnSpLocks/>
+            <a:stCxn id="39" idx="2"/>
+            <a:endCxn id="89" idx="1"/>
+          </p:cNvCxnSpPr>
+          <p:nvPr/>
+        </p:nvCxnSpPr>
+        <p:spPr>
+          <a:xfrm>
+            <a:off x="901442" y="4298194"/>
+            <a:ext cx="275724" cy="633618"/>
+          </a:xfrm>
+          <a:prstGeom prst="straightConnector1">
+            <a:avLst/>
+          </a:prstGeom>
+          <a:ln w="57150">
+            <a:solidFill>
+              <a:srgbClr val="FF0000"/>
+            </a:solidFill>
+            <a:headEnd type="triangle" w="med" len="med"/>
+            <a:tailEnd type="none" w="med" len="med"/>
+          </a:ln>
+        </p:spPr>
+        <p:style>
+          <a:lnRef idx="1">
+            <a:schemeClr val="accent1"/>
+          </a:lnRef>
+          <a:fillRef idx="0">
+            <a:schemeClr val="accent1"/>
+          </a:fillRef>
+          <a:effectRef idx="0">
+            <a:schemeClr val="accent1"/>
+          </a:effectRef>
+          <a:fontRef idx="minor">
+            <a:schemeClr val="tx1"/>
+          </a:fontRef>
+        </p:style>
+      </p:cxnSp>
+    </p:spTree>
+    <p:extLst>
+      <p:ext uri="{BB962C8B-B14F-4D97-AF65-F5344CB8AC3E}">
+        <p14:creationId xmlns:p14="http://schemas.microsoft.com/office/powerpoint/2010/main" val="3126232037"/>
+      </p:ext>
+    </p:extLst>
+  </p:cSld>
+  <p:clrMapOvr>
+    <a:masterClrMapping/>
+  </p:clrMapOvr>
+</p:sld>
+</file>
+
+<file path=ppt/slides/slide3.xml><?xml version="1.0" encoding="utf-8"?>
+<p:sld xmlns:a="http://schemas.openxmlformats.org/drawingml/2006/main" xmlns:r="http://schemas.openxmlformats.org/officeDocument/2006/relationships" xmlns:p="http://schemas.openxmlformats.org/presentationml/2006/main">
+  <p:cSld>
+    <p:spTree>
+      <p:nvGrpSpPr>
+        <p:cNvPr id="1" name=""/>
+        <p:cNvGrpSpPr/>
+        <p:nvPr/>
+      </p:nvGrpSpPr>
+      <p:grpSpPr>
+        <a:xfrm>
+          <a:off x="0" y="0"/>
+          <a:ext cx="0" cy="0"/>
+          <a:chOff x="0" y="0"/>
+          <a:chExt cx="0" cy="0"/>
+        </a:xfrm>
+      </p:grpSpPr>
+      <p:sp>
+        <p:nvSpPr>
+          <p:cNvPr id="2" name="TextBox 1">
+            <a:extLst>
+              <a:ext uri="{FF2B5EF4-FFF2-40B4-BE49-F238E27FC236}">
+                <a16:creationId xmlns:a16="http://schemas.microsoft.com/office/drawing/2014/main" id="{DB5CE5EE-111C-4F0B-8CA1-C9A252F4A3AE}"/>
+              </a:ext>
+            </a:extLst>
+          </p:cNvPr>
+          <p:cNvSpPr txBox="1"/>
+          <p:nvPr/>
+        </p:nvSpPr>
+        <p:spPr>
+          <a:xfrm>
+            <a:off x="273917" y="151313"/>
+            <a:ext cx="4563944" cy="1569660"/>
+          </a:xfrm>
+          <a:prstGeom prst="rect">
+            <a:avLst/>
+          </a:prstGeom>
+          <a:noFill/>
+        </p:spPr>
+        <p:txBody>
+          <a:bodyPr wrap="square" rtlCol="0">
+            <a:spAutoFit/>
+          </a:bodyPr>
+          <a:lstStyle/>
+          <a:p>
+            <a:r>
+              <a:rPr lang="en-US" sz="4800" dirty="0">
+                <a:ln>
+                  <a:solidFill>
+                    <a:sysClr val="windowText" lastClr="000000"/>
+                  </a:solidFill>
+                </a:ln>
+                <a:solidFill>
+                  <a:sysClr val="windowText" lastClr="000000"/>
+                </a:solidFill>
+              </a:rPr>
+              <a:t>Rabbit Architecture 1</a:t>
+            </a:r>
+            <a:endParaRPr lang="en-IL" sz="4800" dirty="0">
+              <a:ln>
+                <a:solidFill>
+                  <a:sysClr val="windowText" lastClr="000000"/>
+                </a:solidFill>
+              </a:ln>
+              <a:solidFill>
+                <a:sysClr val="windowText" lastClr="000000"/>
+              </a:solidFill>
+            </a:endParaRPr>
+          </a:p>
+        </p:txBody>
+      </p:sp>
+      <p:sp>
+        <p:nvSpPr>
+          <p:cNvPr id="6" name="Flowchart: Terminator 5">
+            <a:extLst>
+              <a:ext uri="{FF2B5EF4-FFF2-40B4-BE49-F238E27FC236}">
+                <a16:creationId xmlns:a16="http://schemas.microsoft.com/office/drawing/2014/main" id="{337579E2-406E-46DB-8BEB-79038E09FFFD}"/>
+              </a:ext>
+            </a:extLst>
+          </p:cNvPr>
+          <p:cNvSpPr/>
+          <p:nvPr/>
+        </p:nvSpPr>
+        <p:spPr>
+          <a:xfrm>
+            <a:off x="5848937" y="648521"/>
+            <a:ext cx="2312184" cy="543807"/>
+          </a:xfrm>
+          <a:prstGeom prst="flowChartTerminator">
+            <a:avLst/>
+          </a:prstGeom>
+          <a:solidFill>
+            <a:schemeClr val="bg2"/>
+          </a:solidFill>
+          <a:ln>
+            <a:solidFill>
+              <a:schemeClr val="tx1"/>
+            </a:solidFill>
+          </a:ln>
+        </p:spPr>
+        <p:style>
+          <a:lnRef idx="2">
+            <a:schemeClr val="accent1">
+              <a:shade val="50000"/>
+            </a:schemeClr>
+          </a:lnRef>
+          <a:fillRef idx="1">
+            <a:schemeClr val="accent1"/>
+          </a:fillRef>
+          <a:effectRef idx="0">
+            <a:schemeClr val="accent1"/>
+          </a:effectRef>
+          <a:fontRef idx="minor">
+            <a:schemeClr val="lt1"/>
+          </a:fontRef>
+        </p:style>
+        <p:txBody>
+          <a:bodyPr rtlCol="0" anchor="ctr"/>
+          <a:lstStyle/>
+          <a:p>
+            <a:pPr algn="ctr"/>
+            <a:r>
+              <a:rPr lang="en-US" dirty="0" err="1">
+                <a:ln>
+                  <a:solidFill>
+                    <a:sysClr val="windowText" lastClr="000000"/>
+                  </a:solidFill>
+                </a:ln>
+                <a:solidFill>
+                  <a:sysClr val="windowText" lastClr="000000"/>
+                </a:solidFill>
+              </a:rPr>
+              <a:t>db_read</a:t>
+            </a:r>
+            <a:endParaRPr lang="en-IL" dirty="0">
+              <a:ln>
+                <a:solidFill>
+                  <a:sysClr val="windowText" lastClr="000000"/>
+                </a:solidFill>
+              </a:ln>
+              <a:solidFill>
+                <a:sysClr val="windowText" lastClr="000000"/>
+              </a:solidFill>
+            </a:endParaRPr>
+          </a:p>
+        </p:txBody>
+      </p:sp>
+      <p:sp>
+        <p:nvSpPr>
+          <p:cNvPr id="34" name="Flowchart: Terminator 33">
+            <a:extLst>
+              <a:ext uri="{FF2B5EF4-FFF2-40B4-BE49-F238E27FC236}">
+                <a16:creationId xmlns:a16="http://schemas.microsoft.com/office/drawing/2014/main" id="{ADEFD05F-1F3A-4006-B5DA-4CAD4746432D}"/>
+              </a:ext>
+            </a:extLst>
+          </p:cNvPr>
+          <p:cNvSpPr/>
+          <p:nvPr/>
+        </p:nvSpPr>
+        <p:spPr>
+          <a:xfrm>
+            <a:off x="5848937" y="2021464"/>
+            <a:ext cx="2312184" cy="543807"/>
+          </a:xfrm>
+          <a:prstGeom prst="flowChartTerminator">
+            <a:avLst/>
+          </a:prstGeom>
+          <a:solidFill>
+            <a:schemeClr val="bg2"/>
+          </a:solidFill>
+          <a:ln>
+            <a:solidFill>
+              <a:schemeClr val="tx1"/>
+            </a:solidFill>
+          </a:ln>
+        </p:spPr>
+        <p:style>
+          <a:lnRef idx="2">
+            <a:schemeClr val="accent1">
+              <a:shade val="50000"/>
+            </a:schemeClr>
+          </a:lnRef>
+          <a:fillRef idx="1">
+            <a:schemeClr val="accent1"/>
+          </a:fillRef>
+          <a:effectRef idx="0">
+            <a:schemeClr val="accent1"/>
+          </a:effectRef>
+          <a:fontRef idx="minor">
+            <a:schemeClr val="lt1"/>
+          </a:fontRef>
+        </p:style>
+        <p:txBody>
+          <a:bodyPr rtlCol="0" anchor="ctr"/>
+          <a:lstStyle/>
+          <a:p>
+            <a:pPr algn="ctr"/>
+            <a:r>
+              <a:rPr lang="en-US" dirty="0">
+                <a:ln>
+                  <a:solidFill>
+                    <a:sysClr val="windowText" lastClr="000000"/>
+                  </a:solidFill>
+                </a:ln>
+                <a:solidFill>
+                  <a:sysClr val="windowText" lastClr="000000"/>
+                </a:solidFill>
+              </a:rPr>
+              <a:t>amazon</a:t>
+            </a:r>
+            <a:endParaRPr lang="en-IL" dirty="0">
+              <a:ln>
+                <a:solidFill>
+                  <a:sysClr val="windowText" lastClr="000000"/>
+                </a:solidFill>
+              </a:ln>
+              <a:solidFill>
+                <a:sysClr val="windowText" lastClr="000000"/>
+              </a:solidFill>
+            </a:endParaRPr>
+          </a:p>
+        </p:txBody>
+      </p:sp>
+      <p:sp>
+        <p:nvSpPr>
+          <p:cNvPr id="35" name="Flowchart: Terminator 34">
+            <a:extLst>
+              <a:ext uri="{FF2B5EF4-FFF2-40B4-BE49-F238E27FC236}">
+                <a16:creationId xmlns:a16="http://schemas.microsoft.com/office/drawing/2014/main" id="{E77BE89C-D2B5-47D5-B768-A220F80FC6D4}"/>
+              </a:ext>
+            </a:extLst>
+          </p:cNvPr>
+          <p:cNvSpPr/>
+          <p:nvPr/>
+        </p:nvSpPr>
+        <p:spPr>
+          <a:xfrm>
+            <a:off x="5848937" y="3423333"/>
+            <a:ext cx="2312184" cy="543807"/>
+          </a:xfrm>
+          <a:prstGeom prst="flowChartTerminator">
+            <a:avLst/>
+          </a:prstGeom>
+          <a:solidFill>
+            <a:schemeClr val="bg2"/>
+          </a:solidFill>
+          <a:ln>
+            <a:solidFill>
+              <a:schemeClr val="tx1"/>
+            </a:solidFill>
+          </a:ln>
+        </p:spPr>
+        <p:style>
+          <a:lnRef idx="2">
+            <a:schemeClr val="accent1">
+              <a:shade val="50000"/>
+            </a:schemeClr>
+          </a:lnRef>
+          <a:fillRef idx="1">
+            <a:schemeClr val="accent1"/>
+          </a:fillRef>
+          <a:effectRef idx="0">
+            <a:schemeClr val="accent1"/>
+          </a:effectRef>
+          <a:fontRef idx="minor">
+            <a:schemeClr val="lt1"/>
+          </a:fontRef>
+        </p:style>
+        <p:txBody>
+          <a:bodyPr rtlCol="0" anchor="ctr"/>
+          <a:lstStyle/>
+          <a:p>
+            <a:pPr algn="ctr"/>
+            <a:r>
+              <a:rPr lang="en-US" dirty="0" err="1">
+                <a:ln>
+                  <a:solidFill>
+                    <a:sysClr val="windowText" lastClr="000000"/>
+                  </a:solidFill>
+                </a:ln>
+                <a:solidFill>
+                  <a:sysClr val="windowText" lastClr="000000"/>
+                </a:solidFill>
+              </a:rPr>
+              <a:t>walmart</a:t>
+            </a:r>
+            <a:endParaRPr lang="en-IL" dirty="0">
+              <a:ln>
+                <a:solidFill>
+                  <a:sysClr val="windowText" lastClr="000000"/>
+                </a:solidFill>
+              </a:ln>
+              <a:solidFill>
+                <a:sysClr val="windowText" lastClr="000000"/>
+              </a:solidFill>
+            </a:endParaRPr>
+          </a:p>
+        </p:txBody>
+      </p:sp>
+      <p:sp>
+        <p:nvSpPr>
+          <p:cNvPr id="36" name="Flowchart: Terminator 35">
+            <a:extLst>
+              <a:ext uri="{FF2B5EF4-FFF2-40B4-BE49-F238E27FC236}">
+                <a16:creationId xmlns:a16="http://schemas.microsoft.com/office/drawing/2014/main" id="{B969C337-1019-4AC8-B379-EA75C5202D06}"/>
+              </a:ext>
+            </a:extLst>
+          </p:cNvPr>
+          <p:cNvSpPr/>
+          <p:nvPr/>
+        </p:nvSpPr>
+        <p:spPr>
+          <a:xfrm>
+            <a:off x="5848937" y="4890224"/>
+            <a:ext cx="2312184" cy="543807"/>
+          </a:xfrm>
+          <a:prstGeom prst="flowChartTerminator">
+            <a:avLst/>
+          </a:prstGeom>
+          <a:solidFill>
+            <a:schemeClr val="bg2"/>
+          </a:solidFill>
+          <a:ln>
+            <a:solidFill>
+              <a:schemeClr val="tx1"/>
+            </a:solidFill>
+          </a:ln>
+        </p:spPr>
+        <p:style>
+          <a:lnRef idx="2">
+            <a:schemeClr val="accent1">
+              <a:shade val="50000"/>
+            </a:schemeClr>
+          </a:lnRef>
+          <a:fillRef idx="1">
+            <a:schemeClr val="accent1"/>
+          </a:fillRef>
+          <a:effectRef idx="0">
+            <a:schemeClr val="accent1"/>
+          </a:effectRef>
+          <a:fontRef idx="minor">
+            <a:schemeClr val="lt1"/>
+          </a:fontRef>
+        </p:style>
+        <p:txBody>
+          <a:bodyPr rtlCol="0" anchor="ctr"/>
+          <a:lstStyle/>
+          <a:p>
+            <a:pPr algn="ctr"/>
+            <a:r>
+              <a:rPr lang="en-US" dirty="0" err="1">
+                <a:ln>
+                  <a:solidFill>
+                    <a:sysClr val="windowText" lastClr="000000"/>
+                  </a:solidFill>
+                </a:ln>
+                <a:solidFill>
+                  <a:sysClr val="windowText" lastClr="000000"/>
+                </a:solidFill>
+              </a:rPr>
+              <a:t>db_write</a:t>
+            </a:r>
+            <a:endParaRPr lang="en-IL" dirty="0">
+              <a:ln>
+                <a:solidFill>
+                  <a:sysClr val="windowText" lastClr="000000"/>
+                </a:solidFill>
+              </a:ln>
+              <a:solidFill>
+                <a:sysClr val="windowText" lastClr="000000"/>
+              </a:solidFill>
+            </a:endParaRPr>
+          </a:p>
+        </p:txBody>
+      </p:sp>
+      <p:sp>
+        <p:nvSpPr>
+          <p:cNvPr id="38" name="Hexagon 37">
+            <a:extLst>
+              <a:ext uri="{FF2B5EF4-FFF2-40B4-BE49-F238E27FC236}">
+                <a16:creationId xmlns:a16="http://schemas.microsoft.com/office/drawing/2014/main" id="{F97F0229-2421-42AE-A3D1-57F08C159D94}"/>
+              </a:ext>
+            </a:extLst>
+          </p:cNvPr>
+          <p:cNvSpPr/>
+          <p:nvPr/>
+        </p:nvSpPr>
+        <p:spPr>
+          <a:xfrm>
+            <a:off x="2190564" y="2637615"/>
+            <a:ext cx="1789687" cy="1685127"/>
+          </a:xfrm>
+          <a:prstGeom prst="hexagon">
+            <a:avLst/>
+          </a:prstGeom>
+          <a:solidFill>
+            <a:schemeClr val="bg2"/>
+          </a:solidFill>
+          <a:ln w="38100">
+            <a:solidFill>
+              <a:schemeClr val="accent1"/>
+            </a:solidFill>
+          </a:ln>
+        </p:spPr>
+        <p:style>
+          <a:lnRef idx="2">
+            <a:schemeClr val="accent1">
+              <a:shade val="50000"/>
+            </a:schemeClr>
+          </a:lnRef>
+          <a:fillRef idx="1">
+            <a:schemeClr val="accent1"/>
+          </a:fillRef>
+          <a:effectRef idx="0">
+            <a:schemeClr val="accent1"/>
+          </a:effectRef>
+          <a:fontRef idx="minor">
+            <a:schemeClr val="lt1"/>
+          </a:fontRef>
+        </p:style>
+        <p:txBody>
+          <a:bodyPr rtlCol="0" anchor="ctr"/>
+          <a:lstStyle/>
+          <a:p>
+            <a:pPr algn="ctr"/>
+            <a:r>
+              <a:rPr lang="en-US" sz="2800" dirty="0">
+                <a:ln>
+                  <a:solidFill>
+                    <a:sysClr val="windowText" lastClr="000000"/>
+                  </a:solidFill>
+                </a:ln>
+                <a:solidFill>
+                  <a:sysClr val="windowText" lastClr="000000"/>
+                </a:solidFill>
+              </a:rPr>
+              <a:t>RabbitMQ</a:t>
+            </a:r>
+            <a:endParaRPr lang="en-IL" sz="2800" dirty="0">
+              <a:ln>
+                <a:solidFill>
+                  <a:sysClr val="windowText" lastClr="000000"/>
+                </a:solidFill>
+              </a:ln>
+              <a:solidFill>
+                <a:sysClr val="windowText" lastClr="000000"/>
+              </a:solidFill>
+            </a:endParaRPr>
+          </a:p>
+        </p:txBody>
+      </p:sp>
+      <p:sp>
+        <p:nvSpPr>
+          <p:cNvPr id="39" name="Diamond 38">
+            <a:extLst>
+              <a:ext uri="{FF2B5EF4-FFF2-40B4-BE49-F238E27FC236}">
+                <a16:creationId xmlns:a16="http://schemas.microsoft.com/office/drawing/2014/main" id="{B5BD084D-AD2D-42A4-948E-F41801EFAF41}"/>
+              </a:ext>
+            </a:extLst>
+          </p:cNvPr>
+          <p:cNvSpPr/>
+          <p:nvPr/>
+        </p:nvSpPr>
+        <p:spPr>
+          <a:xfrm>
+            <a:off x="69620" y="2626494"/>
+            <a:ext cx="1663644" cy="1671700"/>
+          </a:xfrm>
+          <a:prstGeom prst="diamond">
+            <a:avLst/>
+          </a:prstGeom>
+          <a:solidFill>
+            <a:schemeClr val="bg2"/>
+          </a:solidFill>
+          <a:ln w="28575">
+            <a:solidFill>
+              <a:schemeClr val="accent1"/>
+            </a:solidFill>
+          </a:ln>
+        </p:spPr>
+        <p:style>
+          <a:lnRef idx="2">
+            <a:schemeClr val="accent1">
+              <a:shade val="50000"/>
+            </a:schemeClr>
+          </a:lnRef>
+          <a:fillRef idx="1">
+            <a:schemeClr val="accent1"/>
+          </a:fillRef>
+          <a:effectRef idx="0">
+            <a:schemeClr val="accent1"/>
+          </a:effectRef>
+          <a:fontRef idx="minor">
+            <a:schemeClr val="lt1"/>
+          </a:fontRef>
+        </p:style>
+        <p:txBody>
+          <a:bodyPr rtlCol="0" anchor="ctr"/>
+          <a:lstStyle/>
+          <a:p>
+            <a:pPr algn="ctr"/>
+            <a:r>
+              <a:rPr lang="en-US" sz="2800" dirty="0">
+                <a:ln>
+                  <a:solidFill>
+                    <a:sysClr val="windowText" lastClr="000000"/>
+                  </a:solidFill>
+                </a:ln>
+                <a:solidFill>
+                  <a:sysClr val="windowText" lastClr="000000"/>
+                </a:solidFill>
+              </a:rPr>
+              <a:t>API</a:t>
+            </a:r>
+            <a:endParaRPr lang="en-IL" sz="2800" dirty="0">
+              <a:ln>
+                <a:solidFill>
+                  <a:sysClr val="windowText" lastClr="000000"/>
+                </a:solidFill>
+              </a:ln>
+              <a:solidFill>
+                <a:sysClr val="windowText" lastClr="000000"/>
+              </a:solidFill>
+            </a:endParaRPr>
+          </a:p>
+        </p:txBody>
+      </p:sp>
+      <p:sp>
+        <p:nvSpPr>
+          <p:cNvPr id="40" name="Diamond 39">
+            <a:extLst>
+              <a:ext uri="{FF2B5EF4-FFF2-40B4-BE49-F238E27FC236}">
+                <a16:creationId xmlns:a16="http://schemas.microsoft.com/office/drawing/2014/main" id="{50E7BEFB-FB41-4831-A19B-88E5805EFF16}"/>
+              </a:ext>
+            </a:extLst>
+          </p:cNvPr>
+          <p:cNvSpPr/>
+          <p:nvPr/>
+        </p:nvSpPr>
+        <p:spPr>
+          <a:xfrm>
+            <a:off x="9914575" y="4674716"/>
+            <a:ext cx="1006255" cy="974824"/>
+          </a:xfrm>
+          <a:prstGeom prst="diamond">
+            <a:avLst/>
+          </a:prstGeom>
+          <a:solidFill>
+            <a:schemeClr val="bg2"/>
+          </a:solidFill>
+          <a:ln w="28575">
+            <a:solidFill>
+              <a:schemeClr val="accent1"/>
+            </a:solidFill>
+          </a:ln>
+        </p:spPr>
+        <p:style>
+          <a:lnRef idx="2">
+            <a:schemeClr val="accent1">
+              <a:shade val="50000"/>
+            </a:schemeClr>
+          </a:lnRef>
+          <a:fillRef idx="1">
+            <a:schemeClr val="accent1"/>
+          </a:fillRef>
+          <a:effectRef idx="0">
+            <a:schemeClr val="accent1"/>
+          </a:effectRef>
+          <a:fontRef idx="minor">
+            <a:schemeClr val="lt1"/>
+          </a:fontRef>
+        </p:style>
+        <p:txBody>
+          <a:bodyPr rtlCol="0" anchor="ctr"/>
+          <a:lstStyle/>
+          <a:p>
+            <a:pPr algn="ctr"/>
+            <a:r>
+              <a:rPr lang="en-US" sz="1050" dirty="0">
+                <a:ln>
+                  <a:solidFill>
+                    <a:sysClr val="windowText" lastClr="000000"/>
+                  </a:solidFill>
+                </a:ln>
+                <a:solidFill>
+                  <a:sysClr val="windowText" lastClr="000000"/>
+                </a:solidFill>
+              </a:rPr>
+              <a:t>DB </a:t>
+            </a:r>
+          </a:p>
+          <a:p>
+            <a:pPr algn="ctr"/>
+            <a:r>
+              <a:rPr lang="en-US" sz="1050" dirty="0">
+                <a:ln>
+                  <a:solidFill>
+                    <a:srgbClr val="FF0000"/>
+                  </a:solidFill>
+                </a:ln>
+                <a:solidFill>
+                  <a:srgbClr val="FF0000"/>
+                </a:solidFill>
+              </a:rPr>
+              <a:t>Write</a:t>
+            </a:r>
+            <a:endParaRPr lang="en-IL" sz="1050" dirty="0">
+              <a:ln>
+                <a:solidFill>
+                  <a:srgbClr val="FF0000"/>
+                </a:solidFill>
+              </a:ln>
+              <a:solidFill>
+                <a:srgbClr val="FF0000"/>
+              </a:solidFill>
+            </a:endParaRPr>
+          </a:p>
+        </p:txBody>
+      </p:sp>
+      <p:sp>
+        <p:nvSpPr>
+          <p:cNvPr id="41" name="Diamond 40">
+            <a:extLst>
+              <a:ext uri="{FF2B5EF4-FFF2-40B4-BE49-F238E27FC236}">
+                <a16:creationId xmlns:a16="http://schemas.microsoft.com/office/drawing/2014/main" id="{2B9B207C-3EC0-46B2-9691-A337E1AA1395}"/>
+              </a:ext>
+            </a:extLst>
+          </p:cNvPr>
+          <p:cNvSpPr>
+            <a:spLocks noChangeAspect="1"/>
+          </p:cNvSpPr>
+          <p:nvPr/>
+        </p:nvSpPr>
+        <p:spPr>
+          <a:xfrm>
+            <a:off x="9760909" y="3050185"/>
+            <a:ext cx="1313588" cy="1272557"/>
+          </a:xfrm>
+          <a:prstGeom prst="diamond">
+            <a:avLst/>
+          </a:prstGeom>
+          <a:solidFill>
+            <a:schemeClr val="bg2"/>
+          </a:solidFill>
+          <a:ln w="28575">
+            <a:solidFill>
+              <a:schemeClr val="accent1"/>
+            </a:solidFill>
+          </a:ln>
+        </p:spPr>
+        <p:style>
+          <a:lnRef idx="2">
+            <a:schemeClr val="accent1">
+              <a:shade val="50000"/>
+            </a:schemeClr>
+          </a:lnRef>
+          <a:fillRef idx="1">
+            <a:schemeClr val="accent1"/>
+          </a:fillRef>
+          <a:effectRef idx="0">
+            <a:schemeClr val="accent1"/>
+          </a:effectRef>
+          <a:fontRef idx="minor">
+            <a:schemeClr val="lt1"/>
+          </a:fontRef>
+        </p:style>
+        <p:txBody>
+          <a:bodyPr rtlCol="0" anchor="ctr"/>
+          <a:lstStyle/>
+          <a:p>
+            <a:pPr algn="ctr"/>
+            <a:r>
+              <a:rPr lang="en-US" sz="1050" dirty="0">
+                <a:ln>
+                  <a:solidFill>
+                    <a:sysClr val="windowText" lastClr="000000"/>
+                  </a:solidFill>
+                </a:ln>
+                <a:solidFill>
+                  <a:sysClr val="windowText" lastClr="000000"/>
+                </a:solidFill>
+              </a:rPr>
+              <a:t>Walmart fetcher</a:t>
+            </a:r>
+          </a:p>
+        </p:txBody>
+      </p:sp>
+      <p:sp>
+        <p:nvSpPr>
+          <p:cNvPr id="42" name="Diamond 41">
+            <a:extLst>
+              <a:ext uri="{FF2B5EF4-FFF2-40B4-BE49-F238E27FC236}">
+                <a16:creationId xmlns:a16="http://schemas.microsoft.com/office/drawing/2014/main" id="{C4B0506C-1675-41B4-B4FB-3C24AAFE4AAA}"/>
+              </a:ext>
+            </a:extLst>
+          </p:cNvPr>
+          <p:cNvSpPr>
+            <a:spLocks noChangeAspect="1"/>
+          </p:cNvSpPr>
+          <p:nvPr/>
+        </p:nvSpPr>
+        <p:spPr>
+          <a:xfrm>
+            <a:off x="9760909" y="1660818"/>
+            <a:ext cx="1313588" cy="1272557"/>
+          </a:xfrm>
+          <a:prstGeom prst="diamond">
+            <a:avLst/>
+          </a:prstGeom>
+          <a:solidFill>
+            <a:schemeClr val="bg2"/>
+          </a:solidFill>
+          <a:ln w="28575">
+            <a:solidFill>
+              <a:schemeClr val="accent1"/>
+            </a:solidFill>
+          </a:ln>
+        </p:spPr>
+        <p:style>
+          <a:lnRef idx="2">
+            <a:schemeClr val="accent1">
+              <a:shade val="50000"/>
+            </a:schemeClr>
+          </a:lnRef>
+          <a:fillRef idx="1">
+            <a:schemeClr val="accent1"/>
+          </a:fillRef>
+          <a:effectRef idx="0">
+            <a:schemeClr val="accent1"/>
+          </a:effectRef>
+          <a:fontRef idx="minor">
+            <a:schemeClr val="lt1"/>
+          </a:fontRef>
+        </p:style>
+        <p:txBody>
+          <a:bodyPr rtlCol="0" anchor="ctr"/>
+          <a:lstStyle/>
+          <a:p>
+            <a:pPr algn="ctr"/>
+            <a:r>
+              <a:rPr lang="en-US" sz="1050" dirty="0">
+                <a:ln>
+                  <a:solidFill>
+                    <a:sysClr val="windowText" lastClr="000000"/>
+                  </a:solidFill>
+                </a:ln>
+                <a:solidFill>
+                  <a:sysClr val="windowText" lastClr="000000"/>
+                </a:solidFill>
+              </a:rPr>
+              <a:t>Amazon fetcher</a:t>
+            </a:r>
+          </a:p>
+        </p:txBody>
+      </p:sp>
+      <p:sp>
+        <p:nvSpPr>
+          <p:cNvPr id="44" name="Diamond 43">
+            <a:extLst>
+              <a:ext uri="{FF2B5EF4-FFF2-40B4-BE49-F238E27FC236}">
+                <a16:creationId xmlns:a16="http://schemas.microsoft.com/office/drawing/2014/main" id="{94412E46-0C38-4CA1-9411-876AA9AD535F}"/>
+              </a:ext>
+            </a:extLst>
+          </p:cNvPr>
+          <p:cNvSpPr>
+            <a:spLocks noChangeAspect="1"/>
+          </p:cNvSpPr>
+          <p:nvPr/>
+        </p:nvSpPr>
+        <p:spPr>
+          <a:xfrm>
+            <a:off x="9760909" y="284147"/>
+            <a:ext cx="1313588" cy="1272557"/>
+          </a:xfrm>
+          <a:prstGeom prst="diamond">
+            <a:avLst/>
+          </a:prstGeom>
+          <a:solidFill>
+            <a:schemeClr val="bg2"/>
+          </a:solidFill>
+          <a:ln w="28575">
+            <a:solidFill>
+              <a:schemeClr val="accent1"/>
+            </a:solidFill>
+          </a:ln>
+        </p:spPr>
+        <p:style>
+          <a:lnRef idx="2">
+            <a:schemeClr val="accent1">
+              <a:shade val="50000"/>
+            </a:schemeClr>
+          </a:lnRef>
+          <a:fillRef idx="1">
+            <a:schemeClr val="accent1"/>
+          </a:fillRef>
+          <a:effectRef idx="0">
+            <a:schemeClr val="accent1"/>
+          </a:effectRef>
+          <a:fontRef idx="minor">
+            <a:schemeClr val="lt1"/>
+          </a:fontRef>
+        </p:style>
+        <p:txBody>
+          <a:bodyPr rtlCol="0" anchor="ctr"/>
+          <a:lstStyle/>
+          <a:p>
+            <a:pPr algn="ctr"/>
+            <a:r>
+              <a:rPr lang="en-US" sz="1050" dirty="0">
+                <a:ln>
+                  <a:solidFill>
+                    <a:sysClr val="windowText" lastClr="000000"/>
+                  </a:solidFill>
+                </a:ln>
+                <a:solidFill>
+                  <a:sysClr val="windowText" lastClr="000000"/>
+                </a:solidFill>
+              </a:rPr>
+              <a:t>DB</a:t>
+            </a:r>
+          </a:p>
+          <a:p>
+            <a:pPr algn="ctr"/>
+            <a:r>
+              <a:rPr lang="en-US" sz="1050" dirty="0">
+                <a:ln>
+                  <a:solidFill>
+                    <a:srgbClr val="00B0F0"/>
+                  </a:solidFill>
+                </a:ln>
+                <a:solidFill>
+                  <a:srgbClr val="00B0F0"/>
+                </a:solidFill>
+              </a:rPr>
+              <a:t>Read</a:t>
+            </a:r>
+          </a:p>
+        </p:txBody>
+      </p:sp>
+      <p:cxnSp>
+        <p:nvCxnSpPr>
+          <p:cNvPr id="17" name="Straight Arrow Connector 16">
+            <a:extLst>
+              <a:ext uri="{FF2B5EF4-FFF2-40B4-BE49-F238E27FC236}">
+                <a16:creationId xmlns:a16="http://schemas.microsoft.com/office/drawing/2014/main" id="{C40220D8-A1B3-479E-91BE-7DE36F6394AB}"/>
+              </a:ext>
+            </a:extLst>
+          </p:cNvPr>
+          <p:cNvCxnSpPr/>
+          <p:nvPr/>
+        </p:nvCxnSpPr>
+        <p:spPr>
+          <a:xfrm>
+            <a:off x="1417021" y="3164810"/>
+            <a:ext cx="1012042" cy="0"/>
+          </a:xfrm>
+          <a:prstGeom prst="straightConnector1">
+            <a:avLst/>
+          </a:prstGeom>
+          <a:ln w="57150">
+            <a:solidFill>
+              <a:srgbClr val="00B0F0"/>
+            </a:solidFill>
+            <a:tailEnd type="triangle"/>
+          </a:ln>
+        </p:spPr>
+        <p:style>
+          <a:lnRef idx="1">
+            <a:schemeClr val="accent1"/>
+          </a:lnRef>
+          <a:fillRef idx="0">
+            <a:schemeClr val="accent1"/>
+          </a:fillRef>
+          <a:effectRef idx="0">
+            <a:schemeClr val="accent1"/>
+          </a:effectRef>
+          <a:fontRef idx="minor">
+            <a:schemeClr val="tx1"/>
+          </a:fontRef>
+        </p:style>
+      </p:cxnSp>
+      <p:cxnSp>
+        <p:nvCxnSpPr>
+          <p:cNvPr id="54" name="Straight Arrow Connector 53">
+            <a:extLst>
+              <a:ext uri="{FF2B5EF4-FFF2-40B4-BE49-F238E27FC236}">
+                <a16:creationId xmlns:a16="http://schemas.microsoft.com/office/drawing/2014/main" id="{3BB83265-0575-4DAF-A277-BE5A9C6A8144}"/>
+              </a:ext>
+            </a:extLst>
+          </p:cNvPr>
+          <p:cNvCxnSpPr>
+            <a:cxnSpLocks/>
+            <a:stCxn id="38" idx="5"/>
+            <a:endCxn id="6" idx="1"/>
+          </p:cNvCxnSpPr>
+          <p:nvPr/>
+        </p:nvCxnSpPr>
+        <p:spPr>
+          <a:xfrm flipV="1">
+            <a:off x="3558969" y="920425"/>
+            <a:ext cx="2289968" cy="1717190"/>
+          </a:xfrm>
+          <a:prstGeom prst="straightConnector1">
+            <a:avLst/>
+          </a:prstGeom>
+          <a:ln w="57150">
+            <a:solidFill>
+              <a:srgbClr val="00B0F0"/>
+            </a:solidFill>
+            <a:tailEnd type="triangle"/>
+          </a:ln>
+        </p:spPr>
+        <p:style>
+          <a:lnRef idx="1">
+            <a:schemeClr val="accent1"/>
+          </a:lnRef>
+          <a:fillRef idx="0">
+            <a:schemeClr val="accent1"/>
+          </a:fillRef>
+          <a:effectRef idx="0">
+            <a:schemeClr val="accent1"/>
+          </a:effectRef>
+          <a:fontRef idx="minor">
+            <a:schemeClr val="tx1"/>
+          </a:fontRef>
+        </p:style>
+      </p:cxnSp>
+      <p:cxnSp>
+        <p:nvCxnSpPr>
+          <p:cNvPr id="55" name="Straight Arrow Connector 54">
+            <a:extLst>
+              <a:ext uri="{FF2B5EF4-FFF2-40B4-BE49-F238E27FC236}">
+                <a16:creationId xmlns:a16="http://schemas.microsoft.com/office/drawing/2014/main" id="{26362111-ECB1-4622-8E56-547952D85616}"/>
+              </a:ext>
+            </a:extLst>
+          </p:cNvPr>
+          <p:cNvCxnSpPr>
+            <a:cxnSpLocks/>
+            <a:stCxn id="38" idx="5"/>
+            <a:endCxn id="35" idx="1"/>
+          </p:cNvCxnSpPr>
+          <p:nvPr/>
+        </p:nvCxnSpPr>
+        <p:spPr>
+          <a:xfrm>
+            <a:off x="3558969" y="2637615"/>
+            <a:ext cx="2289968" cy="1057622"/>
+          </a:xfrm>
+          <a:prstGeom prst="straightConnector1">
+            <a:avLst/>
+          </a:prstGeom>
+          <a:ln w="57150">
+            <a:solidFill>
+              <a:schemeClr val="accent1">
+                <a:lumMod val="60000"/>
+                <a:lumOff val="40000"/>
+              </a:schemeClr>
+            </a:solidFill>
+            <a:tailEnd type="triangle"/>
+          </a:ln>
+        </p:spPr>
+        <p:style>
+          <a:lnRef idx="1">
+            <a:schemeClr val="accent1"/>
+          </a:lnRef>
+          <a:fillRef idx="0">
+            <a:schemeClr val="accent1"/>
+          </a:fillRef>
+          <a:effectRef idx="0">
+            <a:schemeClr val="accent1"/>
+          </a:effectRef>
+          <a:fontRef idx="minor">
+            <a:schemeClr val="tx1"/>
+          </a:fontRef>
+        </p:style>
+      </p:cxnSp>
+      <p:cxnSp>
+        <p:nvCxnSpPr>
+          <p:cNvPr id="58" name="Straight Arrow Connector 57">
+            <a:extLst>
+              <a:ext uri="{FF2B5EF4-FFF2-40B4-BE49-F238E27FC236}">
+                <a16:creationId xmlns:a16="http://schemas.microsoft.com/office/drawing/2014/main" id="{4B03D009-8178-4BCE-A51D-764DE726AA9C}"/>
+              </a:ext>
+            </a:extLst>
+          </p:cNvPr>
+          <p:cNvCxnSpPr>
+            <a:cxnSpLocks/>
+            <a:stCxn id="38" idx="5"/>
+            <a:endCxn id="34" idx="1"/>
+          </p:cNvCxnSpPr>
+          <p:nvPr/>
+        </p:nvCxnSpPr>
+        <p:spPr>
+          <a:xfrm flipV="1">
+            <a:off x="3558969" y="2293368"/>
+            <a:ext cx="2289968" cy="344247"/>
+          </a:xfrm>
+          <a:prstGeom prst="straightConnector1">
+            <a:avLst/>
+          </a:prstGeom>
+          <a:ln w="57150">
+            <a:solidFill>
+              <a:schemeClr val="accent5">
+                <a:lumMod val="75000"/>
+              </a:schemeClr>
+            </a:solidFill>
+            <a:tailEnd type="triangle"/>
+          </a:ln>
+        </p:spPr>
+        <p:style>
+          <a:lnRef idx="1">
+            <a:schemeClr val="accent1"/>
+          </a:lnRef>
+          <a:fillRef idx="0">
+            <a:schemeClr val="accent1"/>
+          </a:fillRef>
+          <a:effectRef idx="0">
+            <a:schemeClr val="accent1"/>
+          </a:effectRef>
+          <a:fontRef idx="minor">
+            <a:schemeClr val="tx1"/>
+          </a:fontRef>
+        </p:style>
+      </p:cxnSp>
+      <p:sp>
+        <p:nvSpPr>
+          <p:cNvPr id="46" name="TextBox 45">
+            <a:extLst>
+              <a:ext uri="{FF2B5EF4-FFF2-40B4-BE49-F238E27FC236}">
+                <a16:creationId xmlns:a16="http://schemas.microsoft.com/office/drawing/2014/main" id="{80A18AB9-7BD3-49E7-BFA1-5B249546C0EF}"/>
+              </a:ext>
+            </a:extLst>
+          </p:cNvPr>
+          <p:cNvSpPr txBox="1"/>
+          <p:nvPr/>
+        </p:nvSpPr>
+        <p:spPr>
+          <a:xfrm>
+            <a:off x="5848937" y="1703645"/>
+            <a:ext cx="2476500" cy="369332"/>
+          </a:xfrm>
+          <a:prstGeom prst="rect">
+            <a:avLst/>
+          </a:prstGeom>
+          <a:noFill/>
+        </p:spPr>
+        <p:txBody>
+          <a:bodyPr wrap="square" rtlCol="0">
+            <a:spAutoFit/>
+          </a:bodyPr>
+          <a:lstStyle/>
+          <a:p>
+            <a:r>
+              <a:rPr lang="en-US" dirty="0" err="1"/>
+              <a:t>routing_key</a:t>
+            </a:r>
+            <a:r>
+              <a:rPr lang="en-US" dirty="0"/>
+              <a:t>: amazon</a:t>
+            </a:r>
+            <a:endParaRPr lang="en-IL" dirty="0"/>
+          </a:p>
+        </p:txBody>
+      </p:sp>
+      <p:sp>
+        <p:nvSpPr>
+          <p:cNvPr id="65" name="TextBox 64">
+            <a:extLst>
+              <a:ext uri="{FF2B5EF4-FFF2-40B4-BE49-F238E27FC236}">
+                <a16:creationId xmlns:a16="http://schemas.microsoft.com/office/drawing/2014/main" id="{AEA5426B-8875-46C6-AC55-C8CE8E59E7E2}"/>
+              </a:ext>
+            </a:extLst>
+          </p:cNvPr>
+          <p:cNvSpPr txBox="1"/>
+          <p:nvPr/>
+        </p:nvSpPr>
+        <p:spPr>
+          <a:xfrm>
+            <a:off x="5848937" y="3093012"/>
+            <a:ext cx="2476500" cy="369332"/>
+          </a:xfrm>
+          <a:prstGeom prst="rect">
+            <a:avLst/>
+          </a:prstGeom>
+          <a:noFill/>
+        </p:spPr>
+        <p:txBody>
+          <a:bodyPr wrap="square" rtlCol="0">
+            <a:spAutoFit/>
+          </a:bodyPr>
+          <a:lstStyle/>
+          <a:p>
+            <a:r>
+              <a:rPr lang="en-US" dirty="0" err="1"/>
+              <a:t>routing_key</a:t>
+            </a:r>
+            <a:r>
+              <a:rPr lang="en-US" dirty="0"/>
+              <a:t>: </a:t>
+            </a:r>
+            <a:r>
+              <a:rPr lang="en-US" dirty="0" err="1"/>
+              <a:t>walmart</a:t>
+            </a:r>
+            <a:endParaRPr lang="en-IL" dirty="0"/>
+          </a:p>
+        </p:txBody>
+      </p:sp>
+      <p:sp>
+        <p:nvSpPr>
+          <p:cNvPr id="66" name="TextBox 65">
+            <a:extLst>
+              <a:ext uri="{FF2B5EF4-FFF2-40B4-BE49-F238E27FC236}">
+                <a16:creationId xmlns:a16="http://schemas.microsoft.com/office/drawing/2014/main" id="{CA6F6126-A68C-41AE-AED0-31EC5B599374}"/>
+              </a:ext>
+            </a:extLst>
+          </p:cNvPr>
+          <p:cNvSpPr txBox="1"/>
+          <p:nvPr/>
+        </p:nvSpPr>
+        <p:spPr>
+          <a:xfrm>
+            <a:off x="5947971" y="69697"/>
+            <a:ext cx="2476500" cy="646331"/>
+          </a:xfrm>
+          <a:prstGeom prst="rect">
+            <a:avLst/>
+          </a:prstGeom>
+          <a:noFill/>
+        </p:spPr>
+        <p:txBody>
+          <a:bodyPr wrap="square" rtlCol="0">
+            <a:spAutoFit/>
+          </a:bodyPr>
+          <a:lstStyle/>
+          <a:p>
+            <a:r>
+              <a:rPr lang="en-US" sz="1200" dirty="0" err="1"/>
+              <a:t>routing_keys</a:t>
+            </a:r>
+            <a:r>
+              <a:rPr lang="en-US" sz="1200" dirty="0"/>
+              <a:t>: </a:t>
+            </a:r>
+          </a:p>
+          <a:p>
+            <a:r>
+              <a:rPr lang="en-US" sz="1200" dirty="0"/>
+              <a:t>	</a:t>
+            </a:r>
+            <a:r>
+              <a:rPr lang="en-US" sz="1200" dirty="0" err="1"/>
+              <a:t>walmart</a:t>
+            </a:r>
+            <a:br>
+              <a:rPr lang="en-US" sz="1200" dirty="0"/>
+            </a:br>
+            <a:r>
+              <a:rPr lang="en-US" sz="1200" dirty="0"/>
+              <a:t>	amazon</a:t>
+            </a:r>
+          </a:p>
+        </p:txBody>
+      </p:sp>
+      <p:cxnSp>
+        <p:nvCxnSpPr>
+          <p:cNvPr id="49" name="Straight Arrow Connector 48">
+            <a:extLst>
+              <a:ext uri="{FF2B5EF4-FFF2-40B4-BE49-F238E27FC236}">
+                <a16:creationId xmlns:a16="http://schemas.microsoft.com/office/drawing/2014/main" id="{93A68A37-415F-49FB-9957-9FD324DACBCD}"/>
+              </a:ext>
+            </a:extLst>
+          </p:cNvPr>
+          <p:cNvCxnSpPr>
+            <a:stCxn id="6" idx="3"/>
+            <a:endCxn id="44" idx="1"/>
+          </p:cNvCxnSpPr>
+          <p:nvPr/>
+        </p:nvCxnSpPr>
+        <p:spPr>
+          <a:xfrm>
+            <a:off x="8161121" y="920425"/>
+            <a:ext cx="1599788" cy="1"/>
+          </a:xfrm>
+          <a:prstGeom prst="straightConnector1">
+            <a:avLst/>
+          </a:prstGeom>
+          <a:ln w="38100">
+            <a:solidFill>
+              <a:schemeClr val="tx1"/>
+            </a:solidFill>
+            <a:headEnd type="none" w="med" len="med"/>
+            <a:tailEnd type="triangle" w="med" len="med"/>
+          </a:ln>
+        </p:spPr>
+        <p:style>
+          <a:lnRef idx="1">
+            <a:schemeClr val="accent1"/>
+          </a:lnRef>
+          <a:fillRef idx="0">
+            <a:schemeClr val="accent1"/>
+          </a:fillRef>
+          <a:effectRef idx="0">
+            <a:schemeClr val="accent1"/>
+          </a:effectRef>
+          <a:fontRef idx="minor">
+            <a:schemeClr val="tx1"/>
+          </a:fontRef>
+        </p:style>
+      </p:cxnSp>
+      <p:cxnSp>
+        <p:nvCxnSpPr>
+          <p:cNvPr id="69" name="Straight Arrow Connector 68">
+            <a:extLst>
+              <a:ext uri="{FF2B5EF4-FFF2-40B4-BE49-F238E27FC236}">
+                <a16:creationId xmlns:a16="http://schemas.microsoft.com/office/drawing/2014/main" id="{2435F4C7-CF7A-406C-A4E9-B4DF89F47DB2}"/>
+              </a:ext>
+            </a:extLst>
+          </p:cNvPr>
+          <p:cNvCxnSpPr>
+            <a:cxnSpLocks/>
+            <a:stCxn id="34" idx="3"/>
+            <a:endCxn id="42" idx="1"/>
+          </p:cNvCxnSpPr>
+          <p:nvPr/>
+        </p:nvCxnSpPr>
+        <p:spPr>
+          <a:xfrm>
+            <a:off x="8161121" y="2293368"/>
+            <a:ext cx="1599788" cy="3729"/>
+          </a:xfrm>
+          <a:prstGeom prst="straightConnector1">
+            <a:avLst/>
+          </a:prstGeom>
+          <a:ln w="38100">
+            <a:solidFill>
+              <a:schemeClr val="tx1"/>
+            </a:solidFill>
+            <a:headEnd type="none" w="med" len="med"/>
+            <a:tailEnd type="triangle" w="med" len="med"/>
+          </a:ln>
+        </p:spPr>
+        <p:style>
+          <a:lnRef idx="1">
+            <a:schemeClr val="accent1"/>
+          </a:lnRef>
+          <a:fillRef idx="0">
+            <a:schemeClr val="accent1"/>
+          </a:fillRef>
+          <a:effectRef idx="0">
+            <a:schemeClr val="accent1"/>
+          </a:effectRef>
+          <a:fontRef idx="minor">
+            <a:schemeClr val="tx1"/>
+          </a:fontRef>
+        </p:style>
+      </p:cxnSp>
+      <p:cxnSp>
+        <p:nvCxnSpPr>
+          <p:cNvPr id="72" name="Straight Arrow Connector 71">
+            <a:extLst>
+              <a:ext uri="{FF2B5EF4-FFF2-40B4-BE49-F238E27FC236}">
+                <a16:creationId xmlns:a16="http://schemas.microsoft.com/office/drawing/2014/main" id="{7AA12554-1604-4EFD-B638-3C20FDD82402}"/>
+              </a:ext>
+            </a:extLst>
+          </p:cNvPr>
+          <p:cNvCxnSpPr>
+            <a:cxnSpLocks/>
+            <a:stCxn id="35" idx="3"/>
+            <a:endCxn id="41" idx="1"/>
+          </p:cNvCxnSpPr>
+          <p:nvPr/>
+        </p:nvCxnSpPr>
+        <p:spPr>
+          <a:xfrm flipV="1">
+            <a:off x="8161121" y="3686464"/>
+            <a:ext cx="1599788" cy="8773"/>
+          </a:xfrm>
+          <a:prstGeom prst="straightConnector1">
+            <a:avLst/>
+          </a:prstGeom>
+          <a:ln w="38100">
+            <a:solidFill>
+              <a:schemeClr val="tx1"/>
+            </a:solidFill>
+            <a:headEnd type="none" w="med" len="med"/>
+            <a:tailEnd type="triangle" w="med" len="med"/>
+          </a:ln>
+        </p:spPr>
+        <p:style>
+          <a:lnRef idx="1">
+            <a:schemeClr val="accent1"/>
+          </a:lnRef>
+          <a:fillRef idx="0">
+            <a:schemeClr val="accent1"/>
+          </a:fillRef>
+          <a:effectRef idx="0">
+            <a:schemeClr val="accent1"/>
+          </a:effectRef>
+          <a:fontRef idx="minor">
+            <a:schemeClr val="tx1"/>
+          </a:fontRef>
+        </p:style>
+      </p:cxnSp>
+      <p:cxnSp>
+        <p:nvCxnSpPr>
+          <p:cNvPr id="80" name="Straight Arrow Connector 79">
+            <a:extLst>
+              <a:ext uri="{FF2B5EF4-FFF2-40B4-BE49-F238E27FC236}">
+                <a16:creationId xmlns:a16="http://schemas.microsoft.com/office/drawing/2014/main" id="{2A468FB9-2883-4E8F-96AA-376C97EC54BE}"/>
+              </a:ext>
+            </a:extLst>
+          </p:cNvPr>
+          <p:cNvCxnSpPr>
+            <a:cxnSpLocks/>
+            <a:stCxn id="36" idx="1"/>
+            <a:endCxn id="38" idx="1"/>
+          </p:cNvCxnSpPr>
+          <p:nvPr/>
+        </p:nvCxnSpPr>
+        <p:spPr>
+          <a:xfrm flipH="1" flipV="1">
+            <a:off x="3558969" y="4322742"/>
+            <a:ext cx="2289968" cy="839386"/>
+          </a:xfrm>
+          <a:prstGeom prst="straightConnector1">
+            <a:avLst/>
+          </a:prstGeom>
+          <a:ln w="57150">
+            <a:solidFill>
+              <a:srgbClr val="C00000"/>
+            </a:solidFill>
+            <a:headEnd type="triangle" w="med" len="med"/>
+            <a:tailEnd type="none" w="med" len="med"/>
+          </a:ln>
+        </p:spPr>
+        <p:style>
+          <a:lnRef idx="1">
+            <a:schemeClr val="accent1"/>
+          </a:lnRef>
+          <a:fillRef idx="0">
+            <a:schemeClr val="accent1"/>
+          </a:fillRef>
+          <a:effectRef idx="0">
+            <a:schemeClr val="accent1"/>
+          </a:effectRef>
+          <a:fontRef idx="minor">
+            <a:schemeClr val="tx1"/>
+          </a:fontRef>
+        </p:style>
+      </p:cxnSp>
+      <p:cxnSp>
+        <p:nvCxnSpPr>
+          <p:cNvPr id="87" name="Straight Arrow Connector 86">
+            <a:extLst>
+              <a:ext uri="{FF2B5EF4-FFF2-40B4-BE49-F238E27FC236}">
+                <a16:creationId xmlns:a16="http://schemas.microsoft.com/office/drawing/2014/main" id="{BC15D763-604F-4249-BBEC-4C128B509249}"/>
+              </a:ext>
+            </a:extLst>
+          </p:cNvPr>
+          <p:cNvCxnSpPr>
+            <a:cxnSpLocks/>
+            <a:stCxn id="36" idx="3"/>
+            <a:endCxn id="40" idx="1"/>
+          </p:cNvCxnSpPr>
+          <p:nvPr/>
+        </p:nvCxnSpPr>
+        <p:spPr>
+          <a:xfrm>
+            <a:off x="8161121" y="5162128"/>
+            <a:ext cx="1753454" cy="0"/>
+          </a:xfrm>
+          <a:prstGeom prst="straightConnector1">
+            <a:avLst/>
+          </a:prstGeom>
+          <a:ln w="38100">
+            <a:solidFill>
+              <a:schemeClr val="tx1"/>
+            </a:solidFill>
+            <a:headEnd type="none" w="med" len="med"/>
+            <a:tailEnd type="triangle" w="med" len="med"/>
+          </a:ln>
+        </p:spPr>
+        <p:style>
+          <a:lnRef idx="1">
+            <a:schemeClr val="accent1"/>
+          </a:lnRef>
+          <a:fillRef idx="0">
+            <a:schemeClr val="accent1"/>
+          </a:fillRef>
+          <a:effectRef idx="0">
+            <a:schemeClr val="accent1"/>
+          </a:effectRef>
+          <a:fontRef idx="minor">
+            <a:schemeClr val="tx1"/>
+          </a:fontRef>
+        </p:style>
+      </p:cxnSp>
+      <p:sp>
+        <p:nvSpPr>
+          <p:cNvPr id="89" name="Flowchart: Terminator 88">
+            <a:extLst>
+              <a:ext uri="{FF2B5EF4-FFF2-40B4-BE49-F238E27FC236}">
+                <a16:creationId xmlns:a16="http://schemas.microsoft.com/office/drawing/2014/main" id="{5E9464CA-DFA2-4280-B3E0-F22A2B4A04C9}"/>
+              </a:ext>
+            </a:extLst>
+          </p:cNvPr>
+          <p:cNvSpPr/>
+          <p:nvPr/>
+        </p:nvSpPr>
+        <p:spPr>
+          <a:xfrm>
+            <a:off x="1177166" y="4659908"/>
+            <a:ext cx="2312184" cy="543807"/>
+          </a:xfrm>
+          <a:prstGeom prst="flowChartTerminator">
+            <a:avLst/>
+          </a:prstGeom>
+          <a:solidFill>
+            <a:schemeClr val="bg2"/>
+          </a:solidFill>
+          <a:ln>
+            <a:solidFill>
+              <a:schemeClr val="tx1"/>
+            </a:solidFill>
+          </a:ln>
+        </p:spPr>
+        <p:style>
+          <a:lnRef idx="2">
+            <a:schemeClr val="accent1">
+              <a:shade val="50000"/>
+            </a:schemeClr>
+          </a:lnRef>
+          <a:fillRef idx="1">
+            <a:schemeClr val="accent1"/>
+          </a:fillRef>
+          <a:effectRef idx="0">
+            <a:schemeClr val="accent1"/>
+          </a:effectRef>
+          <a:fontRef idx="minor">
+            <a:schemeClr val="lt1"/>
+          </a:fontRef>
+        </p:style>
+        <p:txBody>
+          <a:bodyPr rtlCol="0" anchor="ctr"/>
+          <a:lstStyle/>
+          <a:p>
+            <a:pPr algn="ctr"/>
+            <a:r>
+              <a:rPr lang="en-US" dirty="0">
+                <a:ln>
+                  <a:solidFill>
+                    <a:sysClr val="windowText" lastClr="000000"/>
+                  </a:solidFill>
+                </a:ln>
+                <a:solidFill>
+                  <a:sysClr val="windowText" lastClr="000000"/>
+                </a:solidFill>
+              </a:rPr>
+              <a:t>Generated Queues</a:t>
+            </a:r>
+            <a:endParaRPr lang="en-IL" dirty="0">
+              <a:ln>
+                <a:solidFill>
+                  <a:sysClr val="windowText" lastClr="000000"/>
+                </a:solidFill>
+              </a:ln>
+              <a:solidFill>
+                <a:sysClr val="windowText" lastClr="000000"/>
+              </a:solidFill>
+            </a:endParaRPr>
+          </a:p>
+        </p:txBody>
+      </p:sp>
+      <p:cxnSp>
+        <p:nvCxnSpPr>
+          <p:cNvPr id="90" name="Straight Arrow Connector 89">
+            <a:extLst>
+              <a:ext uri="{FF2B5EF4-FFF2-40B4-BE49-F238E27FC236}">
+                <a16:creationId xmlns:a16="http://schemas.microsoft.com/office/drawing/2014/main" id="{B9B03C4D-47D2-43FA-835B-F940E90CB699}"/>
+              </a:ext>
+            </a:extLst>
+          </p:cNvPr>
+          <p:cNvCxnSpPr>
+            <a:cxnSpLocks/>
+            <a:stCxn id="89" idx="3"/>
+            <a:endCxn id="38" idx="1"/>
+          </p:cNvCxnSpPr>
+          <p:nvPr/>
+        </p:nvCxnSpPr>
+        <p:spPr>
+          <a:xfrm flipV="1">
+            <a:off x="3489350" y="4322742"/>
+            <a:ext cx="69619" cy="609070"/>
+          </a:xfrm>
+          <a:prstGeom prst="straightConnector1">
+            <a:avLst/>
+          </a:prstGeom>
+          <a:ln w="57150">
+            <a:solidFill>
+              <a:srgbClr val="FF0000"/>
+            </a:solidFill>
+            <a:headEnd type="triangle" w="med" len="med"/>
+            <a:tailEnd type="none" w="med" len="med"/>
+          </a:ln>
+        </p:spPr>
+        <p:style>
+          <a:lnRef idx="1">
+            <a:schemeClr val="accent1"/>
+          </a:lnRef>
+          <a:fillRef idx="0">
+            <a:schemeClr val="accent1"/>
+          </a:fillRef>
+          <a:effectRef idx="0">
+            <a:schemeClr val="accent1"/>
+          </a:effectRef>
+          <a:fontRef idx="minor">
+            <a:schemeClr val="tx1"/>
+          </a:fontRef>
+        </p:style>
+      </p:cxnSp>
+      <p:cxnSp>
+        <p:nvCxnSpPr>
+          <p:cNvPr id="93" name="Straight Arrow Connector 92">
+            <a:extLst>
+              <a:ext uri="{FF2B5EF4-FFF2-40B4-BE49-F238E27FC236}">
+                <a16:creationId xmlns:a16="http://schemas.microsoft.com/office/drawing/2014/main" id="{F72F0204-1CF2-4A39-8812-DE321B494257}"/>
+              </a:ext>
+            </a:extLst>
+          </p:cNvPr>
+          <p:cNvCxnSpPr>
+            <a:cxnSpLocks/>
+            <a:stCxn id="39" idx="2"/>
+            <a:endCxn id="89" idx="1"/>
+          </p:cNvCxnSpPr>
+          <p:nvPr/>
+        </p:nvCxnSpPr>
+        <p:spPr>
+          <a:xfrm>
+            <a:off x="901442" y="4298194"/>
+            <a:ext cx="275724" cy="633618"/>
+          </a:xfrm>
+          <a:prstGeom prst="straightConnector1">
+            <a:avLst/>
+          </a:prstGeom>
+          <a:ln w="57150">
+            <a:solidFill>
+              <a:srgbClr val="FF0000"/>
+            </a:solidFill>
+            <a:headEnd type="triangle" w="med" len="med"/>
+            <a:tailEnd type="none" w="med" len="med"/>
+          </a:ln>
+        </p:spPr>
+        <p:style>
+          <a:lnRef idx="1">
+            <a:schemeClr val="accent1"/>
+          </a:lnRef>
+          <a:fillRef idx="0">
+            <a:schemeClr val="accent1"/>
+          </a:fillRef>
+          <a:effectRef idx="0">
+            <a:schemeClr val="accent1"/>
+          </a:effectRef>
+          <a:fontRef idx="minor">
+            <a:schemeClr val="tx1"/>
+          </a:fontRef>
+        </p:style>
+      </p:cxnSp>
+    </p:spTree>
+    <p:extLst>
+      <p:ext uri="{BB962C8B-B14F-4D97-AF65-F5344CB8AC3E}">
+        <p14:creationId xmlns:p14="http://schemas.microsoft.com/office/powerpoint/2010/main" val="820685915"/>
       </p:ext>
     </p:extLst>
   </p:cSld>

</xml_diff>

<commit_message>
made db persistent in through docker-compose, added ttl for records, added readme add basic tests
</commit_message>
<xml_diff>
--- a/etc/arch.pptx
+++ b/etc/arch.pptx
@@ -245,7 +245,7 @@
           <a:p>
             <a:fld id="{07C508A1-B328-4D3D-87DB-9A4595BE8C39}" type="datetimeFigureOut">
               <a:rPr lang="en-IL" smtClean="0"/>
-              <a:t>10/03/2021</a:t>
+              <a:t>12/03/2021</a:t>
             </a:fld>
             <a:endParaRPr lang="en-IL"/>
           </a:p>
@@ -415,7 +415,7 @@
           <a:p>
             <a:fld id="{07C508A1-B328-4D3D-87DB-9A4595BE8C39}" type="datetimeFigureOut">
               <a:rPr lang="en-IL" smtClean="0"/>
-              <a:t>10/03/2021</a:t>
+              <a:t>12/03/2021</a:t>
             </a:fld>
             <a:endParaRPr lang="en-IL"/>
           </a:p>
@@ -595,7 +595,7 @@
           <a:p>
             <a:fld id="{07C508A1-B328-4D3D-87DB-9A4595BE8C39}" type="datetimeFigureOut">
               <a:rPr lang="en-IL" smtClean="0"/>
-              <a:t>10/03/2021</a:t>
+              <a:t>12/03/2021</a:t>
             </a:fld>
             <a:endParaRPr lang="en-IL"/>
           </a:p>
@@ -765,7 +765,7 @@
           <a:p>
             <a:fld id="{07C508A1-B328-4D3D-87DB-9A4595BE8C39}" type="datetimeFigureOut">
               <a:rPr lang="en-IL" smtClean="0"/>
-              <a:t>10/03/2021</a:t>
+              <a:t>12/03/2021</a:t>
             </a:fld>
             <a:endParaRPr lang="en-IL"/>
           </a:p>
@@ -1011,7 +1011,7 @@
           <a:p>
             <a:fld id="{07C508A1-B328-4D3D-87DB-9A4595BE8C39}" type="datetimeFigureOut">
               <a:rPr lang="en-IL" smtClean="0"/>
-              <a:t>10/03/2021</a:t>
+              <a:t>12/03/2021</a:t>
             </a:fld>
             <a:endParaRPr lang="en-IL"/>
           </a:p>
@@ -1243,7 +1243,7 @@
           <a:p>
             <a:fld id="{07C508A1-B328-4D3D-87DB-9A4595BE8C39}" type="datetimeFigureOut">
               <a:rPr lang="en-IL" smtClean="0"/>
-              <a:t>10/03/2021</a:t>
+              <a:t>12/03/2021</a:t>
             </a:fld>
             <a:endParaRPr lang="en-IL"/>
           </a:p>
@@ -1610,7 +1610,7 @@
           <a:p>
             <a:fld id="{07C508A1-B328-4D3D-87DB-9A4595BE8C39}" type="datetimeFigureOut">
               <a:rPr lang="en-IL" smtClean="0"/>
-              <a:t>10/03/2021</a:t>
+              <a:t>12/03/2021</a:t>
             </a:fld>
             <a:endParaRPr lang="en-IL"/>
           </a:p>
@@ -1728,7 +1728,7 @@
           <a:p>
             <a:fld id="{07C508A1-B328-4D3D-87DB-9A4595BE8C39}" type="datetimeFigureOut">
               <a:rPr lang="en-IL" smtClean="0"/>
-              <a:t>10/03/2021</a:t>
+              <a:t>12/03/2021</a:t>
             </a:fld>
             <a:endParaRPr lang="en-IL"/>
           </a:p>
@@ -1823,7 +1823,7 @@
           <a:p>
             <a:fld id="{07C508A1-B328-4D3D-87DB-9A4595BE8C39}" type="datetimeFigureOut">
               <a:rPr lang="en-IL" smtClean="0"/>
-              <a:t>10/03/2021</a:t>
+              <a:t>12/03/2021</a:t>
             </a:fld>
             <a:endParaRPr lang="en-IL"/>
           </a:p>
@@ -2100,7 +2100,7 @@
           <a:p>
             <a:fld id="{07C508A1-B328-4D3D-87DB-9A4595BE8C39}" type="datetimeFigureOut">
               <a:rPr lang="en-IL" smtClean="0"/>
-              <a:t>10/03/2021</a:t>
+              <a:t>12/03/2021</a:t>
             </a:fld>
             <a:endParaRPr lang="en-IL"/>
           </a:p>
@@ -2357,7 +2357,7 @@
           <a:p>
             <a:fld id="{07C508A1-B328-4D3D-87DB-9A4595BE8C39}" type="datetimeFigureOut">
               <a:rPr lang="en-IL" smtClean="0"/>
-              <a:t>10/03/2021</a:t>
+              <a:t>12/03/2021</a:t>
             </a:fld>
             <a:endParaRPr lang="en-IL"/>
           </a:p>
@@ -2570,7 +2570,7 @@
           <a:p>
             <a:fld id="{07C508A1-B328-4D3D-87DB-9A4595BE8C39}" type="datetimeFigureOut">
               <a:rPr lang="en-IL" smtClean="0"/>
-              <a:t>10/03/2021</a:t>
+              <a:t>12/03/2021</a:t>
             </a:fld>
             <a:endParaRPr lang="en-IL"/>
           </a:p>
@@ -3597,7 +3597,7 @@
         </p:nvSpPr>
         <p:spPr>
           <a:xfrm>
-            <a:off x="3754203" y="1934877"/>
+            <a:off x="3727309" y="1656973"/>
             <a:ext cx="1663644" cy="1671700"/>
           </a:xfrm>
           <a:prstGeom prst="diamond">
@@ -3673,7 +3673,7 @@
         </p:nvSpPr>
         <p:spPr>
           <a:xfrm>
-            <a:off x="2890157" y="2802951"/>
+            <a:off x="2863263" y="2525047"/>
             <a:ext cx="1663644" cy="1671700"/>
           </a:xfrm>
           <a:prstGeom prst="diamond">
@@ -3857,7 +3857,7 @@
         </p:nvSpPr>
         <p:spPr>
           <a:xfrm>
-            <a:off x="3872285" y="4740930"/>
+            <a:off x="3190809" y="4252021"/>
             <a:ext cx="1006255" cy="974824"/>
           </a:xfrm>
           <a:prstGeom prst="diamond">
@@ -3913,11 +3913,11 @@
               <a:rPr lang="en-US" sz="1050" dirty="0">
                 <a:ln>
                   <a:solidFill>
-                    <a:srgbClr val="FF0000"/>
+                    <a:sysClr val="windowText" lastClr="000000"/>
                   </a:solidFill>
                 </a:ln>
                 <a:solidFill>
-                  <a:srgbClr val="FF0000"/>
+                  <a:sysClr val="windowText" lastClr="000000"/>
                 </a:solidFill>
               </a:rPr>
               <a:t>Write</a:t>
@@ -3925,11 +3925,11 @@
             <a:endParaRPr lang="en-IL" sz="1050" dirty="0">
               <a:ln>
                 <a:solidFill>
-                  <a:srgbClr val="FF0000"/>
+                  <a:sysClr val="windowText" lastClr="000000"/>
                 </a:solidFill>
               </a:ln>
               <a:solidFill>
-                <a:srgbClr val="FF0000"/>
+                <a:sysClr val="windowText" lastClr="000000"/>
               </a:solidFill>
             </a:endParaRPr>
           </a:p>
@@ -3951,8 +3951,8 @@
         </p:nvCxnSpPr>
         <p:spPr>
           <a:xfrm>
-            <a:off x="2611688" y="5257082"/>
-            <a:ext cx="1449665" cy="0"/>
+            <a:off x="2600455" y="4914687"/>
+            <a:ext cx="900128" cy="0"/>
           </a:xfrm>
           <a:prstGeom prst="straightConnector1">
             <a:avLst/>
@@ -3995,7 +3995,7 @@
         <p:spPr>
           <a:xfrm>
             <a:off x="8563941" y="1458807"/>
-            <a:ext cx="2203422" cy="2554545"/>
+            <a:ext cx="3170188" cy="2123658"/>
           </a:xfrm>
           <a:prstGeom prst="rect">
             <a:avLst/>
@@ -4016,7 +4016,7 @@
           <a:p>
             <a:r>
               <a:rPr lang="en-US" sz="1400" b="1" dirty="0"/>
-              <a:t>/fetch </a:t>
+              <a:t>/fetch/&lt;source&gt;/ID</a:t>
             </a:r>
           </a:p>
           <a:p>
@@ -4031,7 +4031,23 @@
           <a:p>
             <a:r>
               <a:rPr lang="en-US" sz="1400" b="1" dirty="0"/>
-              <a:t>/search-by</a:t>
+              <a:t>/filter/&lt;source&gt;?</a:t>
+            </a:r>
+            <a:r>
+              <a:rPr lang="en-US" sz="1400" b="1" dirty="0" err="1"/>
+              <a:t>gte</a:t>
+            </a:r>
+            <a:r>
+              <a:rPr lang="en-US" sz="1400" b="1" dirty="0"/>
+              <a:t>=&lt;int&gt;&amp;</a:t>
+            </a:r>
+            <a:r>
+              <a:rPr lang="en-US" sz="1400" b="1" dirty="0" err="1"/>
+              <a:t>lte</a:t>
+            </a:r>
+            <a:r>
+              <a:rPr lang="en-US" sz="1400" b="1" dirty="0"/>
+              <a:t>=&lt;int&gt;</a:t>
             </a:r>
           </a:p>
           <a:p>
@@ -4056,7 +4072,7 @@
         </p:nvSpPr>
         <p:spPr>
           <a:xfrm>
-            <a:off x="4401666" y="5256455"/>
+            <a:off x="3721229" y="4767546"/>
             <a:ext cx="1006255" cy="974824"/>
           </a:xfrm>
           <a:prstGeom prst="diamond">
@@ -4112,73 +4128,44 @@
               <a:rPr lang="en-US" sz="1050" dirty="0">
                 <a:ln>
                   <a:solidFill>
-                    <a:srgbClr val="00B0F0"/>
+                    <a:sysClr val="windowText" lastClr="000000"/>
                   </a:solidFill>
                 </a:ln>
                 <a:solidFill>
-                  <a:srgbClr val="00B0F0"/>
+                  <a:sysClr val="windowText" lastClr="000000"/>
                 </a:solidFill>
               </a:rPr>
               <a:t>Read</a:t>
             </a:r>
+          </a:p>
+          <a:p>
+            <a:pPr algn="ctr"/>
+            <a:r>
+              <a:rPr lang="en-US" sz="1050" dirty="0">
+                <a:ln>
+                  <a:solidFill>
+                    <a:sysClr val="windowText" lastClr="000000"/>
+                  </a:solidFill>
+                </a:ln>
+                <a:solidFill>
+                  <a:sysClr val="windowText" lastClr="000000"/>
+                </a:solidFill>
+              </a:rPr>
+              <a:t>ID</a:t>
+            </a:r>
             <a:endParaRPr lang="en-IL" sz="1050" dirty="0">
               <a:ln>
                 <a:solidFill>
-                  <a:srgbClr val="00B0F0"/>
+                  <a:sysClr val="windowText" lastClr="000000"/>
                 </a:solidFill>
               </a:ln>
               <a:solidFill>
-                <a:srgbClr val="00B0F0"/>
+                <a:sysClr val="windowText" lastClr="000000"/>
               </a:solidFill>
             </a:endParaRPr>
           </a:p>
         </p:txBody>
       </p:sp>
-      <p:cxnSp>
-        <p:nvCxnSpPr>
-          <p:cNvPr id="53" name="Straight Arrow Connector 52">
-            <a:extLst>
-              <a:ext uri="{FF2B5EF4-FFF2-40B4-BE49-F238E27FC236}">
-                <a16:creationId xmlns:a16="http://schemas.microsoft.com/office/drawing/2014/main" id="{5D805BCA-9CF8-4564-86A0-8FDC7BA860A8}"/>
-              </a:ext>
-            </a:extLst>
-          </p:cNvPr>
-          <p:cNvCxnSpPr>
-            <a:cxnSpLocks/>
-          </p:cNvCxnSpPr>
-          <p:nvPr/>
-        </p:nvCxnSpPr>
-        <p:spPr>
-          <a:xfrm>
-            <a:off x="2468076" y="5754496"/>
-            <a:ext cx="2153472" cy="0"/>
-          </a:xfrm>
-          <a:prstGeom prst="straightConnector1">
-            <a:avLst/>
-          </a:prstGeom>
-          <a:ln w="28575">
-            <a:solidFill>
-              <a:schemeClr val="tx1"/>
-            </a:solidFill>
-            <a:headEnd type="none" w="med" len="med"/>
-            <a:tailEnd type="triangle" w="med" len="med"/>
-          </a:ln>
-        </p:spPr>
-        <p:style>
-          <a:lnRef idx="1">
-            <a:schemeClr val="accent1"/>
-          </a:lnRef>
-          <a:fillRef idx="0">
-            <a:schemeClr val="accent1"/>
-          </a:fillRef>
-          <a:effectRef idx="0">
-            <a:schemeClr val="accent1"/>
-          </a:effectRef>
-          <a:fontRef idx="minor">
-            <a:schemeClr val="tx1"/>
-          </a:fontRef>
-        </p:style>
-      </p:cxnSp>
       <p:cxnSp>
         <p:nvCxnSpPr>
           <p:cNvPr id="64" name="Straight Arrow Connector 63">
@@ -4203,7 +4190,7 @@
           </a:prstGeom>
           <a:ln w="28575">
             <a:solidFill>
-              <a:schemeClr val="tx1"/>
+              <a:srgbClr val="FFFFFF"/>
             </a:solidFill>
             <a:tailEnd type="triangle"/>
           </a:ln>
@@ -4279,20 +4266,21 @@
           </p:cNvPr>
           <p:cNvCxnSpPr>
             <a:cxnSpLocks/>
+            <a:stCxn id="32" idx="4"/>
           </p:cNvCxnSpPr>
           <p:nvPr/>
         </p:nvCxnSpPr>
         <p:spPr>
           <a:xfrm flipH="1" flipV="1">
-            <a:off x="4994022" y="3151727"/>
-            <a:ext cx="835554" cy="60758"/>
+            <a:off x="4885491" y="2746070"/>
+            <a:ext cx="524905" cy="477947"/>
           </a:xfrm>
           <a:prstGeom prst="straightConnector1">
             <a:avLst/>
           </a:prstGeom>
           <a:ln w="28575">
             <a:solidFill>
-              <a:srgbClr val="00B0F0"/>
+              <a:srgbClr val="00B050"/>
             </a:solidFill>
             <a:tailEnd type="triangle"/>
           </a:ln>
@@ -4323,13 +4311,497 @@
           </p:cNvPr>
           <p:cNvCxnSpPr>
             <a:cxnSpLocks/>
+            <a:stCxn id="32" idx="4"/>
           </p:cNvCxnSpPr>
           <p:nvPr/>
         </p:nvCxnSpPr>
         <p:spPr>
           <a:xfrm flipH="1">
-            <a:off x="4137282" y="3212485"/>
-            <a:ext cx="1692294" cy="751694"/>
+            <a:off x="4121454" y="3224017"/>
+            <a:ext cx="1288942" cy="377769"/>
+          </a:xfrm>
+          <a:prstGeom prst="straightConnector1">
+            <a:avLst/>
+          </a:prstGeom>
+          <a:ln w="28575">
+            <a:solidFill>
+              <a:srgbClr val="00B050"/>
+            </a:solidFill>
+            <a:tailEnd type="triangle"/>
+          </a:ln>
+        </p:spPr>
+        <p:style>
+          <a:lnRef idx="1">
+            <a:schemeClr val="accent1"/>
+          </a:lnRef>
+          <a:fillRef idx="0">
+            <a:schemeClr val="accent1"/>
+          </a:fillRef>
+          <a:effectRef idx="0">
+            <a:schemeClr val="accent1"/>
+          </a:effectRef>
+          <a:fontRef idx="minor">
+            <a:schemeClr val="tx1"/>
+          </a:fontRef>
+        </p:style>
+      </p:cxnSp>
+      <p:cxnSp>
+        <p:nvCxnSpPr>
+          <p:cNvPr id="83" name="Straight Arrow Connector 82">
+            <a:extLst>
+              <a:ext uri="{FF2B5EF4-FFF2-40B4-BE49-F238E27FC236}">
+                <a16:creationId xmlns:a16="http://schemas.microsoft.com/office/drawing/2014/main" id="{0A348A48-F078-4E2F-ADA2-08B61ADF6CB6}"/>
+              </a:ext>
+            </a:extLst>
+          </p:cNvPr>
+          <p:cNvCxnSpPr>
+            <a:cxnSpLocks/>
+            <a:endCxn id="32" idx="4"/>
+          </p:cNvCxnSpPr>
+          <p:nvPr/>
+        </p:nvCxnSpPr>
+        <p:spPr>
+          <a:xfrm>
+            <a:off x="4722752" y="2985043"/>
+            <a:ext cx="687644" cy="238974"/>
+          </a:xfrm>
+          <a:prstGeom prst="straightConnector1">
+            <a:avLst/>
+          </a:prstGeom>
+          <a:ln w="28575">
+            <a:solidFill>
+              <a:srgbClr val="7030A0"/>
+            </a:solidFill>
+            <a:tailEnd type="triangle"/>
+          </a:ln>
+        </p:spPr>
+        <p:style>
+          <a:lnRef idx="1">
+            <a:schemeClr val="accent1"/>
+          </a:lnRef>
+          <a:fillRef idx="0">
+            <a:schemeClr val="accent1"/>
+          </a:fillRef>
+          <a:effectRef idx="0">
+            <a:schemeClr val="accent1"/>
+          </a:effectRef>
+          <a:fontRef idx="minor">
+            <a:schemeClr val="tx1"/>
+          </a:fontRef>
+        </p:style>
+      </p:cxnSp>
+      <p:cxnSp>
+        <p:nvCxnSpPr>
+          <p:cNvPr id="86" name="Straight Arrow Connector 85">
+            <a:extLst>
+              <a:ext uri="{FF2B5EF4-FFF2-40B4-BE49-F238E27FC236}">
+                <a16:creationId xmlns:a16="http://schemas.microsoft.com/office/drawing/2014/main" id="{8AEA3773-F1A8-458C-8CA5-11873F8B9AD8}"/>
+              </a:ext>
+            </a:extLst>
+          </p:cNvPr>
+          <p:cNvCxnSpPr>
+            <a:cxnSpLocks/>
+            <a:stCxn id="32" idx="3"/>
+          </p:cNvCxnSpPr>
+          <p:nvPr/>
+        </p:nvCxnSpPr>
+        <p:spPr>
+          <a:xfrm flipH="1">
+            <a:off x="3931518" y="4066581"/>
+            <a:ext cx="1057596" cy="541041"/>
+          </a:xfrm>
+          <a:prstGeom prst="straightConnector1">
+            <a:avLst/>
+          </a:prstGeom>
+          <a:ln w="28575">
+            <a:solidFill>
+              <a:schemeClr val="tx1"/>
+            </a:solidFill>
+            <a:tailEnd type="triangle"/>
+          </a:ln>
+        </p:spPr>
+        <p:style>
+          <a:lnRef idx="1">
+            <a:schemeClr val="accent1"/>
+          </a:lnRef>
+          <a:fillRef idx="0">
+            <a:schemeClr val="accent1"/>
+          </a:fillRef>
+          <a:effectRef idx="0">
+            <a:schemeClr val="accent1"/>
+          </a:effectRef>
+          <a:fontRef idx="minor">
+            <a:schemeClr val="tx1"/>
+          </a:fontRef>
+        </p:style>
+      </p:cxnSp>
+      <p:sp>
+        <p:nvSpPr>
+          <p:cNvPr id="2" name="TextBox 1">
+            <a:extLst>
+              <a:ext uri="{FF2B5EF4-FFF2-40B4-BE49-F238E27FC236}">
+                <a16:creationId xmlns:a16="http://schemas.microsoft.com/office/drawing/2014/main" id="{DB5CE5EE-111C-4F0B-8CA1-C9A252F4A3AE}"/>
+              </a:ext>
+            </a:extLst>
+          </p:cNvPr>
+          <p:cNvSpPr txBox="1"/>
+          <p:nvPr/>
+        </p:nvSpPr>
+        <p:spPr>
+          <a:xfrm>
+            <a:off x="273917" y="179510"/>
+            <a:ext cx="4563944" cy="830997"/>
+          </a:xfrm>
+          <a:prstGeom prst="rect">
+            <a:avLst/>
+          </a:prstGeom>
+          <a:noFill/>
+        </p:spPr>
+        <p:txBody>
+          <a:bodyPr wrap="square" rtlCol="0">
+            <a:spAutoFit/>
+          </a:bodyPr>
+          <a:lstStyle/>
+          <a:p>
+            <a:r>
+              <a:rPr lang="en-US" sz="4800" dirty="0">
+                <a:ln>
+                  <a:solidFill>
+                    <a:sysClr val="windowText" lastClr="000000"/>
+                  </a:solidFill>
+                </a:ln>
+                <a:solidFill>
+                  <a:sysClr val="windowText" lastClr="000000"/>
+                </a:solidFill>
+              </a:rPr>
+              <a:t>Architecture</a:t>
+            </a:r>
+            <a:endParaRPr lang="en-IL" sz="4800" dirty="0">
+              <a:ln>
+                <a:solidFill>
+                  <a:sysClr val="windowText" lastClr="000000"/>
+                </a:solidFill>
+              </a:ln>
+              <a:solidFill>
+                <a:sysClr val="windowText" lastClr="000000"/>
+              </a:solidFill>
+            </a:endParaRPr>
+          </a:p>
+        </p:txBody>
+      </p:sp>
+      <p:sp>
+        <p:nvSpPr>
+          <p:cNvPr id="34" name="Diamond 33">
+            <a:extLst>
+              <a:ext uri="{FF2B5EF4-FFF2-40B4-BE49-F238E27FC236}">
+                <a16:creationId xmlns:a16="http://schemas.microsoft.com/office/drawing/2014/main" id="{BFE64443-D005-4E7D-9384-E405782F0865}"/>
+              </a:ext>
+            </a:extLst>
+          </p:cNvPr>
+          <p:cNvSpPr/>
+          <p:nvPr/>
+        </p:nvSpPr>
+        <p:spPr>
+          <a:xfrm>
+            <a:off x="1252588" y="2189504"/>
+            <a:ext cx="1229185" cy="1166679"/>
+          </a:xfrm>
+          <a:prstGeom prst="diamond">
+            <a:avLst/>
+          </a:prstGeom>
+          <a:solidFill>
+            <a:schemeClr val="bg2"/>
+          </a:solidFill>
+          <a:ln w="28575">
+            <a:solidFill>
+              <a:schemeClr val="accent1"/>
+            </a:solidFill>
+          </a:ln>
+        </p:spPr>
+        <p:style>
+          <a:lnRef idx="2">
+            <a:schemeClr val="accent1">
+              <a:shade val="50000"/>
+            </a:schemeClr>
+          </a:lnRef>
+          <a:fillRef idx="1">
+            <a:schemeClr val="accent1"/>
+          </a:fillRef>
+          <a:effectRef idx="0">
+            <a:schemeClr val="accent1"/>
+          </a:effectRef>
+          <a:fontRef idx="minor">
+            <a:schemeClr val="lt1"/>
+          </a:fontRef>
+        </p:style>
+        <p:txBody>
+          <a:bodyPr rtlCol="0" anchor="ctr"/>
+          <a:lstStyle/>
+          <a:p>
+            <a:pPr algn="ctr"/>
+            <a:r>
+              <a:rPr lang="en-US" sz="1050" dirty="0">
+                <a:ln>
+                  <a:solidFill>
+                    <a:sysClr val="windowText" lastClr="000000"/>
+                  </a:solidFill>
+                </a:ln>
+                <a:solidFill>
+                  <a:sysClr val="windowText" lastClr="000000"/>
+                </a:solidFill>
+              </a:rPr>
+              <a:t>WLMRT </a:t>
+            </a:r>
+          </a:p>
+          <a:p>
+            <a:pPr algn="ctr"/>
+            <a:r>
+              <a:rPr lang="en-US" sz="1050" dirty="0">
+                <a:ln>
+                  <a:solidFill>
+                    <a:sysClr val="windowText" lastClr="000000"/>
+                  </a:solidFill>
+                </a:ln>
+                <a:solidFill>
+                  <a:sysClr val="windowText" lastClr="000000"/>
+                </a:solidFill>
+              </a:rPr>
+              <a:t>Header</a:t>
+            </a:r>
+          </a:p>
+          <a:p>
+            <a:pPr algn="ctr"/>
+            <a:r>
+              <a:rPr lang="en-US" sz="1050" dirty="0">
+                <a:ln>
+                  <a:solidFill>
+                    <a:sysClr val="windowText" lastClr="000000"/>
+                  </a:solidFill>
+                </a:ln>
+                <a:solidFill>
+                  <a:sysClr val="windowText" lastClr="000000"/>
+                </a:solidFill>
+              </a:rPr>
+              <a:t>Fetcher</a:t>
+            </a:r>
+          </a:p>
+        </p:txBody>
+      </p:sp>
+      <p:cxnSp>
+        <p:nvCxnSpPr>
+          <p:cNvPr id="35" name="Connector: Elbow 34">
+            <a:extLst>
+              <a:ext uri="{FF2B5EF4-FFF2-40B4-BE49-F238E27FC236}">
+                <a16:creationId xmlns:a16="http://schemas.microsoft.com/office/drawing/2014/main" id="{547F5C9D-5AF5-454F-AC2F-DF2772ECE240}"/>
+              </a:ext>
+            </a:extLst>
+          </p:cNvPr>
+          <p:cNvCxnSpPr>
+            <a:cxnSpLocks/>
+            <a:endCxn id="34" idx="0"/>
+          </p:cNvCxnSpPr>
+          <p:nvPr/>
+        </p:nvCxnSpPr>
+        <p:spPr>
+          <a:xfrm rot="10800000" flipV="1">
+            <a:off x="1867182" y="1323090"/>
+            <a:ext cx="5421409" cy="866414"/>
+          </a:xfrm>
+          <a:prstGeom prst="bentConnector2">
+            <a:avLst/>
+          </a:prstGeom>
+          <a:ln w="19050">
+            <a:solidFill>
+              <a:schemeClr val="tx1"/>
+            </a:solidFill>
+            <a:headEnd type="triangle" w="med" len="med"/>
+            <a:tailEnd type="none" w="med" len="med"/>
+          </a:ln>
+        </p:spPr>
+        <p:style>
+          <a:lnRef idx="1">
+            <a:schemeClr val="accent1"/>
+          </a:lnRef>
+          <a:fillRef idx="0">
+            <a:schemeClr val="accent1"/>
+          </a:fillRef>
+          <a:effectRef idx="0">
+            <a:schemeClr val="accent1"/>
+          </a:effectRef>
+          <a:fontRef idx="minor">
+            <a:schemeClr val="tx1"/>
+          </a:fontRef>
+        </p:style>
+      </p:cxnSp>
+      <p:cxnSp>
+        <p:nvCxnSpPr>
+          <p:cNvPr id="16" name="Straight Connector 15">
+            <a:extLst>
+              <a:ext uri="{FF2B5EF4-FFF2-40B4-BE49-F238E27FC236}">
+                <a16:creationId xmlns:a16="http://schemas.microsoft.com/office/drawing/2014/main" id="{9C4E51CB-8F1E-448B-9C9F-49612F083760}"/>
+              </a:ext>
+            </a:extLst>
+          </p:cNvPr>
+          <p:cNvCxnSpPr>
+            <a:cxnSpLocks/>
+          </p:cNvCxnSpPr>
+          <p:nvPr/>
+        </p:nvCxnSpPr>
+        <p:spPr>
+          <a:xfrm>
+            <a:off x="2351363" y="2787971"/>
+            <a:ext cx="637822" cy="597842"/>
+          </a:xfrm>
+          <a:prstGeom prst="line">
+            <a:avLst/>
+          </a:prstGeom>
+          <a:ln w="28575">
+            <a:solidFill>
+              <a:schemeClr val="tx1"/>
+            </a:solidFill>
+          </a:ln>
+        </p:spPr>
+        <p:style>
+          <a:lnRef idx="1">
+            <a:schemeClr val="accent1"/>
+          </a:lnRef>
+          <a:fillRef idx="0">
+            <a:schemeClr val="accent1"/>
+          </a:fillRef>
+          <a:effectRef idx="0">
+            <a:schemeClr val="accent1"/>
+          </a:effectRef>
+          <a:fontRef idx="minor">
+            <a:schemeClr val="tx1"/>
+          </a:fontRef>
+        </p:style>
+      </p:cxnSp>
+      <p:sp>
+        <p:nvSpPr>
+          <p:cNvPr id="37" name="Diamond 36">
+            <a:extLst>
+              <a:ext uri="{FF2B5EF4-FFF2-40B4-BE49-F238E27FC236}">
+                <a16:creationId xmlns:a16="http://schemas.microsoft.com/office/drawing/2014/main" id="{EBF49D18-F8BD-4CC2-8832-B0A96D733E22}"/>
+              </a:ext>
+            </a:extLst>
+          </p:cNvPr>
+          <p:cNvSpPr/>
+          <p:nvPr/>
+        </p:nvSpPr>
+        <p:spPr>
+          <a:xfrm>
+            <a:off x="4251223" y="5282460"/>
+            <a:ext cx="1006255" cy="974824"/>
+          </a:xfrm>
+          <a:prstGeom prst="diamond">
+            <a:avLst/>
+          </a:prstGeom>
+          <a:solidFill>
+            <a:schemeClr val="bg2"/>
+          </a:solidFill>
+          <a:ln w="28575">
+            <a:solidFill>
+              <a:schemeClr val="accent1"/>
+            </a:solidFill>
+          </a:ln>
+        </p:spPr>
+        <p:style>
+          <a:lnRef idx="2">
+            <a:schemeClr val="accent1">
+              <a:shade val="50000"/>
+            </a:schemeClr>
+          </a:lnRef>
+          <a:fillRef idx="1">
+            <a:schemeClr val="accent1"/>
+          </a:fillRef>
+          <a:effectRef idx="0">
+            <a:schemeClr val="accent1"/>
+          </a:effectRef>
+          <a:fontRef idx="minor">
+            <a:schemeClr val="lt1"/>
+          </a:fontRef>
+        </p:style>
+        <p:txBody>
+          <a:bodyPr rtlCol="0" anchor="ctr"/>
+          <a:lstStyle/>
+          <a:p>
+            <a:pPr algn="ctr"/>
+            <a:r>
+              <a:rPr lang="en-US" sz="1050" dirty="0">
+                <a:ln>
+                  <a:solidFill>
+                    <a:sysClr val="windowText" lastClr="000000"/>
+                  </a:solidFill>
+                </a:ln>
+                <a:solidFill>
+                  <a:sysClr val="windowText" lastClr="000000"/>
+                </a:solidFill>
+              </a:rPr>
+              <a:t>DB </a:t>
+            </a:r>
+          </a:p>
+          <a:p>
+            <a:pPr algn="ctr"/>
+            <a:r>
+              <a:rPr lang="en-US" sz="1050" dirty="0">
+                <a:ln>
+                  <a:solidFill>
+                    <a:sysClr val="windowText" lastClr="000000"/>
+                  </a:solidFill>
+                </a:ln>
+                <a:solidFill>
+                  <a:sysClr val="windowText" lastClr="000000"/>
+                </a:solidFill>
+              </a:rPr>
+              <a:t>Read</a:t>
+            </a:r>
+          </a:p>
+          <a:p>
+            <a:pPr algn="ctr"/>
+            <a:r>
+              <a:rPr lang="en-US" sz="1050" dirty="0">
+                <a:ln>
+                  <a:solidFill>
+                    <a:sysClr val="windowText" lastClr="000000"/>
+                  </a:solidFill>
+                </a:ln>
+                <a:solidFill>
+                  <a:sysClr val="windowText" lastClr="000000"/>
+                </a:solidFill>
+              </a:rPr>
+              <a:t>Filter</a:t>
+            </a:r>
+            <a:endParaRPr lang="en-IL" sz="1050" dirty="0">
+              <a:ln>
+                <a:solidFill>
+                  <a:sysClr val="windowText" lastClr="000000"/>
+                </a:solidFill>
+              </a:ln>
+              <a:solidFill>
+                <a:sysClr val="windowText" lastClr="000000"/>
+              </a:solidFill>
+            </a:endParaRPr>
+          </a:p>
+        </p:txBody>
+      </p:sp>
+      <p:cxnSp>
+        <p:nvCxnSpPr>
+          <p:cNvPr id="42" name="Straight Arrow Connector 41">
+            <a:extLst>
+              <a:ext uri="{FF2B5EF4-FFF2-40B4-BE49-F238E27FC236}">
+                <a16:creationId xmlns:a16="http://schemas.microsoft.com/office/drawing/2014/main" id="{A9C72FC5-AFC9-40DE-BC78-D96EDBBCE1AB}"/>
+              </a:ext>
+            </a:extLst>
+          </p:cNvPr>
+          <p:cNvCxnSpPr>
+            <a:cxnSpLocks/>
+          </p:cNvCxnSpPr>
+          <p:nvPr/>
+        </p:nvCxnSpPr>
+        <p:spPr>
+          <a:xfrm flipH="1">
+            <a:off x="4458694" y="4908875"/>
+            <a:ext cx="952902" cy="182729"/>
           </a:xfrm>
           <a:prstGeom prst="straightConnector1">
             <a:avLst/>
@@ -4372,8 +4844,8 @@
         </p:nvCxnSpPr>
         <p:spPr>
           <a:xfrm flipH="1">
-            <a:off x="5045071" y="4884185"/>
-            <a:ext cx="784505" cy="711014"/>
+            <a:off x="4889006" y="4908875"/>
+            <a:ext cx="521391" cy="651505"/>
           </a:xfrm>
           <a:prstGeom prst="straightConnector1">
             <a:avLst/>
@@ -4381,94 +4853,6 @@
           <a:ln w="28575">
             <a:solidFill>
               <a:srgbClr val="00B0F0"/>
-            </a:solidFill>
-            <a:tailEnd type="triangle"/>
-          </a:ln>
-        </p:spPr>
-        <p:style>
-          <a:lnRef idx="1">
-            <a:schemeClr val="accent1"/>
-          </a:lnRef>
-          <a:fillRef idx="0">
-            <a:schemeClr val="accent1"/>
-          </a:fillRef>
-          <a:effectRef idx="0">
-            <a:schemeClr val="accent1"/>
-          </a:effectRef>
-          <a:fontRef idx="minor">
-            <a:schemeClr val="tx1"/>
-          </a:fontRef>
-        </p:style>
-      </p:cxnSp>
-      <p:cxnSp>
-        <p:nvCxnSpPr>
-          <p:cNvPr id="83" name="Straight Arrow Connector 82">
-            <a:extLst>
-              <a:ext uri="{FF2B5EF4-FFF2-40B4-BE49-F238E27FC236}">
-                <a16:creationId xmlns:a16="http://schemas.microsoft.com/office/drawing/2014/main" id="{0A348A48-F078-4E2F-ADA2-08B61ADF6CB6}"/>
-              </a:ext>
-            </a:extLst>
-          </p:cNvPr>
-          <p:cNvCxnSpPr>
-            <a:cxnSpLocks/>
-          </p:cNvCxnSpPr>
-          <p:nvPr/>
-        </p:nvCxnSpPr>
-        <p:spPr>
-          <a:xfrm>
-            <a:off x="4921826" y="3235059"/>
-            <a:ext cx="75928" cy="813276"/>
-          </a:xfrm>
-          <a:prstGeom prst="straightConnector1">
-            <a:avLst/>
-          </a:prstGeom>
-          <a:ln w="28575">
-            <a:solidFill>
-              <a:srgbClr val="FF0000"/>
-            </a:solidFill>
-            <a:tailEnd type="triangle"/>
-          </a:ln>
-        </p:spPr>
-        <p:style>
-          <a:lnRef idx="1">
-            <a:schemeClr val="accent1"/>
-          </a:lnRef>
-          <a:fillRef idx="0">
-            <a:schemeClr val="accent1"/>
-          </a:fillRef>
-          <a:effectRef idx="0">
-            <a:schemeClr val="accent1"/>
-          </a:effectRef>
-          <a:fontRef idx="minor">
-            <a:schemeClr val="tx1"/>
-          </a:fontRef>
-        </p:style>
-      </p:cxnSp>
-      <p:cxnSp>
-        <p:nvCxnSpPr>
-          <p:cNvPr id="86" name="Straight Arrow Connector 85">
-            <a:extLst>
-              <a:ext uri="{FF2B5EF4-FFF2-40B4-BE49-F238E27FC236}">
-                <a16:creationId xmlns:a16="http://schemas.microsoft.com/office/drawing/2014/main" id="{8AEA3773-F1A8-458C-8CA5-11873F8B9AD8}"/>
-              </a:ext>
-            </a:extLst>
-          </p:cNvPr>
-          <p:cNvCxnSpPr>
-            <a:cxnSpLocks/>
-          </p:cNvCxnSpPr>
-          <p:nvPr/>
-        </p:nvCxnSpPr>
-        <p:spPr>
-          <a:xfrm flipV="1">
-            <a:off x="4061353" y="4048335"/>
-            <a:ext cx="936401" cy="40320"/>
-          </a:xfrm>
-          <a:prstGeom prst="straightConnector1">
-            <a:avLst/>
-          </a:prstGeom>
-          <a:ln w="28575">
-            <a:solidFill>
-              <a:srgbClr val="FF0000"/>
             </a:solidFill>
             <a:tailEnd type="triangle"/>
           </a:ln>
@@ -4503,9 +4887,9 @@
           <p:nvPr/>
         </p:nvCxnSpPr>
         <p:spPr>
-          <a:xfrm flipH="1">
-            <a:off x="4587615" y="4048335"/>
-            <a:ext cx="410139" cy="1051396"/>
+          <a:xfrm flipV="1">
+            <a:off x="5070136" y="4931718"/>
+            <a:ext cx="333885" cy="721991"/>
           </a:xfrm>
           <a:prstGeom prst="straightConnector1">
             <a:avLst/>
@@ -4532,187 +4916,33 @@
           </a:fontRef>
         </p:style>
       </p:cxnSp>
-      <p:sp>
-        <p:nvSpPr>
-          <p:cNvPr id="2" name="TextBox 1">
+      <p:cxnSp>
+        <p:nvCxnSpPr>
+          <p:cNvPr id="55" name="Straight Arrow Connector 54">
             <a:extLst>
               <a:ext uri="{FF2B5EF4-FFF2-40B4-BE49-F238E27FC236}">
-                <a16:creationId xmlns:a16="http://schemas.microsoft.com/office/drawing/2014/main" id="{DB5CE5EE-111C-4F0B-8CA1-C9A252F4A3AE}"/>
-              </a:ext>
-            </a:extLst>
-          </p:cNvPr>
-          <p:cNvSpPr txBox="1"/>
-          <p:nvPr/>
-        </p:nvSpPr>
-        <p:spPr>
-          <a:xfrm>
-            <a:off x="273917" y="179510"/>
-            <a:ext cx="4563944" cy="830997"/>
-          </a:xfrm>
-          <a:prstGeom prst="rect">
-            <a:avLst/>
-          </a:prstGeom>
-          <a:noFill/>
-        </p:spPr>
-        <p:txBody>
-          <a:bodyPr wrap="square" rtlCol="0">
-            <a:spAutoFit/>
-          </a:bodyPr>
-          <a:lstStyle/>
-          <a:p>
-            <a:r>
-              <a:rPr lang="en-US" sz="4800" dirty="0">
-                <a:ln>
-                  <a:solidFill>
-                    <a:sysClr val="windowText" lastClr="000000"/>
-                  </a:solidFill>
-                </a:ln>
-                <a:solidFill>
-                  <a:sysClr val="windowText" lastClr="000000"/>
-                </a:solidFill>
-              </a:rPr>
-              <a:t>Architecture</a:t>
-            </a:r>
-            <a:endParaRPr lang="en-IL" sz="4800" dirty="0">
-              <a:ln>
-                <a:solidFill>
-                  <a:sysClr val="windowText" lastClr="000000"/>
-                </a:solidFill>
-              </a:ln>
-              <a:solidFill>
-                <a:sysClr val="windowText" lastClr="000000"/>
-              </a:solidFill>
-            </a:endParaRPr>
-          </a:p>
-        </p:txBody>
-      </p:sp>
-      <p:sp>
-        <p:nvSpPr>
-          <p:cNvPr id="34" name="Diamond 33">
-            <a:extLst>
-              <a:ext uri="{FF2B5EF4-FFF2-40B4-BE49-F238E27FC236}">
-                <a16:creationId xmlns:a16="http://schemas.microsoft.com/office/drawing/2014/main" id="{BFE64443-D005-4E7D-9384-E405782F0865}"/>
-              </a:ext>
-            </a:extLst>
-          </p:cNvPr>
-          <p:cNvSpPr/>
-          <p:nvPr/>
-        </p:nvSpPr>
-        <p:spPr>
-          <a:xfrm>
-            <a:off x="1252588" y="2189504"/>
-            <a:ext cx="1229185" cy="1166679"/>
-          </a:xfrm>
-          <a:prstGeom prst="diamond">
-            <a:avLst/>
-          </a:prstGeom>
-          <a:solidFill>
-            <a:schemeClr val="bg2"/>
-          </a:solidFill>
-          <a:ln w="28575">
-            <a:solidFill>
-              <a:schemeClr val="accent1"/>
-            </a:solidFill>
-          </a:ln>
-        </p:spPr>
-        <p:style>
-          <a:lnRef idx="2">
-            <a:schemeClr val="accent1">
-              <a:shade val="50000"/>
-            </a:schemeClr>
-          </a:lnRef>
-          <a:fillRef idx="1">
-            <a:schemeClr val="accent1"/>
-          </a:fillRef>
-          <a:effectRef idx="0">
-            <a:schemeClr val="accent1"/>
-          </a:effectRef>
-          <a:fontRef idx="minor">
-            <a:schemeClr val="lt1"/>
-          </a:fontRef>
-        </p:style>
-        <p:txBody>
-          <a:bodyPr rtlCol="0" anchor="ctr"/>
-          <a:lstStyle/>
-          <a:p>
-            <a:pPr algn="ctr"/>
-            <a:r>
-              <a:rPr lang="en-US" sz="1050" dirty="0">
-                <a:ln>
-                  <a:solidFill>
-                    <a:sysClr val="windowText" lastClr="000000"/>
-                  </a:solidFill>
-                </a:ln>
-                <a:solidFill>
-                  <a:sysClr val="windowText" lastClr="000000"/>
-                </a:solidFill>
-              </a:rPr>
-              <a:t>WLMRT </a:t>
-            </a:r>
-          </a:p>
-          <a:p>
-            <a:pPr algn="ctr"/>
-            <a:r>
-              <a:rPr lang="en-US" sz="1050" dirty="0">
-                <a:ln>
-                  <a:solidFill>
-                    <a:sysClr val="windowText" lastClr="000000"/>
-                  </a:solidFill>
-                </a:ln>
-                <a:solidFill>
-                  <a:sysClr val="windowText" lastClr="000000"/>
-                </a:solidFill>
-              </a:rPr>
-              <a:t>Header</a:t>
-            </a:r>
-          </a:p>
-          <a:p>
-            <a:pPr algn="ctr"/>
-            <a:r>
-              <a:rPr lang="en-US" sz="1050" dirty="0">
-                <a:ln>
-                  <a:solidFill>
-                    <a:sysClr val="windowText" lastClr="000000"/>
-                  </a:solidFill>
-                </a:ln>
-                <a:solidFill>
-                  <a:sysClr val="windowText" lastClr="000000"/>
-                </a:solidFill>
-              </a:rPr>
-              <a:t>Fetcher</a:t>
-            </a:r>
-          </a:p>
-        </p:txBody>
-      </p:sp>
-      <p:cxnSp>
-        <p:nvCxnSpPr>
-          <p:cNvPr id="35" name="Connector: Elbow 34">
-            <a:extLst>
-              <a:ext uri="{FF2B5EF4-FFF2-40B4-BE49-F238E27FC236}">
-                <a16:creationId xmlns:a16="http://schemas.microsoft.com/office/drawing/2014/main" id="{547F5C9D-5AF5-454F-AC2F-DF2772ECE240}"/>
+                <a16:creationId xmlns:a16="http://schemas.microsoft.com/office/drawing/2014/main" id="{65BD91B5-DC97-44BB-AE87-E946DDB7410B}"/>
               </a:ext>
             </a:extLst>
           </p:cNvPr>
           <p:cNvCxnSpPr>
             <a:cxnSpLocks/>
-            <a:endCxn id="34" idx="0"/>
           </p:cNvCxnSpPr>
           <p:nvPr/>
         </p:nvCxnSpPr>
         <p:spPr>
-          <a:xfrm rot="10800000" flipV="1">
-            <a:off x="1867182" y="1323090"/>
-            <a:ext cx="5421409" cy="866414"/>
-          </a:xfrm>
-          <a:prstGeom prst="bentConnector2">
+          <a:xfrm flipV="1">
+            <a:off x="4360585" y="4908899"/>
+            <a:ext cx="1049812" cy="11532"/>
+          </a:xfrm>
+          <a:prstGeom prst="straightConnector1">
             <a:avLst/>
           </a:prstGeom>
-          <a:ln w="19050">
+          <a:ln w="28575">
             <a:solidFill>
-              <a:schemeClr val="tx1"/>
+              <a:srgbClr val="FF0000"/>
             </a:solidFill>
-            <a:headEnd type="triangle" w="med" len="med"/>
-            <a:tailEnd type="none" w="med" len="med"/>
+            <a:tailEnd type="triangle"/>
           </a:ln>
         </p:spPr>
         <p:style>
@@ -4732,10 +4962,55 @@
       </p:cxnSp>
       <p:cxnSp>
         <p:nvCxnSpPr>
-          <p:cNvPr id="16" name="Straight Connector 15">
+          <p:cNvPr id="63" name="Straight Arrow Connector 62">
             <a:extLst>
               <a:ext uri="{FF2B5EF4-FFF2-40B4-BE49-F238E27FC236}">
-                <a16:creationId xmlns:a16="http://schemas.microsoft.com/office/drawing/2014/main" id="{9C4E51CB-8F1E-448B-9C9F-49612F083760}"/>
+                <a16:creationId xmlns:a16="http://schemas.microsoft.com/office/drawing/2014/main" id="{15E3A89F-864E-47C6-8EE2-B39E5DD79EB0}"/>
+              </a:ext>
+            </a:extLst>
+          </p:cNvPr>
+          <p:cNvCxnSpPr>
+            <a:cxnSpLocks/>
+            <a:endCxn id="32" idx="4"/>
+          </p:cNvCxnSpPr>
+          <p:nvPr/>
+        </p:nvCxnSpPr>
+        <p:spPr>
+          <a:xfrm flipV="1">
+            <a:off x="3923929" y="3224017"/>
+            <a:ext cx="1486467" cy="665441"/>
+          </a:xfrm>
+          <a:prstGeom prst="straightConnector1">
+            <a:avLst/>
+          </a:prstGeom>
+          <a:ln w="28575">
+            <a:solidFill>
+              <a:srgbClr val="7030A0"/>
+            </a:solidFill>
+            <a:tailEnd type="triangle"/>
+          </a:ln>
+        </p:spPr>
+        <p:style>
+          <a:lnRef idx="1">
+            <a:schemeClr val="accent1"/>
+          </a:lnRef>
+          <a:fillRef idx="0">
+            <a:schemeClr val="accent1"/>
+          </a:fillRef>
+          <a:effectRef idx="0">
+            <a:schemeClr val="accent1"/>
+          </a:effectRef>
+          <a:fontRef idx="minor">
+            <a:schemeClr val="tx1"/>
+          </a:fontRef>
+        </p:style>
+      </p:cxnSp>
+      <p:cxnSp>
+        <p:nvCxnSpPr>
+          <p:cNvPr id="53" name="Straight Arrow Connector 52">
+            <a:extLst>
+              <a:ext uri="{FF2B5EF4-FFF2-40B4-BE49-F238E27FC236}">
+                <a16:creationId xmlns:a16="http://schemas.microsoft.com/office/drawing/2014/main" id="{5D805BCA-9CF8-4564-86A0-8FDC7BA860A8}"/>
               </a:ext>
             </a:extLst>
           </p:cNvPr>
@@ -4746,16 +5021,18 @@
         </p:nvCxnSpPr>
         <p:spPr>
           <a:xfrm>
-            <a:off x="2252335" y="2832100"/>
-            <a:ext cx="784311" cy="828393"/>
-          </a:xfrm>
-          <a:prstGeom prst="line">
+            <a:off x="2337971" y="5742370"/>
+            <a:ext cx="1957702" cy="0"/>
+          </a:xfrm>
+          <a:prstGeom prst="straightConnector1">
             <a:avLst/>
           </a:prstGeom>
           <a:ln w="28575">
             <a:solidFill>
               <a:schemeClr val="tx1"/>
             </a:solidFill>
+            <a:headEnd type="none" w="med" len="med"/>
+            <a:tailEnd type="triangle" w="med" len="med"/>
           </a:ln>
         </p:spPr>
         <p:style>
@@ -4818,7 +5095,7 @@
         <p:spPr>
           <a:xfrm>
             <a:off x="273917" y="151313"/>
-            <a:ext cx="4563944" cy="1569660"/>
+            <a:ext cx="4563944" cy="2308324"/>
           </a:xfrm>
           <a:prstGeom prst="rect">
             <a:avLst/>
@@ -4842,7 +5119,7 @@
                   <a:sysClr val="windowText" lastClr="000000"/>
                 </a:solidFill>
               </a:rPr>
-              <a:t>Rabbit Architecture 1</a:t>
+              <a:t>Rabbit Architecture v0.0.2</a:t>
             </a:r>
             <a:endParaRPr lang="en-IL" sz="4800" dirty="0">
               <a:ln>
@@ -5639,7 +5916,7 @@
         </p:nvCxnSpPr>
         <p:spPr>
           <a:xfrm>
-            <a:off x="1417021" y="3164810"/>
+            <a:off x="1417021" y="3166426"/>
             <a:ext cx="1012042" cy="0"/>
           </a:xfrm>
           <a:prstGeom prst="straightConnector1">
@@ -5649,7 +5926,8 @@
             <a:solidFill>
               <a:srgbClr val="00B0F0"/>
             </a:solidFill>
-            <a:tailEnd type="triangle"/>
+            <a:headEnd type="triangle" w="med" len="med"/>
+            <a:tailEnd type="triangle" w="med" len="med"/>
           </a:ln>
         </p:spPr>
         <p:style>
@@ -5695,7 +5973,8 @@
             <a:solidFill>
               <a:srgbClr val="00B0F0"/>
             </a:solidFill>
-            <a:tailEnd type="triangle"/>
+            <a:headEnd type="triangle" w="med" len="med"/>
+            <a:tailEnd type="triangle" w="med" len="med"/>
           </a:ln>
         </p:spPr>
         <p:style>
@@ -5744,7 +6023,8 @@
                 <a:lumOff val="40000"/>
               </a:schemeClr>
             </a:solidFill>
-            <a:tailEnd type="triangle"/>
+            <a:headEnd type="triangle" w="med" len="med"/>
+            <a:tailEnd type="triangle" w="med" len="med"/>
           </a:ln>
         </p:spPr>
         <p:style>
@@ -5773,14 +6053,12 @@
           </p:cNvPr>
           <p:cNvCxnSpPr>
             <a:cxnSpLocks/>
-            <a:stCxn id="38" idx="5"/>
-            <a:endCxn id="34" idx="1"/>
           </p:cNvCxnSpPr>
           <p:nvPr/>
         </p:nvCxnSpPr>
         <p:spPr>
           <a:xfrm flipV="1">
-            <a:off x="3558969" y="2293368"/>
+            <a:off x="3558969" y="2321565"/>
             <a:ext cx="2289968" cy="344247"/>
           </a:xfrm>
           <a:prstGeom prst="straightConnector1">
@@ -5792,7 +6070,8 @@
                 <a:lumMod val="75000"/>
               </a:schemeClr>
             </a:solidFill>
-            <a:tailEnd type="triangle"/>
+            <a:headEnd type="triangle" w="med" len="med"/>
+            <a:tailEnd type="triangle" w="med" len="med"/>
           </a:ln>
         </p:spPr>
         <p:style>
@@ -5810,146 +6089,6 @@
           </a:fontRef>
         </p:style>
       </p:cxnSp>
-      <p:sp>
-        <p:nvSpPr>
-          <p:cNvPr id="46" name="TextBox 45">
-            <a:extLst>
-              <a:ext uri="{FF2B5EF4-FFF2-40B4-BE49-F238E27FC236}">
-                <a16:creationId xmlns:a16="http://schemas.microsoft.com/office/drawing/2014/main" id="{80A18AB9-7BD3-49E7-BFA1-5B249546C0EF}"/>
-              </a:ext>
-            </a:extLst>
-          </p:cNvPr>
-          <p:cNvSpPr txBox="1"/>
-          <p:nvPr/>
-        </p:nvSpPr>
-        <p:spPr>
-          <a:xfrm>
-            <a:off x="5848937" y="1703645"/>
-            <a:ext cx="2476500" cy="369332"/>
-          </a:xfrm>
-          <a:prstGeom prst="rect">
-            <a:avLst/>
-          </a:prstGeom>
-          <a:noFill/>
-        </p:spPr>
-        <p:txBody>
-          <a:bodyPr wrap="square" rtlCol="0">
-            <a:spAutoFit/>
-          </a:bodyPr>
-          <a:lstStyle/>
-          <a:p>
-            <a:r>
-              <a:rPr lang="en-US" dirty="0" err="1"/>
-              <a:t>routing_key</a:t>
-            </a:r>
-            <a:r>
-              <a:rPr lang="en-US" dirty="0"/>
-              <a:t>: amazon</a:t>
-            </a:r>
-            <a:endParaRPr lang="en-IL" dirty="0"/>
-          </a:p>
-        </p:txBody>
-      </p:sp>
-      <p:sp>
-        <p:nvSpPr>
-          <p:cNvPr id="65" name="TextBox 64">
-            <a:extLst>
-              <a:ext uri="{FF2B5EF4-FFF2-40B4-BE49-F238E27FC236}">
-                <a16:creationId xmlns:a16="http://schemas.microsoft.com/office/drawing/2014/main" id="{AEA5426B-8875-46C6-AC55-C8CE8E59E7E2}"/>
-              </a:ext>
-            </a:extLst>
-          </p:cNvPr>
-          <p:cNvSpPr txBox="1"/>
-          <p:nvPr/>
-        </p:nvSpPr>
-        <p:spPr>
-          <a:xfrm>
-            <a:off x="5848937" y="3093012"/>
-            <a:ext cx="2476500" cy="369332"/>
-          </a:xfrm>
-          <a:prstGeom prst="rect">
-            <a:avLst/>
-          </a:prstGeom>
-          <a:noFill/>
-        </p:spPr>
-        <p:txBody>
-          <a:bodyPr wrap="square" rtlCol="0">
-            <a:spAutoFit/>
-          </a:bodyPr>
-          <a:lstStyle/>
-          <a:p>
-            <a:r>
-              <a:rPr lang="en-US" dirty="0" err="1"/>
-              <a:t>routing_key</a:t>
-            </a:r>
-            <a:r>
-              <a:rPr lang="en-US" dirty="0"/>
-              <a:t>: </a:t>
-            </a:r>
-            <a:r>
-              <a:rPr lang="en-US" dirty="0" err="1"/>
-              <a:t>walmart</a:t>
-            </a:r>
-            <a:endParaRPr lang="en-IL" dirty="0"/>
-          </a:p>
-        </p:txBody>
-      </p:sp>
-      <p:sp>
-        <p:nvSpPr>
-          <p:cNvPr id="66" name="TextBox 65">
-            <a:extLst>
-              <a:ext uri="{FF2B5EF4-FFF2-40B4-BE49-F238E27FC236}">
-                <a16:creationId xmlns:a16="http://schemas.microsoft.com/office/drawing/2014/main" id="{CA6F6126-A68C-41AE-AED0-31EC5B599374}"/>
-              </a:ext>
-            </a:extLst>
-          </p:cNvPr>
-          <p:cNvSpPr txBox="1"/>
-          <p:nvPr/>
-        </p:nvSpPr>
-        <p:spPr>
-          <a:xfrm>
-            <a:off x="5947971" y="69697"/>
-            <a:ext cx="2476500" cy="646331"/>
-          </a:xfrm>
-          <a:prstGeom prst="rect">
-            <a:avLst/>
-          </a:prstGeom>
-          <a:noFill/>
-        </p:spPr>
-        <p:txBody>
-          <a:bodyPr wrap="square" rtlCol="0">
-            <a:spAutoFit/>
-          </a:bodyPr>
-          <a:lstStyle/>
-          <a:p>
-            <a:r>
-              <a:rPr lang="en-US" sz="1200" dirty="0" err="1"/>
-              <a:t>routing_keys</a:t>
-            </a:r>
-            <a:r>
-              <a:rPr lang="en-US" sz="1200" dirty="0"/>
-              <a:t>: </a:t>
-            </a:r>
-          </a:p>
-          <a:p>
-            <a:r>
-              <a:rPr lang="en-US" sz="1200" dirty="0"/>
-              <a:t>	</a:t>
-            </a:r>
-            <a:r>
-              <a:rPr lang="en-US" sz="1200" dirty="0" err="1"/>
-              <a:t>walmart</a:t>
-            </a:r>
-            <a:br>
-              <a:rPr lang="en-US" sz="1200" dirty="0"/>
-            </a:br>
-            <a:r>
-              <a:rPr lang="en-US" sz="1200" dirty="0"/>
-              <a:t>	amazon</a:t>
-            </a:r>
-          </a:p>
-        </p:txBody>
-      </p:sp>
       <p:cxnSp>
         <p:nvCxnSpPr>
           <p:cNvPr id="49" name="Straight Arrow Connector 48">
@@ -5977,7 +6116,7 @@
             <a:solidFill>
               <a:schemeClr val="tx1"/>
             </a:solidFill>
-            <a:headEnd type="none" w="med" len="med"/>
+            <a:headEnd type="triangle" w="med" len="med"/>
             <a:tailEnd type="triangle" w="med" len="med"/>
           </a:ln>
         </p:spPr>
@@ -6007,14 +6146,12 @@
           </p:cNvPr>
           <p:cNvCxnSpPr>
             <a:cxnSpLocks/>
-            <a:stCxn id="34" idx="3"/>
-            <a:endCxn id="42" idx="1"/>
           </p:cNvCxnSpPr>
           <p:nvPr/>
         </p:nvCxnSpPr>
         <p:spPr>
           <a:xfrm>
-            <a:off x="8161121" y="2293368"/>
+            <a:off x="8161121" y="2293367"/>
             <a:ext cx="1599788" cy="3729"/>
           </a:xfrm>
           <a:prstGeom prst="straightConnector1">
@@ -6024,7 +6161,7 @@
             <a:solidFill>
               <a:schemeClr val="tx1"/>
             </a:solidFill>
-            <a:headEnd type="none" w="med" len="med"/>
+            <a:headEnd type="triangle" w="med" len="med"/>
             <a:tailEnd type="triangle" w="med" len="med"/>
           </a:ln>
         </p:spPr>
@@ -6071,7 +6208,7 @@
             <a:solidFill>
               <a:schemeClr val="tx1"/>
             </a:solidFill>
-            <a:headEnd type="none" w="med" len="med"/>
+            <a:headEnd type="triangle" w="med" len="med"/>
             <a:tailEnd type="triangle" w="med" len="med"/>
           </a:ln>
         </p:spPr>
@@ -6116,7 +6253,7 @@
           </a:prstGeom>
           <a:ln w="57150">
             <a:solidFill>
-              <a:srgbClr val="C00000"/>
+              <a:srgbClr val="FF0000"/>
             </a:solidFill>
             <a:headEnd type="triangle" w="med" len="med"/>
             <a:tailEnd type="none" w="med" len="med"/>
@@ -6184,102 +6321,22 @@
           </a:fontRef>
         </p:style>
       </p:cxnSp>
-      <p:sp>
-        <p:nvSpPr>
-          <p:cNvPr id="89" name="Flowchart: Terminator 88">
+      <p:cxnSp>
+        <p:nvCxnSpPr>
+          <p:cNvPr id="28" name="Straight Arrow Connector 27">
             <a:extLst>
               <a:ext uri="{FF2B5EF4-FFF2-40B4-BE49-F238E27FC236}">
-                <a16:creationId xmlns:a16="http://schemas.microsoft.com/office/drawing/2014/main" id="{5E9464CA-DFA2-4280-B3E0-F22A2B4A04C9}"/>
+                <a16:creationId xmlns:a16="http://schemas.microsoft.com/office/drawing/2014/main" id="{66959F17-ABCB-4E67-BDE3-1D741BF69FE0}"/>
               </a:ext>
             </a:extLst>
           </p:cNvPr>
-          <p:cNvSpPr/>
-          <p:nvPr/>
-        </p:nvSpPr>
-        <p:spPr>
-          <a:xfrm>
-            <a:off x="1177166" y="4659908"/>
-            <a:ext cx="2312184" cy="543807"/>
-          </a:xfrm>
-          <a:prstGeom prst="flowChartTerminator">
-            <a:avLst/>
-          </a:prstGeom>
-          <a:solidFill>
-            <a:schemeClr val="bg2"/>
-          </a:solidFill>
-          <a:ln>
-            <a:solidFill>
-              <a:schemeClr val="tx1"/>
-            </a:solidFill>
-          </a:ln>
-        </p:spPr>
-        <p:style>
-          <a:lnRef idx="2">
-            <a:schemeClr val="accent1">
-              <a:shade val="50000"/>
-            </a:schemeClr>
-          </a:lnRef>
-          <a:fillRef idx="1">
-            <a:schemeClr val="accent1"/>
-          </a:fillRef>
-          <a:effectRef idx="0">
-            <a:schemeClr val="accent1"/>
-          </a:effectRef>
-          <a:fontRef idx="minor">
-            <a:schemeClr val="lt1"/>
-          </a:fontRef>
-        </p:style>
-        <p:txBody>
-          <a:bodyPr rtlCol="0" anchor="ctr"/>
-          <a:lstStyle/>
-          <a:p>
-            <a:pPr algn="ctr"/>
-            <a:r>
-              <a:rPr lang="en-US" dirty="0">
-                <a:ln>
-                  <a:solidFill>
-                    <a:sysClr val="windowText" lastClr="000000"/>
-                  </a:solidFill>
-                </a:ln>
-                <a:solidFill>
-                  <a:sysClr val="windowText" lastClr="000000"/>
-                </a:solidFill>
-              </a:rPr>
-              <a:t>Generated Queues</a:t>
-            </a:r>
-            <a:endParaRPr lang="en-IL" dirty="0">
-              <a:ln>
-                <a:solidFill>
-                  <a:sysClr val="windowText" lastClr="000000"/>
-                </a:solidFill>
-              </a:ln>
-              <a:solidFill>
-                <a:sysClr val="windowText" lastClr="000000"/>
-              </a:solidFill>
-            </a:endParaRPr>
-          </a:p>
-        </p:txBody>
-      </p:sp>
-      <p:cxnSp>
-        <p:nvCxnSpPr>
-          <p:cNvPr id="90" name="Straight Arrow Connector 89">
-            <a:extLst>
-              <a:ext uri="{FF2B5EF4-FFF2-40B4-BE49-F238E27FC236}">
-                <a16:creationId xmlns:a16="http://schemas.microsoft.com/office/drawing/2014/main" id="{B9B03C4D-47D2-43FA-835B-F940E90CB699}"/>
-              </a:ext>
-            </a:extLst>
-          </p:cNvPr>
-          <p:cNvCxnSpPr>
-            <a:cxnSpLocks/>
-            <a:stCxn id="89" idx="3"/>
-            <a:endCxn id="38" idx="1"/>
-          </p:cNvCxnSpPr>
+          <p:cNvCxnSpPr/>
           <p:nvPr/>
         </p:nvCxnSpPr>
         <p:spPr>
-          <a:xfrm flipV="1">
-            <a:off x="3489350" y="4322742"/>
-            <a:ext cx="69619" cy="609070"/>
+          <a:xfrm>
+            <a:off x="1417021" y="3765955"/>
+            <a:ext cx="1012042" cy="0"/>
           </a:xfrm>
           <a:prstGeom prst="straightConnector1">
             <a:avLst/>
@@ -6288,55 +6345,8 @@
             <a:solidFill>
               <a:srgbClr val="FF0000"/>
             </a:solidFill>
-            <a:headEnd type="triangle" w="med" len="med"/>
-            <a:tailEnd type="none" w="med" len="med"/>
-          </a:ln>
-        </p:spPr>
-        <p:style>
-          <a:lnRef idx="1">
-            <a:schemeClr val="accent1"/>
-          </a:lnRef>
-          <a:fillRef idx="0">
-            <a:schemeClr val="accent1"/>
-          </a:fillRef>
-          <a:effectRef idx="0">
-            <a:schemeClr val="accent1"/>
-          </a:effectRef>
-          <a:fontRef idx="minor">
-            <a:schemeClr val="tx1"/>
-          </a:fontRef>
-        </p:style>
-      </p:cxnSp>
-      <p:cxnSp>
-        <p:nvCxnSpPr>
-          <p:cNvPr id="93" name="Straight Arrow Connector 92">
-            <a:extLst>
-              <a:ext uri="{FF2B5EF4-FFF2-40B4-BE49-F238E27FC236}">
-                <a16:creationId xmlns:a16="http://schemas.microsoft.com/office/drawing/2014/main" id="{F72F0204-1CF2-4A39-8812-DE321B494257}"/>
-              </a:ext>
-            </a:extLst>
-          </p:cNvPr>
-          <p:cNvCxnSpPr>
-            <a:cxnSpLocks/>
-            <a:stCxn id="39" idx="2"/>
-            <a:endCxn id="89" idx="1"/>
-          </p:cNvCxnSpPr>
-          <p:nvPr/>
-        </p:nvCxnSpPr>
-        <p:spPr>
-          <a:xfrm>
-            <a:off x="901442" y="4298194"/>
-            <a:ext cx="275724" cy="633618"/>
-          </a:xfrm>
-          <a:prstGeom prst="straightConnector1">
-            <a:avLst/>
-          </a:prstGeom>
-          <a:ln w="57150">
-            <a:solidFill>
-              <a:srgbClr val="FF0000"/>
-            </a:solidFill>
-            <a:headEnd type="triangle" w="med" len="med"/>
-            <a:tailEnd type="none" w="med" len="med"/>
+            <a:headEnd type="none" w="med" len="med"/>
+            <a:tailEnd type="triangle" w="med" len="med"/>
           </a:ln>
         </p:spPr>
         <p:style>
@@ -6399,7 +6409,7 @@
         <p:spPr>
           <a:xfrm>
             <a:off x="273917" y="151313"/>
-            <a:ext cx="4563944" cy="1569660"/>
+            <a:ext cx="4563944" cy="2308324"/>
           </a:xfrm>
           <a:prstGeom prst="rect">
             <a:avLst/>
@@ -6423,7 +6433,22 @@
                   <a:sysClr val="windowText" lastClr="000000"/>
                 </a:solidFill>
               </a:rPr>
-              <a:t>Rabbit Architecture 1</a:t>
+              <a:t>Rabbit Architecture </a:t>
+            </a:r>
+          </a:p>
+          <a:p>
+            <a:r>
+              <a:rPr lang="en-US" sz="4800" dirty="0">
+                <a:ln>
+                  <a:solidFill>
+                    <a:sysClr val="windowText" lastClr="000000"/>
+                  </a:solidFill>
+                </a:ln>
+                <a:solidFill>
+                  <a:sysClr val="windowText" lastClr="000000"/>
+                </a:solidFill>
+              </a:rPr>
+              <a:t>V0.0.5+</a:t>
             </a:r>
             <a:endParaRPr lang="en-IL" sz="4800" dirty="0">
               <a:ln>
@@ -6680,7 +6705,7 @@
         </p:nvSpPr>
         <p:spPr>
           <a:xfrm>
-            <a:off x="5848937" y="4890224"/>
+            <a:off x="5848937" y="5941583"/>
             <a:ext cx="2312184" cy="543807"/>
           </a:xfrm>
           <a:prstGeom prst="flowChartTerminator">
@@ -6908,7 +6933,7 @@
         </p:nvSpPr>
         <p:spPr>
           <a:xfrm>
-            <a:off x="9914575" y="4674716"/>
+            <a:off x="9914575" y="5726075"/>
             <a:ext cx="1006255" cy="974824"/>
           </a:xfrm>
           <a:prstGeom prst="diamond">
@@ -7202,6 +7227,22 @@
                 </a:solidFill>
               </a:rPr>
               <a:t>Read</a:t>
+            </a:r>
+          </a:p>
+          <a:p>
+            <a:pPr algn="ctr"/>
+            <a:r>
+              <a:rPr lang="en-US" sz="1050" dirty="0">
+                <a:ln>
+                  <a:solidFill>
+                    <a:srgbClr val="00B0F0"/>
+                  </a:solidFill>
+                </a:ln>
+                <a:solidFill>
+                  <a:srgbClr val="00B0F0"/>
+                </a:solidFill>
+              </a:rPr>
+              <a:t>ID</a:t>
             </a:r>
           </a:p>
         </p:txBody>
@@ -7276,7 +7317,8 @@
             <a:solidFill>
               <a:srgbClr val="00B0F0"/>
             </a:solidFill>
-            <a:tailEnd type="triangle"/>
+            <a:headEnd type="triangle" w="med" len="med"/>
+            <a:tailEnd type="triangle" w="med" len="med"/>
           </a:ln>
         </p:spPr>
         <p:style>
@@ -7325,7 +7367,8 @@
                 <a:lumOff val="40000"/>
               </a:schemeClr>
             </a:solidFill>
-            <a:tailEnd type="triangle"/>
+            <a:headEnd type="triangle" w="med" len="med"/>
+            <a:tailEnd type="triangle" w="med" len="med"/>
           </a:ln>
         </p:spPr>
         <p:style>
@@ -7373,7 +7416,8 @@
                 <a:lumMod val="75000"/>
               </a:schemeClr>
             </a:solidFill>
-            <a:tailEnd type="triangle"/>
+            <a:headEnd type="triangle" w="med" len="med"/>
+            <a:tailEnd type="triangle" w="med" len="med"/>
           </a:ln>
         </p:spPr>
         <p:style>
@@ -7391,146 +7435,6 @@
           </a:fontRef>
         </p:style>
       </p:cxnSp>
-      <p:sp>
-        <p:nvSpPr>
-          <p:cNvPr id="46" name="TextBox 45">
-            <a:extLst>
-              <a:ext uri="{FF2B5EF4-FFF2-40B4-BE49-F238E27FC236}">
-                <a16:creationId xmlns:a16="http://schemas.microsoft.com/office/drawing/2014/main" id="{80A18AB9-7BD3-49E7-BFA1-5B249546C0EF}"/>
-              </a:ext>
-            </a:extLst>
-          </p:cNvPr>
-          <p:cNvSpPr txBox="1"/>
-          <p:nvPr/>
-        </p:nvSpPr>
-        <p:spPr>
-          <a:xfrm>
-            <a:off x="5848937" y="1703645"/>
-            <a:ext cx="2476500" cy="369332"/>
-          </a:xfrm>
-          <a:prstGeom prst="rect">
-            <a:avLst/>
-          </a:prstGeom>
-          <a:noFill/>
-        </p:spPr>
-        <p:txBody>
-          <a:bodyPr wrap="square" rtlCol="0">
-            <a:spAutoFit/>
-          </a:bodyPr>
-          <a:lstStyle/>
-          <a:p>
-            <a:r>
-              <a:rPr lang="en-US" dirty="0" err="1"/>
-              <a:t>routing_key</a:t>
-            </a:r>
-            <a:r>
-              <a:rPr lang="en-US" dirty="0"/>
-              <a:t>: amazon</a:t>
-            </a:r>
-            <a:endParaRPr lang="en-IL" dirty="0"/>
-          </a:p>
-        </p:txBody>
-      </p:sp>
-      <p:sp>
-        <p:nvSpPr>
-          <p:cNvPr id="65" name="TextBox 64">
-            <a:extLst>
-              <a:ext uri="{FF2B5EF4-FFF2-40B4-BE49-F238E27FC236}">
-                <a16:creationId xmlns:a16="http://schemas.microsoft.com/office/drawing/2014/main" id="{AEA5426B-8875-46C6-AC55-C8CE8E59E7E2}"/>
-              </a:ext>
-            </a:extLst>
-          </p:cNvPr>
-          <p:cNvSpPr txBox="1"/>
-          <p:nvPr/>
-        </p:nvSpPr>
-        <p:spPr>
-          <a:xfrm>
-            <a:off x="5848937" y="3093012"/>
-            <a:ext cx="2476500" cy="369332"/>
-          </a:xfrm>
-          <a:prstGeom prst="rect">
-            <a:avLst/>
-          </a:prstGeom>
-          <a:noFill/>
-        </p:spPr>
-        <p:txBody>
-          <a:bodyPr wrap="square" rtlCol="0">
-            <a:spAutoFit/>
-          </a:bodyPr>
-          <a:lstStyle/>
-          <a:p>
-            <a:r>
-              <a:rPr lang="en-US" dirty="0" err="1"/>
-              <a:t>routing_key</a:t>
-            </a:r>
-            <a:r>
-              <a:rPr lang="en-US" dirty="0"/>
-              <a:t>: </a:t>
-            </a:r>
-            <a:r>
-              <a:rPr lang="en-US" dirty="0" err="1"/>
-              <a:t>walmart</a:t>
-            </a:r>
-            <a:endParaRPr lang="en-IL" dirty="0"/>
-          </a:p>
-        </p:txBody>
-      </p:sp>
-      <p:sp>
-        <p:nvSpPr>
-          <p:cNvPr id="66" name="TextBox 65">
-            <a:extLst>
-              <a:ext uri="{FF2B5EF4-FFF2-40B4-BE49-F238E27FC236}">
-                <a16:creationId xmlns:a16="http://schemas.microsoft.com/office/drawing/2014/main" id="{CA6F6126-A68C-41AE-AED0-31EC5B599374}"/>
-              </a:ext>
-            </a:extLst>
-          </p:cNvPr>
-          <p:cNvSpPr txBox="1"/>
-          <p:nvPr/>
-        </p:nvSpPr>
-        <p:spPr>
-          <a:xfrm>
-            <a:off x="5947971" y="69697"/>
-            <a:ext cx="2476500" cy="646331"/>
-          </a:xfrm>
-          <a:prstGeom prst="rect">
-            <a:avLst/>
-          </a:prstGeom>
-          <a:noFill/>
-        </p:spPr>
-        <p:txBody>
-          <a:bodyPr wrap="square" rtlCol="0">
-            <a:spAutoFit/>
-          </a:bodyPr>
-          <a:lstStyle/>
-          <a:p>
-            <a:r>
-              <a:rPr lang="en-US" sz="1200" dirty="0" err="1"/>
-              <a:t>routing_keys</a:t>
-            </a:r>
-            <a:r>
-              <a:rPr lang="en-US" sz="1200" dirty="0"/>
-              <a:t>: </a:t>
-            </a:r>
-          </a:p>
-          <a:p>
-            <a:r>
-              <a:rPr lang="en-US" sz="1200" dirty="0"/>
-              <a:t>	</a:t>
-            </a:r>
-            <a:r>
-              <a:rPr lang="en-US" sz="1200" dirty="0" err="1"/>
-              <a:t>walmart</a:t>
-            </a:r>
-            <a:br>
-              <a:rPr lang="en-US" sz="1200" dirty="0"/>
-            </a:br>
-            <a:r>
-              <a:rPr lang="en-US" sz="1200" dirty="0"/>
-              <a:t>	amazon</a:t>
-            </a:r>
-          </a:p>
-        </p:txBody>
-      </p:sp>
       <p:cxnSp>
         <p:nvCxnSpPr>
           <p:cNvPr id="49" name="Straight Arrow Connector 48">
@@ -7558,7 +7462,7 @@
             <a:solidFill>
               <a:schemeClr val="tx1"/>
             </a:solidFill>
-            <a:headEnd type="none" w="med" len="med"/>
+            <a:headEnd type="triangle" w="med" len="med"/>
             <a:tailEnd type="triangle" w="med" len="med"/>
           </a:ln>
         </p:spPr>
@@ -7605,7 +7509,7 @@
             <a:solidFill>
               <a:schemeClr val="tx1"/>
             </a:solidFill>
-            <a:headEnd type="none" w="med" len="med"/>
+            <a:headEnd type="triangle" w="med" len="med"/>
             <a:tailEnd type="triangle" w="med" len="med"/>
           </a:ln>
         </p:spPr>
@@ -7652,7 +7556,7 @@
             <a:solidFill>
               <a:schemeClr val="tx1"/>
             </a:solidFill>
-            <a:headEnd type="none" w="med" len="med"/>
+            <a:headEnd type="triangle" w="med" len="med"/>
             <a:tailEnd type="triangle" w="med" len="med"/>
           </a:ln>
         </p:spPr>
@@ -7690,7 +7594,7 @@
         <p:spPr>
           <a:xfrm flipH="1" flipV="1">
             <a:off x="3558969" y="4322742"/>
-            <a:ext cx="2289968" cy="839386"/>
+            <a:ext cx="2289968" cy="1890745"/>
           </a:xfrm>
           <a:prstGeom prst="straightConnector1">
             <a:avLst/>
@@ -7736,7 +7640,7 @@
         </p:nvCxnSpPr>
         <p:spPr>
           <a:xfrm>
-            <a:off x="8161121" y="5162128"/>
+            <a:off x="8161121" y="6213487"/>
             <a:ext cx="1753454" cy="0"/>
           </a:xfrm>
           <a:prstGeom prst="straightConnector1">
@@ -7918,6 +7822,331 @@
             </a:solidFill>
             <a:headEnd type="triangle" w="med" len="med"/>
             <a:tailEnd type="none" w="med" len="med"/>
+          </a:ln>
+        </p:spPr>
+        <p:style>
+          <a:lnRef idx="1">
+            <a:schemeClr val="accent1"/>
+          </a:lnRef>
+          <a:fillRef idx="0">
+            <a:schemeClr val="accent1"/>
+          </a:fillRef>
+          <a:effectRef idx="0">
+            <a:schemeClr val="accent1"/>
+          </a:effectRef>
+          <a:fontRef idx="minor">
+            <a:schemeClr val="tx1"/>
+          </a:fontRef>
+        </p:style>
+      </p:cxnSp>
+      <p:sp>
+        <p:nvSpPr>
+          <p:cNvPr id="32" name="Flowchart: Terminator 31">
+            <a:extLst>
+              <a:ext uri="{FF2B5EF4-FFF2-40B4-BE49-F238E27FC236}">
+                <a16:creationId xmlns:a16="http://schemas.microsoft.com/office/drawing/2014/main" id="{A2ED0F26-3E31-4996-A043-82EE2F5A2AEA}"/>
+              </a:ext>
+            </a:extLst>
+          </p:cNvPr>
+          <p:cNvSpPr/>
+          <p:nvPr/>
+        </p:nvSpPr>
+        <p:spPr>
+          <a:xfrm>
+            <a:off x="5844237" y="4857337"/>
+            <a:ext cx="2312184" cy="543807"/>
+          </a:xfrm>
+          <a:prstGeom prst="flowChartTerminator">
+            <a:avLst/>
+          </a:prstGeom>
+          <a:solidFill>
+            <a:schemeClr val="bg2"/>
+          </a:solidFill>
+          <a:ln>
+            <a:solidFill>
+              <a:schemeClr val="tx1"/>
+            </a:solidFill>
+          </a:ln>
+        </p:spPr>
+        <p:style>
+          <a:lnRef idx="2">
+            <a:schemeClr val="accent1">
+              <a:shade val="50000"/>
+            </a:schemeClr>
+          </a:lnRef>
+          <a:fillRef idx="1">
+            <a:schemeClr val="accent1"/>
+          </a:fillRef>
+          <a:effectRef idx="0">
+            <a:schemeClr val="accent1"/>
+          </a:effectRef>
+          <a:fontRef idx="minor">
+            <a:schemeClr val="lt1"/>
+          </a:fontRef>
+        </p:style>
+        <p:txBody>
+          <a:bodyPr rtlCol="0" anchor="ctr"/>
+          <a:lstStyle/>
+          <a:p>
+            <a:pPr algn="ctr"/>
+            <a:r>
+              <a:rPr lang="en-US" dirty="0" err="1">
+                <a:ln>
+                  <a:solidFill>
+                    <a:sysClr val="windowText" lastClr="000000"/>
+                  </a:solidFill>
+                </a:ln>
+                <a:solidFill>
+                  <a:sysClr val="windowText" lastClr="000000"/>
+                </a:solidFill>
+              </a:rPr>
+              <a:t>db_write</a:t>
+            </a:r>
+            <a:endParaRPr lang="en-IL" dirty="0">
+              <a:ln>
+                <a:solidFill>
+                  <a:sysClr val="windowText" lastClr="000000"/>
+                </a:solidFill>
+              </a:ln>
+              <a:solidFill>
+                <a:sysClr val="windowText" lastClr="000000"/>
+              </a:solidFill>
+            </a:endParaRPr>
+          </a:p>
+        </p:txBody>
+      </p:sp>
+      <p:sp>
+        <p:nvSpPr>
+          <p:cNvPr id="33" name="Diamond 32">
+            <a:extLst>
+              <a:ext uri="{FF2B5EF4-FFF2-40B4-BE49-F238E27FC236}">
+                <a16:creationId xmlns:a16="http://schemas.microsoft.com/office/drawing/2014/main" id="{CA1794CD-C96D-44C8-8DEF-B30A053051E8}"/>
+              </a:ext>
+            </a:extLst>
+          </p:cNvPr>
+          <p:cNvSpPr/>
+          <p:nvPr/>
+        </p:nvSpPr>
+        <p:spPr>
+          <a:xfrm>
+            <a:off x="9909875" y="4641829"/>
+            <a:ext cx="1006255" cy="974824"/>
+          </a:xfrm>
+          <a:prstGeom prst="diamond">
+            <a:avLst/>
+          </a:prstGeom>
+          <a:solidFill>
+            <a:schemeClr val="bg2"/>
+          </a:solidFill>
+          <a:ln w="28575">
+            <a:solidFill>
+              <a:schemeClr val="accent1"/>
+            </a:solidFill>
+          </a:ln>
+        </p:spPr>
+        <p:style>
+          <a:lnRef idx="2">
+            <a:schemeClr val="accent1">
+              <a:shade val="50000"/>
+            </a:schemeClr>
+          </a:lnRef>
+          <a:fillRef idx="1">
+            <a:schemeClr val="accent1"/>
+          </a:fillRef>
+          <a:effectRef idx="0">
+            <a:schemeClr val="accent1"/>
+          </a:effectRef>
+          <a:fontRef idx="minor">
+            <a:schemeClr val="lt1"/>
+          </a:fontRef>
+        </p:style>
+        <p:txBody>
+          <a:bodyPr rtlCol="0" anchor="ctr"/>
+          <a:lstStyle/>
+          <a:p>
+            <a:pPr algn="ctr"/>
+            <a:r>
+              <a:rPr lang="en-US" sz="1050" dirty="0">
+                <a:ln>
+                  <a:solidFill>
+                    <a:sysClr val="windowText" lastClr="000000"/>
+                  </a:solidFill>
+                </a:ln>
+                <a:solidFill>
+                  <a:srgbClr val="00B0F0"/>
+                </a:solidFill>
+              </a:rPr>
+              <a:t>DB </a:t>
+            </a:r>
+          </a:p>
+          <a:p>
+            <a:pPr algn="ctr"/>
+            <a:r>
+              <a:rPr lang="en-US" sz="1050" dirty="0">
+                <a:ln>
+                  <a:solidFill>
+                    <a:srgbClr val="00B050"/>
+                  </a:solidFill>
+                </a:ln>
+                <a:solidFill>
+                  <a:srgbClr val="00B050"/>
+                </a:solidFill>
+              </a:rPr>
+              <a:t>Read</a:t>
+            </a:r>
+          </a:p>
+          <a:p>
+            <a:pPr algn="ctr"/>
+            <a:r>
+              <a:rPr lang="en-US" sz="1050" dirty="0">
+                <a:ln>
+                  <a:solidFill>
+                    <a:srgbClr val="00B050"/>
+                  </a:solidFill>
+                </a:ln>
+                <a:solidFill>
+                  <a:srgbClr val="00B050"/>
+                </a:solidFill>
+              </a:rPr>
+              <a:t>Filter</a:t>
+            </a:r>
+            <a:endParaRPr lang="en-IL" sz="1050" dirty="0">
+              <a:ln>
+                <a:solidFill>
+                  <a:srgbClr val="00B050"/>
+                </a:solidFill>
+              </a:ln>
+              <a:solidFill>
+                <a:srgbClr val="00B050"/>
+              </a:solidFill>
+            </a:endParaRPr>
+          </a:p>
+        </p:txBody>
+      </p:sp>
+      <p:cxnSp>
+        <p:nvCxnSpPr>
+          <p:cNvPr id="37" name="Straight Arrow Connector 36">
+            <a:extLst>
+              <a:ext uri="{FF2B5EF4-FFF2-40B4-BE49-F238E27FC236}">
+                <a16:creationId xmlns:a16="http://schemas.microsoft.com/office/drawing/2014/main" id="{341A0DB6-E579-4EC1-A6E6-91829E68835C}"/>
+              </a:ext>
+            </a:extLst>
+          </p:cNvPr>
+          <p:cNvCxnSpPr>
+            <a:cxnSpLocks/>
+            <a:stCxn id="32" idx="3"/>
+            <a:endCxn id="33" idx="1"/>
+          </p:cNvCxnSpPr>
+          <p:nvPr/>
+        </p:nvCxnSpPr>
+        <p:spPr>
+          <a:xfrm>
+            <a:off x="8156421" y="5129241"/>
+            <a:ext cx="1753454" cy="0"/>
+          </a:xfrm>
+          <a:prstGeom prst="straightConnector1">
+            <a:avLst/>
+          </a:prstGeom>
+          <a:ln w="38100">
+            <a:solidFill>
+              <a:schemeClr val="tx1"/>
+            </a:solidFill>
+            <a:headEnd type="none" w="med" len="med"/>
+            <a:tailEnd type="triangle" w="med" len="med"/>
+          </a:ln>
+        </p:spPr>
+        <p:style>
+          <a:lnRef idx="1">
+            <a:schemeClr val="accent1"/>
+          </a:lnRef>
+          <a:fillRef idx="0">
+            <a:schemeClr val="accent1"/>
+          </a:fillRef>
+          <a:effectRef idx="0">
+            <a:schemeClr val="accent1"/>
+          </a:effectRef>
+          <a:fontRef idx="minor">
+            <a:schemeClr val="tx1"/>
+          </a:fontRef>
+        </p:style>
+      </p:cxnSp>
+      <p:cxnSp>
+        <p:nvCxnSpPr>
+          <p:cNvPr id="43" name="Straight Arrow Connector 42">
+            <a:extLst>
+              <a:ext uri="{FF2B5EF4-FFF2-40B4-BE49-F238E27FC236}">
+                <a16:creationId xmlns:a16="http://schemas.microsoft.com/office/drawing/2014/main" id="{2F1D525C-7EE8-4B87-89DD-0DD0EF163DDB}"/>
+              </a:ext>
+            </a:extLst>
+          </p:cNvPr>
+          <p:cNvCxnSpPr>
+            <a:cxnSpLocks/>
+            <a:stCxn id="38" idx="0"/>
+            <a:endCxn id="32" idx="1"/>
+          </p:cNvCxnSpPr>
+          <p:nvPr/>
+        </p:nvCxnSpPr>
+        <p:spPr>
+          <a:xfrm>
+            <a:off x="3980251" y="3480179"/>
+            <a:ext cx="1863986" cy="1649062"/>
+          </a:xfrm>
+          <a:prstGeom prst="straightConnector1">
+            <a:avLst/>
+          </a:prstGeom>
+          <a:ln w="57150">
+            <a:solidFill>
+              <a:srgbClr val="00B050"/>
+            </a:solidFill>
+            <a:headEnd type="triangle" w="med" len="med"/>
+            <a:tailEnd type="triangle" w="med" len="med"/>
+          </a:ln>
+        </p:spPr>
+        <p:style>
+          <a:lnRef idx="1">
+            <a:schemeClr val="accent1"/>
+          </a:lnRef>
+          <a:fillRef idx="0">
+            <a:schemeClr val="accent1"/>
+          </a:fillRef>
+          <a:effectRef idx="0">
+            <a:schemeClr val="accent1"/>
+          </a:effectRef>
+          <a:fontRef idx="minor">
+            <a:schemeClr val="tx1"/>
+          </a:fontRef>
+        </p:style>
+      </p:cxnSp>
+      <p:cxnSp>
+        <p:nvCxnSpPr>
+          <p:cNvPr id="45" name="Straight Arrow Connector 44">
+            <a:extLst>
+              <a:ext uri="{FF2B5EF4-FFF2-40B4-BE49-F238E27FC236}">
+                <a16:creationId xmlns:a16="http://schemas.microsoft.com/office/drawing/2014/main" id="{9BE1A54A-6312-499D-BD3C-4AFC6F6A035F}"/>
+              </a:ext>
+            </a:extLst>
+          </p:cNvPr>
+          <p:cNvCxnSpPr>
+            <a:cxnSpLocks/>
+            <a:stCxn id="39" idx="3"/>
+            <a:endCxn id="38" idx="3"/>
+          </p:cNvCxnSpPr>
+          <p:nvPr/>
+        </p:nvCxnSpPr>
+        <p:spPr>
+          <a:xfrm>
+            <a:off x="1733264" y="3462344"/>
+            <a:ext cx="457300" cy="17835"/>
+          </a:xfrm>
+          <a:prstGeom prst="straightConnector1">
+            <a:avLst/>
+          </a:prstGeom>
+          <a:ln w="57150">
+            <a:solidFill>
+              <a:srgbClr val="00B050"/>
+            </a:solidFill>
+            <a:headEnd type="triangle" w="med" len="med"/>
+            <a:tailEnd type="triangle" w="med" len="med"/>
           </a:ln>
         </p:spPr>
         <p:style>

</xml_diff>